<commit_message>
chore(samples): consolidate template pptx
</commit_message>
<xml_diff>
--- a/samples/templates/templates.pptx
+++ b/samples/templates/templates.pptx
@@ -5,11 +5,8 @@
     <p:sldMasterId id="2147483648" r:id="rId1"/>
   </p:sldMasterIdLst>
   <p:notesMasterIdLst>
-    <p:notesMasterId r:id="rId3"/>
+    <p:notesMasterId r:id="rId2"/>
   </p:notesMasterIdLst>
-  <p:sldIdLst>
-    <p:sldId id="256" r:id="rId2"/>
-  </p:sldIdLst>
   <p:sldSz cx="12192000" cy="6858000"/>
   <p:notesSz cx="6858000" cy="9144000"/>
   <p:defaultTextStyle>
@@ -111,6 +108,9 @@
     <p:ext uri="{EFAFB233-063F-42B5-8137-9DF3F51BA10A}">
       <p15:sldGuideLst xmlns:p15="http://schemas.microsoft.com/office/powerpoint/2012/main"/>
     </p:ext>
+    <p:ext uri="{2D200454-40CA-4A62-9FC3-DE9A4176ACB9}">
+      <p15:notesGuideLst xmlns:p15="http://schemas.microsoft.com/office/powerpoint/2012/main"/>
+    </p:ext>
   </p:extLst>
 </p:presentation>
 </file>
@@ -197,7 +197,7 @@
           <a:p>
             <a:fld id="{D83749C5-FFD9-114C-B10A-D0464B391B79}" type="datetimeFigureOut">
               <a:rPr kumimoji="1" lang="ja-JP" altLang="en-US" smtClean="0"/>
-              <a:t>2025/10/6</a:t>
+              <a:t>2025/10/10</a:t>
             </a:fld>
             <a:endParaRPr kumimoji="1" lang="ja-JP" altLang="en-US"/>
           </a:p>
@@ -498,7 +498,7 @@
 
 <file path=ppt/slideLayouts/slideLayout1.xml><?xml version="1.0" encoding="utf-8"?>
 <p:sldLayout xmlns:a="http://schemas.openxmlformats.org/drawingml/2006/main" xmlns:r="http://schemas.openxmlformats.org/officeDocument/2006/relationships" xmlns:p="http://schemas.openxmlformats.org/presentationml/2006/main" preserve="1" userDrawn="1">
-  <p:cSld name="タイトル">
+  <p:cSld name="Title">
     <p:bg>
       <p:bgRef idx="1001">
         <a:schemeClr val="bg2"/>
@@ -793,6 +793,46 @@
           </a:p>
         </p:txBody>
       </p:sp>
+      <p:sp>
+        <p:nvSpPr>
+          <p:cNvPr id="5" name="Logo">
+            <a:extLst>
+              <a:ext uri="{FF2B5EF4-FFF2-40B4-BE49-F238E27FC236}">
+                <a16:creationId xmlns:a16="http://schemas.microsoft.com/office/drawing/2014/main" id="{7214F02D-2D38-0E5D-6C46-AEA066F785D6}"/>
+              </a:ext>
+            </a:extLst>
+          </p:cNvPr>
+          <p:cNvSpPr>
+            <a:spLocks noGrp="1"/>
+          </p:cNvSpPr>
+          <p:nvPr>
+            <p:ph sz="quarter" idx="14" hasCustomPrompt="1"/>
+          </p:nvPr>
+        </p:nvSpPr>
+        <p:spPr>
+          <a:xfrm>
+            <a:off x="10965176" y="178130"/>
+            <a:ext cx="914400" cy="914400"/>
+          </a:xfrm>
+        </p:spPr>
+        <p:txBody>
+          <a:bodyPr/>
+          <a:lstStyle>
+            <a:lvl1pPr marL="0" indent="0">
+              <a:buNone/>
+              <a:defRPr/>
+            </a:lvl1pPr>
+          </a:lstStyle>
+          <a:p>
+            <a:pPr lvl="0"/>
+            <a:r>
+              <a:rPr kumimoji="1" lang="en-US" altLang="ja-JP" dirty="0"/>
+              <a:t>logo</a:t>
+            </a:r>
+            <a:endParaRPr kumimoji="1" lang="ja-JP" altLang="en-US"/>
+          </a:p>
+        </p:txBody>
+      </p:sp>
     </p:spTree>
     <p:extLst>
       <p:ext uri="{BB962C8B-B14F-4D97-AF65-F5344CB8AC3E}">
@@ -808,7 +848,7 @@
 
 <file path=ppt/slideLayouts/slideLayout2.xml><?xml version="1.0" encoding="utf-8"?>
 <p:sldLayout xmlns:a="http://schemas.openxmlformats.org/drawingml/2006/main" xmlns:r="http://schemas.openxmlformats.org/officeDocument/2006/relationships" xmlns:p="http://schemas.openxmlformats.org/presentationml/2006/main" preserve="1" userDrawn="1">
-  <p:cSld name="コンテンツ">
+  <p:cSld name="Agenda">
     <p:spTree>
       <p:nvGrpSpPr>
         <p:cNvPr id="1" name=""/>
@@ -825,163 +865,6 @@
       </p:grpSpPr>
       <p:sp>
         <p:nvSpPr>
-          <p:cNvPr id="2" name="タイトル 1">
-            <a:extLst>
-              <a:ext uri="{FF2B5EF4-FFF2-40B4-BE49-F238E27FC236}">
-                <a16:creationId xmlns:a16="http://schemas.microsoft.com/office/drawing/2014/main" id="{1C878911-0E99-4C7F-A17C-E4C6E06AD3EB}"/>
-              </a:ext>
-            </a:extLst>
-          </p:cNvPr>
-          <p:cNvSpPr>
-            <a:spLocks noGrp="1"/>
-          </p:cNvSpPr>
-          <p:nvPr>
-            <p:ph type="title"/>
-          </p:nvPr>
-        </p:nvSpPr>
-        <p:spPr/>
-        <p:txBody>
-          <a:bodyPr/>
-          <a:lstStyle>
-            <a:lvl1pPr>
-              <a:defRPr>
-                <a:latin typeface="Meiryo UI" panose="020B0604030504040204" pitchFamily="34" charset="-128"/>
-                <a:ea typeface="Meiryo UI" panose="020B0604030504040204" pitchFamily="34" charset="-128"/>
-              </a:defRPr>
-            </a:lvl1pPr>
-          </a:lstStyle>
-          <a:p>
-            <a:r>
-              <a:rPr kumimoji="1" lang="ja-JP" altLang="en-US"/>
-              <a:t>マスター タイトルの書式設定</a:t>
-            </a:r>
-          </a:p>
-        </p:txBody>
-      </p:sp>
-      <p:sp>
-        <p:nvSpPr>
-          <p:cNvPr id="3" name="コンテンツ プレースホルダー 2">
-            <a:extLst>
-              <a:ext uri="{FF2B5EF4-FFF2-40B4-BE49-F238E27FC236}">
-                <a16:creationId xmlns:a16="http://schemas.microsoft.com/office/drawing/2014/main" id="{CE3F0D44-172A-CF1D-E1C1-730B2FD3226F}"/>
-              </a:ext>
-            </a:extLst>
-          </p:cNvPr>
-          <p:cNvSpPr>
-            <a:spLocks noGrp="1"/>
-          </p:cNvSpPr>
-          <p:nvPr>
-            <p:ph idx="1"/>
-          </p:nvPr>
-        </p:nvSpPr>
-        <p:spPr/>
-        <p:txBody>
-          <a:bodyPr>
-            <a:normAutofit/>
-          </a:bodyPr>
-          <a:lstStyle>
-            <a:lvl1pPr>
-              <a:defRPr sz="1800">
-                <a:latin typeface="Meiryo UI" panose="020B0604030504040204" pitchFamily="34" charset="-128"/>
-                <a:ea typeface="Meiryo UI" panose="020B0604030504040204" pitchFamily="34" charset="-128"/>
-              </a:defRPr>
-            </a:lvl1pPr>
-            <a:lvl2pPr>
-              <a:defRPr sz="1600">
-                <a:latin typeface="Meiryo UI" panose="020B0604030504040204" pitchFamily="34" charset="-128"/>
-                <a:ea typeface="Meiryo UI" panose="020B0604030504040204" pitchFamily="34" charset="-128"/>
-              </a:defRPr>
-            </a:lvl2pPr>
-            <a:lvl3pPr>
-              <a:defRPr sz="1400">
-                <a:latin typeface="Meiryo UI" panose="020B0604030504040204" pitchFamily="34" charset="-128"/>
-                <a:ea typeface="Meiryo UI" panose="020B0604030504040204" pitchFamily="34" charset="-128"/>
-              </a:defRPr>
-            </a:lvl3pPr>
-            <a:lvl4pPr>
-              <a:defRPr sz="1200">
-                <a:latin typeface="Meiryo UI" panose="020B0604030504040204" pitchFamily="34" charset="-128"/>
-                <a:ea typeface="Meiryo UI" panose="020B0604030504040204" pitchFamily="34" charset="-128"/>
-              </a:defRPr>
-            </a:lvl4pPr>
-            <a:lvl5pPr>
-              <a:defRPr sz="1200">
-                <a:latin typeface="Meiryo UI" panose="020B0604030504040204" pitchFamily="34" charset="-128"/>
-                <a:ea typeface="Meiryo UI" panose="020B0604030504040204" pitchFamily="34" charset="-128"/>
-              </a:defRPr>
-            </a:lvl5pPr>
-          </a:lstStyle>
-          <a:p>
-            <a:pPr lvl="0"/>
-            <a:r>
-              <a:rPr kumimoji="1" lang="ja-JP" altLang="en-US"/>
-              <a:t>マスター テキストの書式設定</a:t>
-            </a:r>
-          </a:p>
-          <a:p>
-            <a:pPr lvl="1"/>
-            <a:r>
-              <a:rPr kumimoji="1" lang="ja-JP" altLang="en-US"/>
-              <a:t>第 </a:t>
-            </a:r>
-            <a:r>
-              <a:rPr kumimoji="1" lang="en-US" altLang="ja-JP"/>
-              <a:t>2 </a:t>
-            </a:r>
-            <a:r>
-              <a:rPr kumimoji="1" lang="ja-JP" altLang="en-US"/>
-              <a:t>レベル</a:t>
-            </a:r>
-          </a:p>
-          <a:p>
-            <a:pPr lvl="2"/>
-            <a:r>
-              <a:rPr kumimoji="1" lang="ja-JP" altLang="en-US"/>
-              <a:t>第 </a:t>
-            </a:r>
-            <a:r>
-              <a:rPr kumimoji="1" lang="en-US" altLang="ja-JP"/>
-              <a:t>3 </a:t>
-            </a:r>
-            <a:r>
-              <a:rPr kumimoji="1" lang="ja-JP" altLang="en-US"/>
-              <a:t>レベル</a:t>
-            </a:r>
-          </a:p>
-          <a:p>
-            <a:pPr lvl="3"/>
-            <a:r>
-              <a:rPr kumimoji="1" lang="ja-JP" altLang="en-US"/>
-              <a:t>第 </a:t>
-            </a:r>
-            <a:r>
-              <a:rPr kumimoji="1" lang="en-US" altLang="ja-JP"/>
-              <a:t>4 </a:t>
-            </a:r>
-            <a:r>
-              <a:rPr kumimoji="1" lang="ja-JP" altLang="en-US"/>
-              <a:t>レベル</a:t>
-            </a:r>
-          </a:p>
-          <a:p>
-            <a:pPr lvl="4"/>
-            <a:r>
-              <a:rPr kumimoji="1" lang="ja-JP" altLang="en-US"/>
-              <a:t>第 </a:t>
-            </a:r>
-            <a:r>
-              <a:rPr kumimoji="1" lang="en-US" altLang="ja-JP"/>
-              <a:t>5 </a:t>
-            </a:r>
-            <a:r>
-              <a:rPr kumimoji="1" lang="ja-JP" altLang="en-US"/>
-              <a:t>レベル</a:t>
-            </a:r>
-          </a:p>
-        </p:txBody>
-      </p:sp>
-      <p:sp>
-        <p:nvSpPr>
           <p:cNvPr id="6" name="スライド番号プレースホルダー 5">
             <a:extLst>
               <a:ext uri="{FF2B5EF4-FFF2-40B4-BE49-F238E27FC236}">
@@ -1019,10 +902,10 @@
       </p:sp>
       <p:sp>
         <p:nvSpPr>
-          <p:cNvPr id="7" name="テキスト プレースホルダー 2">
+          <p:cNvPr id="3" name="コンテンツ プレースホルダー 2">
             <a:extLst>
               <a:ext uri="{FF2B5EF4-FFF2-40B4-BE49-F238E27FC236}">
-                <a16:creationId xmlns:a16="http://schemas.microsoft.com/office/drawing/2014/main" id="{40B7BDF7-6EDE-1FD7-BE01-05D3A80E542A}"/>
+                <a16:creationId xmlns:a16="http://schemas.microsoft.com/office/drawing/2014/main" id="{67FE441F-46D6-37C5-59B1-23F540F0D0B3}"/>
               </a:ext>
             </a:extLst>
           </p:cNvPr>
@@ -1030,7 +913,291 @@
             <a:spLocks noGrp="1"/>
           </p:cNvSpPr>
           <p:nvPr>
-            <p:ph type="body" idx="13"/>
+            <p:ph idx="1" hasCustomPrompt="1"/>
+          </p:nvPr>
+        </p:nvSpPr>
+        <p:spPr>
+          <a:xfrm>
+            <a:off x="312420" y="593766"/>
+            <a:ext cx="11567160" cy="5540704"/>
+          </a:xfrm>
+        </p:spPr>
+        <p:txBody>
+          <a:bodyPr>
+            <a:normAutofit/>
+          </a:bodyPr>
+          <a:lstStyle>
+            <a:lvl1pPr marL="342900" indent="-342900">
+              <a:lnSpc>
+                <a:spcPct val="150000"/>
+              </a:lnSpc>
+              <a:buFont typeface="+mj-lt"/>
+              <a:buAutoNum type="arabicPeriod"/>
+              <a:defRPr sz="1800">
+                <a:latin typeface="Meiryo UI" panose="020B0604030504040204" pitchFamily="34" charset="-128"/>
+                <a:ea typeface="Meiryo UI" panose="020B0604030504040204" pitchFamily="34" charset="-128"/>
+              </a:defRPr>
+            </a:lvl1pPr>
+            <a:lvl2pPr marL="800100" indent="-342900">
+              <a:lnSpc>
+                <a:spcPct val="150000"/>
+              </a:lnSpc>
+              <a:buFont typeface="+mj-lt"/>
+              <a:buAutoNum type="arabicPeriod"/>
+              <a:defRPr sz="1600">
+                <a:latin typeface="Meiryo UI" panose="020B0604030504040204" pitchFamily="34" charset="-128"/>
+                <a:ea typeface="Meiryo UI" panose="020B0604030504040204" pitchFamily="34" charset="-128"/>
+              </a:defRPr>
+            </a:lvl2pPr>
+            <a:lvl3pPr marL="1257300" indent="-342900">
+              <a:lnSpc>
+                <a:spcPct val="150000"/>
+              </a:lnSpc>
+              <a:buFont typeface="+mj-lt"/>
+              <a:buAutoNum type="arabicPeriod"/>
+              <a:defRPr sz="1400">
+                <a:latin typeface="Meiryo UI" panose="020B0604030504040204" pitchFamily="34" charset="-128"/>
+                <a:ea typeface="Meiryo UI" panose="020B0604030504040204" pitchFamily="34" charset="-128"/>
+              </a:defRPr>
+            </a:lvl3pPr>
+            <a:lvl4pPr>
+              <a:buFont typeface="+mj-lt"/>
+              <a:buAutoNum type="arabicPeriod"/>
+              <a:defRPr sz="1200">
+                <a:latin typeface="Meiryo UI" panose="020B0604030504040204" pitchFamily="34" charset="-128"/>
+                <a:ea typeface="Meiryo UI" panose="020B0604030504040204" pitchFamily="34" charset="-128"/>
+              </a:defRPr>
+            </a:lvl4pPr>
+            <a:lvl5pPr>
+              <a:buFont typeface="+mj-lt"/>
+              <a:buAutoNum type="arabicPeriod"/>
+              <a:defRPr sz="1200">
+                <a:latin typeface="Meiryo UI" panose="020B0604030504040204" pitchFamily="34" charset="-128"/>
+                <a:ea typeface="Meiryo UI" panose="020B0604030504040204" pitchFamily="34" charset="-128"/>
+              </a:defRPr>
+            </a:lvl5pPr>
+          </a:lstStyle>
+          <a:p>
+            <a:pPr lvl="0"/>
+            <a:r>
+              <a:rPr kumimoji="1" lang="ja-JP" altLang="en-US"/>
+              <a:t>目次</a:t>
+            </a:r>
+            <a:r>
+              <a:rPr kumimoji="1" lang="en-US" altLang="ja-JP" dirty="0"/>
+              <a:t>1</a:t>
+            </a:r>
+          </a:p>
+          <a:p>
+            <a:pPr lvl="0"/>
+            <a:r>
+              <a:rPr kumimoji="1" lang="ja-JP" altLang="en-US"/>
+              <a:t>目次</a:t>
+            </a:r>
+            <a:r>
+              <a:rPr kumimoji="1" lang="en-US" altLang="ja-JP" dirty="0"/>
+              <a:t>2</a:t>
+            </a:r>
+          </a:p>
+          <a:p>
+            <a:pPr lvl="1"/>
+            <a:r>
+              <a:rPr kumimoji="1" lang="ja-JP" altLang="en-US"/>
+              <a:t>目次</a:t>
+            </a:r>
+            <a:r>
+              <a:rPr kumimoji="1" lang="en-US" altLang="ja-JP" dirty="0"/>
+              <a:t>2-1</a:t>
+            </a:r>
+          </a:p>
+          <a:p>
+            <a:pPr lvl="1"/>
+            <a:r>
+              <a:rPr kumimoji="1" lang="ja-JP" altLang="en-US"/>
+              <a:t>目次</a:t>
+            </a:r>
+            <a:r>
+              <a:rPr kumimoji="1" lang="en-US" altLang="ja-JP" dirty="0"/>
+              <a:t>2-2</a:t>
+            </a:r>
+          </a:p>
+          <a:p>
+            <a:pPr lvl="2"/>
+            <a:r>
+              <a:rPr kumimoji="1" lang="ja-JP" altLang="en-US"/>
+              <a:t>目次</a:t>
+            </a:r>
+            <a:r>
+              <a:rPr kumimoji="1" lang="en-US" altLang="ja-JP" dirty="0"/>
+              <a:t>2-2-1</a:t>
+            </a:r>
+          </a:p>
+          <a:p>
+            <a:pPr lvl="2"/>
+            <a:r>
+              <a:rPr kumimoji="1" lang="ja-JP" altLang="en-US"/>
+              <a:t>目次</a:t>
+            </a:r>
+            <a:r>
+              <a:rPr kumimoji="1" lang="en-US" altLang="ja-JP" dirty="0"/>
+              <a:t>2-2-2</a:t>
+            </a:r>
+          </a:p>
+          <a:p>
+            <a:pPr lvl="0"/>
+            <a:endParaRPr kumimoji="1" lang="en-US" altLang="ja-JP" dirty="0"/>
+          </a:p>
+        </p:txBody>
+      </p:sp>
+      <p:sp>
+        <p:nvSpPr>
+          <p:cNvPr id="2" name="テキスト プレースホルダー 2">
+            <a:extLst>
+              <a:ext uri="{FF2B5EF4-FFF2-40B4-BE49-F238E27FC236}">
+                <a16:creationId xmlns:a16="http://schemas.microsoft.com/office/drawing/2014/main" id="{193080AA-BA6D-C778-7D2C-D016AE233690}"/>
+              </a:ext>
+            </a:extLst>
+          </p:cNvPr>
+          <p:cNvSpPr>
+            <a:spLocks noGrp="1"/>
+          </p:cNvSpPr>
+          <p:nvPr>
+            <p:ph type="body" idx="13" hasCustomPrompt="1"/>
+          </p:nvPr>
+        </p:nvSpPr>
+        <p:spPr>
+          <a:xfrm>
+            <a:off x="2017043" y="1229096"/>
+            <a:ext cx="4694586" cy="320634"/>
+          </a:xfrm>
+        </p:spPr>
+        <p:txBody>
+          <a:bodyPr>
+            <a:normAutofit/>
+          </a:bodyPr>
+          <a:lstStyle>
+            <a:lvl1pPr marL="0" indent="0">
+              <a:buNone/>
+              <a:defRPr sz="1800">
+                <a:solidFill>
+                  <a:srgbClr val="767676"/>
+                </a:solidFill>
+                <a:latin typeface="Meiryo UI" panose="020B0604030504040204" pitchFamily="34" charset="-128"/>
+                <a:ea typeface="Meiryo UI" panose="020B0604030504040204" pitchFamily="34" charset="-128"/>
+              </a:defRPr>
+            </a:lvl1pPr>
+            <a:lvl2pPr marL="457200" indent="0">
+              <a:buNone/>
+              <a:defRPr sz="2000">
+                <a:solidFill>
+                  <a:schemeClr val="tx1">
+                    <a:tint val="82000"/>
+                  </a:schemeClr>
+                </a:solidFill>
+              </a:defRPr>
+            </a:lvl2pPr>
+            <a:lvl3pPr marL="914400" indent="0">
+              <a:buNone/>
+              <a:defRPr sz="1800">
+                <a:solidFill>
+                  <a:schemeClr val="tx1">
+                    <a:tint val="82000"/>
+                  </a:schemeClr>
+                </a:solidFill>
+              </a:defRPr>
+            </a:lvl3pPr>
+            <a:lvl4pPr marL="1371600" indent="0">
+              <a:buNone/>
+              <a:defRPr sz="1600">
+                <a:solidFill>
+                  <a:schemeClr val="tx1">
+                    <a:tint val="82000"/>
+                  </a:schemeClr>
+                </a:solidFill>
+              </a:defRPr>
+            </a:lvl4pPr>
+            <a:lvl5pPr marL="1828800" indent="0">
+              <a:buNone/>
+              <a:defRPr sz="1600">
+                <a:solidFill>
+                  <a:schemeClr val="tx1">
+                    <a:tint val="82000"/>
+                  </a:schemeClr>
+                </a:solidFill>
+              </a:defRPr>
+            </a:lvl5pPr>
+            <a:lvl6pPr marL="2286000" indent="0">
+              <a:buNone/>
+              <a:defRPr sz="1600">
+                <a:solidFill>
+                  <a:schemeClr val="tx1">
+                    <a:tint val="82000"/>
+                  </a:schemeClr>
+                </a:solidFill>
+              </a:defRPr>
+            </a:lvl6pPr>
+            <a:lvl7pPr marL="2743200" indent="0">
+              <a:buNone/>
+              <a:defRPr sz="1600">
+                <a:solidFill>
+                  <a:schemeClr val="tx1">
+                    <a:tint val="82000"/>
+                  </a:schemeClr>
+                </a:solidFill>
+              </a:defRPr>
+            </a:lvl7pPr>
+            <a:lvl8pPr marL="3200400" indent="0">
+              <a:buNone/>
+              <a:defRPr sz="1600">
+                <a:solidFill>
+                  <a:schemeClr val="tx1">
+                    <a:tint val="82000"/>
+                  </a:schemeClr>
+                </a:solidFill>
+              </a:defRPr>
+            </a:lvl8pPr>
+            <a:lvl9pPr marL="3657600" indent="0">
+              <a:buNone/>
+              <a:defRPr sz="1600">
+                <a:solidFill>
+                  <a:schemeClr val="tx1">
+                    <a:tint val="82000"/>
+                  </a:schemeClr>
+                </a:solidFill>
+              </a:defRPr>
+            </a:lvl9pPr>
+          </a:lstStyle>
+          <a:p>
+            <a:pPr lvl="0"/>
+            <a:r>
+              <a:rPr kumimoji="1" lang="ja-JP" altLang="en-US"/>
+              <a:t>目次</a:t>
+            </a:r>
+            <a:r>
+              <a:rPr kumimoji="1" lang="en-US" altLang="ja-JP" dirty="0"/>
+              <a:t> </a:t>
+            </a:r>
+            <a:r>
+              <a:rPr kumimoji="1" lang="ja-JP" altLang="en-US"/>
+              <a:t>の書式設定</a:t>
+            </a:r>
+          </a:p>
+        </p:txBody>
+      </p:sp>
+      <p:sp>
+        <p:nvSpPr>
+          <p:cNvPr id="7" name="字幕 2">
+            <a:extLst>
+              <a:ext uri="{FF2B5EF4-FFF2-40B4-BE49-F238E27FC236}">
+                <a16:creationId xmlns:a16="http://schemas.microsoft.com/office/drawing/2014/main" id="{E2C3996E-840E-0D63-ADDD-8028F4E39F1F}"/>
+              </a:ext>
+            </a:extLst>
+          </p:cNvPr>
+          <p:cNvSpPr>
+            <a:spLocks noGrp="1"/>
+          </p:cNvSpPr>
+          <p:nvPr>
+            <p:ph type="subTitle" idx="15" hasCustomPrompt="1"/>
           </p:nvPr>
         </p:nvSpPr>
         <p:spPr>
@@ -1040,116 +1207,112 @@
           </a:xfrm>
         </p:spPr>
         <p:txBody>
-          <a:bodyPr>
+          <a:bodyPr anchor="b">
             <a:normAutofit/>
           </a:bodyPr>
           <a:lstStyle>
-            <a:lvl1pPr marL="0" indent="0">
+            <a:lvl1pPr marL="0" indent="0" algn="l">
               <a:buNone/>
               <a:defRPr sz="1800">
                 <a:solidFill>
-                  <a:schemeClr val="tx1">
-                    <a:tint val="82000"/>
-                  </a:schemeClr>
+                  <a:srgbClr val="767676"/>
                 </a:solidFill>
-                <a:latin typeface="Meiryo UI" panose="020B0604030504040204" pitchFamily="34" charset="-128"/>
-                <a:ea typeface="Meiryo UI" panose="020B0604030504040204" pitchFamily="34" charset="-128"/>
               </a:defRPr>
             </a:lvl1pPr>
-            <a:lvl2pPr marL="457200" indent="0">
-              <a:buNone/>
-              <a:defRPr sz="2000">
-                <a:solidFill>
-                  <a:schemeClr val="tx1">
-                    <a:tint val="82000"/>
-                  </a:schemeClr>
-                </a:solidFill>
-              </a:defRPr>
+            <a:lvl2pPr marL="457200" indent="0" algn="ctr">
+              <a:buNone/>
+              <a:defRPr sz="2000"/>
             </a:lvl2pPr>
-            <a:lvl3pPr marL="914400" indent="0">
-              <a:buNone/>
-              <a:defRPr sz="1800">
-                <a:solidFill>
-                  <a:schemeClr val="tx1">
-                    <a:tint val="82000"/>
-                  </a:schemeClr>
-                </a:solidFill>
-              </a:defRPr>
+            <a:lvl3pPr marL="914400" indent="0" algn="ctr">
+              <a:buNone/>
+              <a:defRPr sz="1800"/>
             </a:lvl3pPr>
-            <a:lvl4pPr marL="1371600" indent="0">
-              <a:buNone/>
-              <a:defRPr sz="1600">
-                <a:solidFill>
-                  <a:schemeClr val="tx1">
-                    <a:tint val="82000"/>
-                  </a:schemeClr>
-                </a:solidFill>
-              </a:defRPr>
+            <a:lvl4pPr marL="1371600" indent="0" algn="ctr">
+              <a:buNone/>
+              <a:defRPr sz="1600"/>
             </a:lvl4pPr>
-            <a:lvl5pPr marL="1828800" indent="0">
-              <a:buNone/>
-              <a:defRPr sz="1600">
-                <a:solidFill>
-                  <a:schemeClr val="tx1">
-                    <a:tint val="82000"/>
-                  </a:schemeClr>
-                </a:solidFill>
-              </a:defRPr>
+            <a:lvl5pPr marL="1828800" indent="0" algn="ctr">
+              <a:buNone/>
+              <a:defRPr sz="1600"/>
             </a:lvl5pPr>
-            <a:lvl6pPr marL="2286000" indent="0">
-              <a:buNone/>
-              <a:defRPr sz="1600">
-                <a:solidFill>
-                  <a:schemeClr val="tx1">
-                    <a:tint val="82000"/>
-                  </a:schemeClr>
-                </a:solidFill>
-              </a:defRPr>
+            <a:lvl6pPr marL="2286000" indent="0" algn="ctr">
+              <a:buNone/>
+              <a:defRPr sz="1600"/>
             </a:lvl6pPr>
-            <a:lvl7pPr marL="2743200" indent="0">
-              <a:buNone/>
-              <a:defRPr sz="1600">
-                <a:solidFill>
-                  <a:schemeClr val="tx1">
-                    <a:tint val="82000"/>
-                  </a:schemeClr>
-                </a:solidFill>
-              </a:defRPr>
+            <a:lvl7pPr marL="2743200" indent="0" algn="ctr">
+              <a:buNone/>
+              <a:defRPr sz="1600"/>
             </a:lvl7pPr>
-            <a:lvl8pPr marL="3200400" indent="0">
-              <a:buNone/>
-              <a:defRPr sz="1600">
-                <a:solidFill>
-                  <a:schemeClr val="tx1">
-                    <a:tint val="82000"/>
-                  </a:schemeClr>
-                </a:solidFill>
-              </a:defRPr>
+            <a:lvl8pPr marL="3200400" indent="0" algn="ctr">
+              <a:buNone/>
+              <a:defRPr sz="1600"/>
             </a:lvl8pPr>
-            <a:lvl9pPr marL="3657600" indent="0">
-              <a:buNone/>
-              <a:defRPr sz="1600">
-                <a:solidFill>
-                  <a:schemeClr val="tx1">
-                    <a:tint val="82000"/>
-                  </a:schemeClr>
-                </a:solidFill>
-              </a:defRPr>
+            <a:lvl9pPr marL="3657600" indent="0" algn="ctr">
+              <a:buNone/>
+              <a:defRPr sz="1600"/>
             </a:lvl9pPr>
           </a:lstStyle>
           <a:p>
             <a:pPr lvl="0"/>
             <a:r>
               <a:rPr kumimoji="1" lang="ja-JP" altLang="en-US"/>
-              <a:t>マスター テキストの書式設定</a:t>
-            </a:r>
+              <a:t>サブタイトル</a:t>
+            </a:r>
+            <a:r>
+              <a:rPr kumimoji="1" lang="en-US" altLang="ja-JP" dirty="0"/>
+              <a:t> </a:t>
+            </a:r>
+            <a:r>
+              <a:rPr kumimoji="1" lang="ja-JP" altLang="en-US"/>
+              <a:t>の書式設定</a:t>
+            </a:r>
+          </a:p>
+        </p:txBody>
+      </p:sp>
+      <p:sp>
+        <p:nvSpPr>
+          <p:cNvPr id="4" name="Logo">
+            <a:extLst>
+              <a:ext uri="{FF2B5EF4-FFF2-40B4-BE49-F238E27FC236}">
+                <a16:creationId xmlns:a16="http://schemas.microsoft.com/office/drawing/2014/main" id="{2574E9EA-BCA3-2FB2-1B75-DE58A3A28DF0}"/>
+              </a:ext>
+            </a:extLst>
+          </p:cNvPr>
+          <p:cNvSpPr>
+            <a:spLocks noGrp="1"/>
+          </p:cNvSpPr>
+          <p:nvPr>
+            <p:ph sz="quarter" idx="14" hasCustomPrompt="1"/>
+          </p:nvPr>
+        </p:nvSpPr>
+        <p:spPr>
+          <a:xfrm>
+            <a:off x="10965176" y="178130"/>
+            <a:ext cx="914400" cy="914400"/>
+          </a:xfrm>
+        </p:spPr>
+        <p:txBody>
+          <a:bodyPr/>
+          <a:lstStyle>
+            <a:lvl1pPr marL="0" indent="0">
+              <a:buNone/>
+              <a:defRPr/>
+            </a:lvl1pPr>
+          </a:lstStyle>
+          <a:p>
+            <a:pPr lvl="0"/>
+            <a:r>
+              <a:rPr kumimoji="1" lang="en-US" altLang="ja-JP" dirty="0"/>
+              <a:t>logo</a:t>
+            </a:r>
+            <a:endParaRPr kumimoji="1" lang="ja-JP" altLang="en-US"/>
           </a:p>
         </p:txBody>
       </p:sp>
     </p:spTree>
     <p:extLst>
       <p:ext uri="{BB962C8B-B14F-4D97-AF65-F5344CB8AC3E}">
-        <p14:creationId xmlns:p14="http://schemas.microsoft.com/office/powerpoint/2010/main" val="3983333325"/>
+        <p14:creationId xmlns:p14="http://schemas.microsoft.com/office/powerpoint/2010/main" val="1160662263"/>
       </p:ext>
     </p:extLst>
   </p:cSld>
@@ -1161,7 +1324,7 @@
 
 <file path=ppt/slideLayouts/slideLayout3.xml><?xml version="1.0" encoding="utf-8"?>
 <p:sldLayout xmlns:a="http://schemas.openxmlformats.org/drawingml/2006/main" xmlns:r="http://schemas.openxmlformats.org/officeDocument/2006/relationships" xmlns:p="http://schemas.openxmlformats.org/presentationml/2006/main" preserve="1" userDrawn="1">
-  <p:cSld name="1_コンテンツ">
+  <p:cSld name="One Column Detail">
     <p:spTree>
       <p:nvGrpSpPr>
         <p:cNvPr id="1" name=""/>
@@ -1213,7 +1376,7 @@
       </p:sp>
       <p:sp>
         <p:nvSpPr>
-          <p:cNvPr id="3" name="コンテンツ プレースホルダー 2">
+          <p:cNvPr id="3" name="Body">
             <a:extLst>
               <a:ext uri="{FF2B5EF4-FFF2-40B4-BE49-F238E27FC236}">
                 <a16:creationId xmlns:a16="http://schemas.microsoft.com/office/drawing/2014/main" id="{CE3F0D44-172A-CF1D-E1C1-730B2FD3226F}"/>
@@ -1227,12 +1390,7 @@
             <p:ph idx="1"/>
           </p:nvPr>
         </p:nvSpPr>
-        <p:spPr>
-          <a:xfrm>
-            <a:off x="312420" y="1591294"/>
-            <a:ext cx="5653374" cy="4585669"/>
-          </a:xfrm>
-        </p:spPr>
+        <p:spPr/>
         <p:txBody>
           <a:bodyPr>
             <a:normAutofit/>
@@ -1377,10 +1535,10 @@
       </p:sp>
       <p:sp>
         <p:nvSpPr>
-          <p:cNvPr id="4" name="コンテンツ プレースホルダー 2">
+          <p:cNvPr id="5" name="字幕 2">
             <a:extLst>
               <a:ext uri="{FF2B5EF4-FFF2-40B4-BE49-F238E27FC236}">
-                <a16:creationId xmlns:a16="http://schemas.microsoft.com/office/drawing/2014/main" id="{F8E60AB5-72BD-C2E5-C767-BC6D3DD300C1}"/>
+                <a16:creationId xmlns:a16="http://schemas.microsoft.com/office/drawing/2014/main" id="{BC739F27-A820-A358-F2A4-B0876CFE8CED}"/>
               </a:ext>
             </a:extLst>
           </p:cNvPr>
@@ -1388,134 +1546,7 @@
             <a:spLocks noGrp="1"/>
           </p:cNvSpPr>
           <p:nvPr>
-            <p:ph idx="14"/>
-          </p:nvPr>
-        </p:nvSpPr>
-        <p:spPr>
-          <a:xfrm>
-            <a:off x="6226206" y="1591293"/>
-            <a:ext cx="5653374" cy="4585669"/>
-          </a:xfrm>
-        </p:spPr>
-        <p:txBody>
-          <a:bodyPr>
-            <a:normAutofit/>
-          </a:bodyPr>
-          <a:lstStyle>
-            <a:lvl1pPr>
-              <a:defRPr sz="1800">
-                <a:latin typeface="Meiryo UI" panose="020B0604030504040204" pitchFamily="34" charset="-128"/>
-                <a:ea typeface="Meiryo UI" panose="020B0604030504040204" pitchFamily="34" charset="-128"/>
-              </a:defRPr>
-            </a:lvl1pPr>
-            <a:lvl2pPr>
-              <a:defRPr sz="1600">
-                <a:latin typeface="Meiryo UI" panose="020B0604030504040204" pitchFamily="34" charset="-128"/>
-                <a:ea typeface="Meiryo UI" panose="020B0604030504040204" pitchFamily="34" charset="-128"/>
-              </a:defRPr>
-            </a:lvl2pPr>
-            <a:lvl3pPr>
-              <a:defRPr sz="1400">
-                <a:latin typeface="Meiryo UI" panose="020B0604030504040204" pitchFamily="34" charset="-128"/>
-                <a:ea typeface="Meiryo UI" panose="020B0604030504040204" pitchFamily="34" charset="-128"/>
-              </a:defRPr>
-            </a:lvl3pPr>
-            <a:lvl4pPr>
-              <a:defRPr sz="1200">
-                <a:latin typeface="Meiryo UI" panose="020B0604030504040204" pitchFamily="34" charset="-128"/>
-                <a:ea typeface="Meiryo UI" panose="020B0604030504040204" pitchFamily="34" charset="-128"/>
-              </a:defRPr>
-            </a:lvl4pPr>
-            <a:lvl5pPr>
-              <a:defRPr sz="1200">
-                <a:latin typeface="Meiryo UI" panose="020B0604030504040204" pitchFamily="34" charset="-128"/>
-                <a:ea typeface="Meiryo UI" panose="020B0604030504040204" pitchFamily="34" charset="-128"/>
-              </a:defRPr>
-            </a:lvl5pPr>
-          </a:lstStyle>
-          <a:p>
-            <a:pPr lvl="0"/>
-            <a:r>
-              <a:rPr kumimoji="1" lang="ja-JP" altLang="en-US"/>
-              <a:t>マスター テキストの書式設定</a:t>
-            </a:r>
-          </a:p>
-          <a:p>
-            <a:pPr lvl="1"/>
-            <a:r>
-              <a:rPr kumimoji="1" lang="ja-JP" altLang="en-US"/>
-              <a:t>第 </a:t>
-            </a:r>
-            <a:r>
-              <a:rPr kumimoji="1" lang="en-US" altLang="ja-JP"/>
-              <a:t>2 </a:t>
-            </a:r>
-            <a:r>
-              <a:rPr kumimoji="1" lang="ja-JP" altLang="en-US"/>
-              <a:t>レベル</a:t>
-            </a:r>
-          </a:p>
-          <a:p>
-            <a:pPr lvl="2"/>
-            <a:r>
-              <a:rPr kumimoji="1" lang="ja-JP" altLang="en-US"/>
-              <a:t>第 </a:t>
-            </a:r>
-            <a:r>
-              <a:rPr kumimoji="1" lang="en-US" altLang="ja-JP"/>
-              <a:t>3 </a:t>
-            </a:r>
-            <a:r>
-              <a:rPr kumimoji="1" lang="ja-JP" altLang="en-US"/>
-              <a:t>レベル</a:t>
-            </a:r>
-          </a:p>
-          <a:p>
-            <a:pPr lvl="3"/>
-            <a:r>
-              <a:rPr kumimoji="1" lang="ja-JP" altLang="en-US"/>
-              <a:t>第 </a:t>
-            </a:r>
-            <a:r>
-              <a:rPr kumimoji="1" lang="en-US" altLang="ja-JP"/>
-              <a:t>4 </a:t>
-            </a:r>
-            <a:r>
-              <a:rPr kumimoji="1" lang="ja-JP" altLang="en-US"/>
-              <a:t>レベル</a:t>
-            </a:r>
-          </a:p>
-          <a:p>
-            <a:pPr lvl="4"/>
-            <a:r>
-              <a:rPr kumimoji="1" lang="ja-JP" altLang="en-US"/>
-              <a:t>第 </a:t>
-            </a:r>
-            <a:r>
-              <a:rPr kumimoji="1" lang="en-US" altLang="ja-JP"/>
-              <a:t>5 </a:t>
-            </a:r>
-            <a:r>
-              <a:rPr kumimoji="1" lang="ja-JP" altLang="en-US"/>
-              <a:t>レベル</a:t>
-            </a:r>
-          </a:p>
-        </p:txBody>
-      </p:sp>
-      <p:sp>
-        <p:nvSpPr>
-          <p:cNvPr id="5" name="テキスト プレースホルダー 2">
-            <a:extLst>
-              <a:ext uri="{FF2B5EF4-FFF2-40B4-BE49-F238E27FC236}">
-                <a16:creationId xmlns:a16="http://schemas.microsoft.com/office/drawing/2014/main" id="{74E956C9-F090-F685-3781-B5F10A85E325}"/>
-              </a:ext>
-            </a:extLst>
-          </p:cNvPr>
-          <p:cNvSpPr>
-            <a:spLocks noGrp="1"/>
-          </p:cNvSpPr>
-          <p:nvPr>
-            <p:ph type="body" idx="13"/>
+            <p:ph type="subTitle" idx="15" hasCustomPrompt="1"/>
           </p:nvPr>
         </p:nvSpPr>
         <p:spPr>
@@ -1525,116 +1556,112 @@
           </a:xfrm>
         </p:spPr>
         <p:txBody>
-          <a:bodyPr>
+          <a:bodyPr anchor="b">
             <a:normAutofit/>
           </a:bodyPr>
           <a:lstStyle>
-            <a:lvl1pPr marL="0" indent="0">
+            <a:lvl1pPr marL="0" indent="0" algn="l">
               <a:buNone/>
               <a:defRPr sz="1800">
                 <a:solidFill>
-                  <a:schemeClr val="tx1">
-                    <a:tint val="82000"/>
-                  </a:schemeClr>
+                  <a:srgbClr val="767676"/>
                 </a:solidFill>
-                <a:latin typeface="Meiryo UI" panose="020B0604030504040204" pitchFamily="34" charset="-128"/>
-                <a:ea typeface="Meiryo UI" panose="020B0604030504040204" pitchFamily="34" charset="-128"/>
               </a:defRPr>
             </a:lvl1pPr>
-            <a:lvl2pPr marL="457200" indent="0">
-              <a:buNone/>
-              <a:defRPr sz="2000">
-                <a:solidFill>
-                  <a:schemeClr val="tx1">
-                    <a:tint val="82000"/>
-                  </a:schemeClr>
-                </a:solidFill>
-              </a:defRPr>
+            <a:lvl2pPr marL="457200" indent="0" algn="ctr">
+              <a:buNone/>
+              <a:defRPr sz="2000"/>
             </a:lvl2pPr>
-            <a:lvl3pPr marL="914400" indent="0">
-              <a:buNone/>
-              <a:defRPr sz="1800">
-                <a:solidFill>
-                  <a:schemeClr val="tx1">
-                    <a:tint val="82000"/>
-                  </a:schemeClr>
-                </a:solidFill>
-              </a:defRPr>
+            <a:lvl3pPr marL="914400" indent="0" algn="ctr">
+              <a:buNone/>
+              <a:defRPr sz="1800"/>
             </a:lvl3pPr>
-            <a:lvl4pPr marL="1371600" indent="0">
-              <a:buNone/>
-              <a:defRPr sz="1600">
-                <a:solidFill>
-                  <a:schemeClr val="tx1">
-                    <a:tint val="82000"/>
-                  </a:schemeClr>
-                </a:solidFill>
-              </a:defRPr>
+            <a:lvl4pPr marL="1371600" indent="0" algn="ctr">
+              <a:buNone/>
+              <a:defRPr sz="1600"/>
             </a:lvl4pPr>
-            <a:lvl5pPr marL="1828800" indent="0">
-              <a:buNone/>
-              <a:defRPr sz="1600">
-                <a:solidFill>
-                  <a:schemeClr val="tx1">
-                    <a:tint val="82000"/>
-                  </a:schemeClr>
-                </a:solidFill>
-              </a:defRPr>
+            <a:lvl5pPr marL="1828800" indent="0" algn="ctr">
+              <a:buNone/>
+              <a:defRPr sz="1600"/>
             </a:lvl5pPr>
-            <a:lvl6pPr marL="2286000" indent="0">
-              <a:buNone/>
-              <a:defRPr sz="1600">
-                <a:solidFill>
-                  <a:schemeClr val="tx1">
-                    <a:tint val="82000"/>
-                  </a:schemeClr>
-                </a:solidFill>
-              </a:defRPr>
+            <a:lvl6pPr marL="2286000" indent="0" algn="ctr">
+              <a:buNone/>
+              <a:defRPr sz="1600"/>
             </a:lvl6pPr>
-            <a:lvl7pPr marL="2743200" indent="0">
-              <a:buNone/>
-              <a:defRPr sz="1600">
-                <a:solidFill>
-                  <a:schemeClr val="tx1">
-                    <a:tint val="82000"/>
-                  </a:schemeClr>
-                </a:solidFill>
-              </a:defRPr>
+            <a:lvl7pPr marL="2743200" indent="0" algn="ctr">
+              <a:buNone/>
+              <a:defRPr sz="1600"/>
             </a:lvl7pPr>
-            <a:lvl8pPr marL="3200400" indent="0">
-              <a:buNone/>
-              <a:defRPr sz="1600">
-                <a:solidFill>
-                  <a:schemeClr val="tx1">
-                    <a:tint val="82000"/>
-                  </a:schemeClr>
-                </a:solidFill>
-              </a:defRPr>
+            <a:lvl8pPr marL="3200400" indent="0" algn="ctr">
+              <a:buNone/>
+              <a:defRPr sz="1600"/>
             </a:lvl8pPr>
-            <a:lvl9pPr marL="3657600" indent="0">
-              <a:buNone/>
-              <a:defRPr sz="1600">
-                <a:solidFill>
-                  <a:schemeClr val="tx1">
-                    <a:tint val="82000"/>
-                  </a:schemeClr>
-                </a:solidFill>
-              </a:defRPr>
+            <a:lvl9pPr marL="3657600" indent="0" algn="ctr">
+              <a:buNone/>
+              <a:defRPr sz="1600"/>
             </a:lvl9pPr>
           </a:lstStyle>
           <a:p>
             <a:pPr lvl="0"/>
             <a:r>
               <a:rPr kumimoji="1" lang="ja-JP" altLang="en-US"/>
-              <a:t>マスター テキストの書式設定</a:t>
-            </a:r>
+              <a:t>サブタイトル</a:t>
+            </a:r>
+            <a:r>
+              <a:rPr kumimoji="1" lang="en-US" altLang="ja-JP" dirty="0"/>
+              <a:t> </a:t>
+            </a:r>
+            <a:r>
+              <a:rPr kumimoji="1" lang="ja-JP" altLang="en-US"/>
+              <a:t>の書式設定</a:t>
+            </a:r>
+          </a:p>
+        </p:txBody>
+      </p:sp>
+      <p:sp>
+        <p:nvSpPr>
+          <p:cNvPr id="4" name="Logo">
+            <a:extLst>
+              <a:ext uri="{FF2B5EF4-FFF2-40B4-BE49-F238E27FC236}">
+                <a16:creationId xmlns:a16="http://schemas.microsoft.com/office/drawing/2014/main" id="{C8B9E751-8D56-C809-58EB-50C7E7A35524}"/>
+              </a:ext>
+            </a:extLst>
+          </p:cNvPr>
+          <p:cNvSpPr>
+            <a:spLocks noGrp="1"/>
+          </p:cNvSpPr>
+          <p:nvPr>
+            <p:ph sz="quarter" idx="14" hasCustomPrompt="1"/>
+          </p:nvPr>
+        </p:nvSpPr>
+        <p:spPr>
+          <a:xfrm>
+            <a:off x="10965176" y="5262563"/>
+            <a:ext cx="914400" cy="914400"/>
+          </a:xfrm>
+        </p:spPr>
+        <p:txBody>
+          <a:bodyPr/>
+          <a:lstStyle>
+            <a:lvl1pPr marL="0" indent="0">
+              <a:buNone/>
+              <a:defRPr/>
+            </a:lvl1pPr>
+          </a:lstStyle>
+          <a:p>
+            <a:pPr lvl="0"/>
+            <a:r>
+              <a:rPr kumimoji="1" lang="en-US" altLang="ja-JP" dirty="0"/>
+              <a:t>logo</a:t>
+            </a:r>
+            <a:endParaRPr kumimoji="1" lang="ja-JP" altLang="en-US"/>
           </a:p>
         </p:txBody>
       </p:sp>
     </p:spTree>
     <p:extLst>
       <p:ext uri="{BB962C8B-B14F-4D97-AF65-F5344CB8AC3E}">
-        <p14:creationId xmlns:p14="http://schemas.microsoft.com/office/powerpoint/2010/main" val="3761077251"/>
+        <p14:creationId xmlns:p14="http://schemas.microsoft.com/office/powerpoint/2010/main" val="3983333325"/>
       </p:ext>
     </p:extLst>
   </p:cSld>
@@ -1646,7 +1673,7 @@
 
 <file path=ppt/slideLayouts/slideLayout4.xml><?xml version="1.0" encoding="utf-8"?>
 <p:sldLayout xmlns:a="http://schemas.openxmlformats.org/drawingml/2006/main" xmlns:r="http://schemas.openxmlformats.org/officeDocument/2006/relationships" xmlns:p="http://schemas.openxmlformats.org/presentationml/2006/main" preserve="1" userDrawn="1">
-  <p:cSld name="1_color">
+  <p:cSld name="Two Column Detail">
     <p:spTree>
       <p:nvGrpSpPr>
         <p:cNvPr id="1" name=""/>
@@ -1680,6 +1707,841 @@
         <p:spPr/>
         <p:txBody>
           <a:bodyPr/>
+          <a:lstStyle>
+            <a:lvl1pPr>
+              <a:defRPr>
+                <a:latin typeface="Meiryo UI" panose="020B0604030504040204" pitchFamily="34" charset="-128"/>
+                <a:ea typeface="Meiryo UI" panose="020B0604030504040204" pitchFamily="34" charset="-128"/>
+              </a:defRPr>
+            </a:lvl1pPr>
+          </a:lstStyle>
+          <a:p>
+            <a:r>
+              <a:rPr kumimoji="1" lang="ja-JP" altLang="en-US"/>
+              <a:t>マスター タイトルの書式設定</a:t>
+            </a:r>
+          </a:p>
+        </p:txBody>
+      </p:sp>
+      <p:sp>
+        <p:nvSpPr>
+          <p:cNvPr id="3" name="Body Left">
+            <a:extLst>
+              <a:ext uri="{FF2B5EF4-FFF2-40B4-BE49-F238E27FC236}">
+                <a16:creationId xmlns:a16="http://schemas.microsoft.com/office/drawing/2014/main" id="{CE3F0D44-172A-CF1D-E1C1-730B2FD3226F}"/>
+              </a:ext>
+            </a:extLst>
+          </p:cNvPr>
+          <p:cNvSpPr>
+            <a:spLocks noGrp="1"/>
+          </p:cNvSpPr>
+          <p:nvPr>
+            <p:ph idx="1"/>
+          </p:nvPr>
+        </p:nvSpPr>
+        <p:spPr>
+          <a:xfrm>
+            <a:off x="312420" y="1591294"/>
+            <a:ext cx="5653374" cy="4585669"/>
+          </a:xfrm>
+        </p:spPr>
+        <p:txBody>
+          <a:bodyPr>
+            <a:normAutofit/>
+          </a:bodyPr>
+          <a:lstStyle>
+            <a:lvl1pPr>
+              <a:defRPr sz="1800">
+                <a:latin typeface="Meiryo UI" panose="020B0604030504040204" pitchFamily="34" charset="-128"/>
+                <a:ea typeface="Meiryo UI" panose="020B0604030504040204" pitchFamily="34" charset="-128"/>
+              </a:defRPr>
+            </a:lvl1pPr>
+            <a:lvl2pPr>
+              <a:defRPr sz="1600">
+                <a:latin typeface="Meiryo UI" panose="020B0604030504040204" pitchFamily="34" charset="-128"/>
+                <a:ea typeface="Meiryo UI" panose="020B0604030504040204" pitchFamily="34" charset="-128"/>
+              </a:defRPr>
+            </a:lvl2pPr>
+            <a:lvl3pPr>
+              <a:defRPr sz="1400">
+                <a:latin typeface="Meiryo UI" panose="020B0604030504040204" pitchFamily="34" charset="-128"/>
+                <a:ea typeface="Meiryo UI" panose="020B0604030504040204" pitchFamily="34" charset="-128"/>
+              </a:defRPr>
+            </a:lvl3pPr>
+            <a:lvl4pPr>
+              <a:defRPr sz="1200">
+                <a:latin typeface="Meiryo UI" panose="020B0604030504040204" pitchFamily="34" charset="-128"/>
+                <a:ea typeface="Meiryo UI" panose="020B0604030504040204" pitchFamily="34" charset="-128"/>
+              </a:defRPr>
+            </a:lvl4pPr>
+            <a:lvl5pPr>
+              <a:defRPr sz="1200">
+                <a:latin typeface="Meiryo UI" panose="020B0604030504040204" pitchFamily="34" charset="-128"/>
+                <a:ea typeface="Meiryo UI" panose="020B0604030504040204" pitchFamily="34" charset="-128"/>
+              </a:defRPr>
+            </a:lvl5pPr>
+          </a:lstStyle>
+          <a:p>
+            <a:pPr lvl="0"/>
+            <a:r>
+              <a:rPr kumimoji="1" lang="ja-JP" altLang="en-US"/>
+              <a:t>マスター テキストの書式設定</a:t>
+            </a:r>
+          </a:p>
+          <a:p>
+            <a:pPr lvl="1"/>
+            <a:r>
+              <a:rPr kumimoji="1" lang="ja-JP" altLang="en-US"/>
+              <a:t>第 </a:t>
+            </a:r>
+            <a:r>
+              <a:rPr kumimoji="1" lang="en-US" altLang="ja-JP"/>
+              <a:t>2 </a:t>
+            </a:r>
+            <a:r>
+              <a:rPr kumimoji="1" lang="ja-JP" altLang="en-US"/>
+              <a:t>レベル</a:t>
+            </a:r>
+          </a:p>
+          <a:p>
+            <a:pPr lvl="2"/>
+            <a:r>
+              <a:rPr kumimoji="1" lang="ja-JP" altLang="en-US"/>
+              <a:t>第 </a:t>
+            </a:r>
+            <a:r>
+              <a:rPr kumimoji="1" lang="en-US" altLang="ja-JP"/>
+              <a:t>3 </a:t>
+            </a:r>
+            <a:r>
+              <a:rPr kumimoji="1" lang="ja-JP" altLang="en-US"/>
+              <a:t>レベル</a:t>
+            </a:r>
+          </a:p>
+          <a:p>
+            <a:pPr lvl="3"/>
+            <a:r>
+              <a:rPr kumimoji="1" lang="ja-JP" altLang="en-US"/>
+              <a:t>第 </a:t>
+            </a:r>
+            <a:r>
+              <a:rPr kumimoji="1" lang="en-US" altLang="ja-JP"/>
+              <a:t>4 </a:t>
+            </a:r>
+            <a:r>
+              <a:rPr kumimoji="1" lang="ja-JP" altLang="en-US"/>
+              <a:t>レベル</a:t>
+            </a:r>
+          </a:p>
+          <a:p>
+            <a:pPr lvl="4"/>
+            <a:r>
+              <a:rPr kumimoji="1" lang="ja-JP" altLang="en-US"/>
+              <a:t>第 </a:t>
+            </a:r>
+            <a:r>
+              <a:rPr kumimoji="1" lang="en-US" altLang="ja-JP"/>
+              <a:t>5 </a:t>
+            </a:r>
+            <a:r>
+              <a:rPr kumimoji="1" lang="ja-JP" altLang="en-US"/>
+              <a:t>レベル</a:t>
+            </a:r>
+          </a:p>
+        </p:txBody>
+      </p:sp>
+      <p:sp>
+        <p:nvSpPr>
+          <p:cNvPr id="6" name="スライド番号プレースホルダー 5">
+            <a:extLst>
+              <a:ext uri="{FF2B5EF4-FFF2-40B4-BE49-F238E27FC236}">
+                <a16:creationId xmlns:a16="http://schemas.microsoft.com/office/drawing/2014/main" id="{ED36DFD0-93B2-8751-F203-50EE02E97C4C}"/>
+              </a:ext>
+            </a:extLst>
+          </p:cNvPr>
+          <p:cNvSpPr>
+            <a:spLocks noGrp="1"/>
+          </p:cNvSpPr>
+          <p:nvPr>
+            <p:ph type="sldNum" sz="quarter" idx="12"/>
+          </p:nvPr>
+        </p:nvSpPr>
+        <p:spPr/>
+        <p:txBody>
+          <a:bodyPr/>
+          <a:lstStyle>
+            <a:lvl1pPr>
+              <a:defRPr>
+                <a:latin typeface="Meiryo UI" panose="020B0604030504040204" pitchFamily="34" charset="-128"/>
+                <a:ea typeface="Meiryo UI" panose="020B0604030504040204" pitchFamily="34" charset="-128"/>
+              </a:defRPr>
+            </a:lvl1pPr>
+          </a:lstStyle>
+          <a:p>
+            <a:fld id="{C9FB15DA-11C7-0141-B5F8-718388A4C1CD}" type="slidenum">
+              <a:rPr lang="ja-JP" altLang="en-US" smtClean="0"/>
+              <a:pPr/>
+              <a:t>‹#›</a:t>
+            </a:fld>
+            <a:endParaRPr lang="ja-JP" altLang="en-US"/>
+          </a:p>
+        </p:txBody>
+      </p:sp>
+      <p:sp>
+        <p:nvSpPr>
+          <p:cNvPr id="4" name="Body Right">
+            <a:extLst>
+              <a:ext uri="{FF2B5EF4-FFF2-40B4-BE49-F238E27FC236}">
+                <a16:creationId xmlns:a16="http://schemas.microsoft.com/office/drawing/2014/main" id="{F8E60AB5-72BD-C2E5-C767-BC6D3DD300C1}"/>
+              </a:ext>
+            </a:extLst>
+          </p:cNvPr>
+          <p:cNvSpPr>
+            <a:spLocks noGrp="1"/>
+          </p:cNvSpPr>
+          <p:nvPr>
+            <p:ph idx="14"/>
+          </p:nvPr>
+        </p:nvSpPr>
+        <p:spPr>
+          <a:xfrm>
+            <a:off x="6226206" y="1591293"/>
+            <a:ext cx="5653374" cy="4585669"/>
+          </a:xfrm>
+        </p:spPr>
+        <p:txBody>
+          <a:bodyPr>
+            <a:normAutofit/>
+          </a:bodyPr>
+          <a:lstStyle>
+            <a:lvl1pPr>
+              <a:defRPr sz="1800">
+                <a:latin typeface="Meiryo UI" panose="020B0604030504040204" pitchFamily="34" charset="-128"/>
+                <a:ea typeface="Meiryo UI" panose="020B0604030504040204" pitchFamily="34" charset="-128"/>
+              </a:defRPr>
+            </a:lvl1pPr>
+            <a:lvl2pPr>
+              <a:defRPr sz="1600">
+                <a:latin typeface="Meiryo UI" panose="020B0604030504040204" pitchFamily="34" charset="-128"/>
+                <a:ea typeface="Meiryo UI" panose="020B0604030504040204" pitchFamily="34" charset="-128"/>
+              </a:defRPr>
+            </a:lvl2pPr>
+            <a:lvl3pPr>
+              <a:defRPr sz="1400">
+                <a:latin typeface="Meiryo UI" panose="020B0604030504040204" pitchFamily="34" charset="-128"/>
+                <a:ea typeface="Meiryo UI" panose="020B0604030504040204" pitchFamily="34" charset="-128"/>
+              </a:defRPr>
+            </a:lvl3pPr>
+            <a:lvl4pPr>
+              <a:defRPr sz="1200">
+                <a:latin typeface="Meiryo UI" panose="020B0604030504040204" pitchFamily="34" charset="-128"/>
+                <a:ea typeface="Meiryo UI" panose="020B0604030504040204" pitchFamily="34" charset="-128"/>
+              </a:defRPr>
+            </a:lvl4pPr>
+            <a:lvl5pPr>
+              <a:defRPr sz="1200">
+                <a:latin typeface="Meiryo UI" panose="020B0604030504040204" pitchFamily="34" charset="-128"/>
+                <a:ea typeface="Meiryo UI" panose="020B0604030504040204" pitchFamily="34" charset="-128"/>
+              </a:defRPr>
+            </a:lvl5pPr>
+          </a:lstStyle>
+          <a:p>
+            <a:pPr lvl="0"/>
+            <a:r>
+              <a:rPr kumimoji="1" lang="ja-JP" altLang="en-US"/>
+              <a:t>マスター テキストの書式設定</a:t>
+            </a:r>
+          </a:p>
+          <a:p>
+            <a:pPr lvl="1"/>
+            <a:r>
+              <a:rPr kumimoji="1" lang="ja-JP" altLang="en-US"/>
+              <a:t>第 </a:t>
+            </a:r>
+            <a:r>
+              <a:rPr kumimoji="1" lang="en-US" altLang="ja-JP"/>
+              <a:t>2 </a:t>
+            </a:r>
+            <a:r>
+              <a:rPr kumimoji="1" lang="ja-JP" altLang="en-US"/>
+              <a:t>レベル</a:t>
+            </a:r>
+          </a:p>
+          <a:p>
+            <a:pPr lvl="2"/>
+            <a:r>
+              <a:rPr kumimoji="1" lang="ja-JP" altLang="en-US"/>
+              <a:t>第 </a:t>
+            </a:r>
+            <a:r>
+              <a:rPr kumimoji="1" lang="en-US" altLang="ja-JP"/>
+              <a:t>3 </a:t>
+            </a:r>
+            <a:r>
+              <a:rPr kumimoji="1" lang="ja-JP" altLang="en-US"/>
+              <a:t>レベル</a:t>
+            </a:r>
+          </a:p>
+          <a:p>
+            <a:pPr lvl="3"/>
+            <a:r>
+              <a:rPr kumimoji="1" lang="ja-JP" altLang="en-US"/>
+              <a:t>第 </a:t>
+            </a:r>
+            <a:r>
+              <a:rPr kumimoji="1" lang="en-US" altLang="ja-JP"/>
+              <a:t>4 </a:t>
+            </a:r>
+            <a:r>
+              <a:rPr kumimoji="1" lang="ja-JP" altLang="en-US"/>
+              <a:t>レベル</a:t>
+            </a:r>
+          </a:p>
+          <a:p>
+            <a:pPr lvl="4"/>
+            <a:r>
+              <a:rPr kumimoji="1" lang="ja-JP" altLang="en-US"/>
+              <a:t>第 </a:t>
+            </a:r>
+            <a:r>
+              <a:rPr kumimoji="1" lang="en-US" altLang="ja-JP"/>
+              <a:t>5 </a:t>
+            </a:r>
+            <a:r>
+              <a:rPr kumimoji="1" lang="ja-JP" altLang="en-US"/>
+              <a:t>レベル</a:t>
+            </a:r>
+          </a:p>
+        </p:txBody>
+      </p:sp>
+      <p:sp>
+        <p:nvSpPr>
+          <p:cNvPr id="7" name="字幕 2">
+            <a:extLst>
+              <a:ext uri="{FF2B5EF4-FFF2-40B4-BE49-F238E27FC236}">
+                <a16:creationId xmlns:a16="http://schemas.microsoft.com/office/drawing/2014/main" id="{1637E228-8434-900D-0254-AF837975524B}"/>
+              </a:ext>
+            </a:extLst>
+          </p:cNvPr>
+          <p:cNvSpPr>
+            <a:spLocks noGrp="1"/>
+          </p:cNvSpPr>
+          <p:nvPr>
+            <p:ph type="subTitle" idx="15" hasCustomPrompt="1"/>
+          </p:nvPr>
+        </p:nvSpPr>
+        <p:spPr>
+          <a:xfrm>
+            <a:off x="312420" y="0"/>
+            <a:ext cx="4694586" cy="320634"/>
+          </a:xfrm>
+        </p:spPr>
+        <p:txBody>
+          <a:bodyPr anchor="b">
+            <a:normAutofit/>
+          </a:bodyPr>
+          <a:lstStyle>
+            <a:lvl1pPr marL="0" indent="0" algn="l">
+              <a:buNone/>
+              <a:defRPr sz="1800">
+                <a:solidFill>
+                  <a:srgbClr val="767676"/>
+                </a:solidFill>
+              </a:defRPr>
+            </a:lvl1pPr>
+            <a:lvl2pPr marL="457200" indent="0" algn="ctr">
+              <a:buNone/>
+              <a:defRPr sz="2000"/>
+            </a:lvl2pPr>
+            <a:lvl3pPr marL="914400" indent="0" algn="ctr">
+              <a:buNone/>
+              <a:defRPr sz="1800"/>
+            </a:lvl3pPr>
+            <a:lvl4pPr marL="1371600" indent="0" algn="ctr">
+              <a:buNone/>
+              <a:defRPr sz="1600"/>
+            </a:lvl4pPr>
+            <a:lvl5pPr marL="1828800" indent="0" algn="ctr">
+              <a:buNone/>
+              <a:defRPr sz="1600"/>
+            </a:lvl5pPr>
+            <a:lvl6pPr marL="2286000" indent="0" algn="ctr">
+              <a:buNone/>
+              <a:defRPr sz="1600"/>
+            </a:lvl6pPr>
+            <a:lvl7pPr marL="2743200" indent="0" algn="ctr">
+              <a:buNone/>
+              <a:defRPr sz="1600"/>
+            </a:lvl7pPr>
+            <a:lvl8pPr marL="3200400" indent="0" algn="ctr">
+              <a:buNone/>
+              <a:defRPr sz="1600"/>
+            </a:lvl8pPr>
+            <a:lvl9pPr marL="3657600" indent="0" algn="ctr">
+              <a:buNone/>
+              <a:defRPr sz="1600"/>
+            </a:lvl9pPr>
+          </a:lstStyle>
+          <a:p>
+            <a:pPr lvl="0"/>
+            <a:r>
+              <a:rPr kumimoji="1" lang="ja-JP" altLang="en-US"/>
+              <a:t>サブタイトル</a:t>
+            </a:r>
+            <a:r>
+              <a:rPr kumimoji="1" lang="en-US" altLang="ja-JP" dirty="0"/>
+              <a:t> </a:t>
+            </a:r>
+            <a:r>
+              <a:rPr kumimoji="1" lang="ja-JP" altLang="en-US"/>
+              <a:t>の書式設定</a:t>
+            </a:r>
+          </a:p>
+        </p:txBody>
+      </p:sp>
+      <p:sp>
+        <p:nvSpPr>
+          <p:cNvPr id="5" name="Logo">
+            <a:extLst>
+              <a:ext uri="{FF2B5EF4-FFF2-40B4-BE49-F238E27FC236}">
+                <a16:creationId xmlns:a16="http://schemas.microsoft.com/office/drawing/2014/main" id="{4E369FD4-93A8-E2C2-D23D-495B39C171AF}"/>
+              </a:ext>
+            </a:extLst>
+          </p:cNvPr>
+          <p:cNvSpPr>
+            <a:spLocks noGrp="1"/>
+          </p:cNvSpPr>
+          <p:nvPr>
+            <p:ph sz="quarter" idx="16" hasCustomPrompt="1"/>
+          </p:nvPr>
+        </p:nvSpPr>
+        <p:spPr>
+          <a:xfrm>
+            <a:off x="10965176" y="5262563"/>
+            <a:ext cx="914400" cy="914400"/>
+          </a:xfrm>
+        </p:spPr>
+        <p:txBody>
+          <a:bodyPr/>
+          <a:lstStyle>
+            <a:lvl1pPr marL="0" indent="0">
+              <a:buNone/>
+              <a:defRPr/>
+            </a:lvl1pPr>
+          </a:lstStyle>
+          <a:p>
+            <a:pPr lvl="0"/>
+            <a:r>
+              <a:rPr kumimoji="1" lang="en-US" altLang="ja-JP" dirty="0"/>
+              <a:t>logo</a:t>
+            </a:r>
+            <a:endParaRPr kumimoji="1" lang="ja-JP" altLang="en-US"/>
+          </a:p>
+        </p:txBody>
+      </p:sp>
+    </p:spTree>
+    <p:extLst>
+      <p:ext uri="{BB962C8B-B14F-4D97-AF65-F5344CB8AC3E}">
+        <p14:creationId xmlns:p14="http://schemas.microsoft.com/office/powerpoint/2010/main" val="3761077251"/>
+      </p:ext>
+    </p:extLst>
+  </p:cSld>
+  <p:clrMapOvr>
+    <a:masterClrMapping/>
+  </p:clrMapOvr>
+</p:sldLayout>
+</file>
+
+<file path=ppt/slideLayouts/slideLayout5.xml><?xml version="1.0" encoding="utf-8"?>
+<p:sldLayout xmlns:a="http://schemas.openxmlformats.org/drawingml/2006/main" xmlns:r="http://schemas.openxmlformats.org/officeDocument/2006/relationships" xmlns:p="http://schemas.openxmlformats.org/presentationml/2006/main" preserve="1" userDrawn="1">
+  <p:cSld name="Closing">
+    <p:spTree>
+      <p:nvGrpSpPr>
+        <p:cNvPr id="1" name=""/>
+        <p:cNvGrpSpPr/>
+        <p:nvPr/>
+      </p:nvGrpSpPr>
+      <p:grpSpPr>
+        <a:xfrm>
+          <a:off x="0" y="0"/>
+          <a:ext cx="0" cy="0"/>
+          <a:chOff x="0" y="0"/>
+          <a:chExt cx="0" cy="0"/>
+        </a:xfrm>
+      </p:grpSpPr>
+      <p:sp>
+        <p:nvSpPr>
+          <p:cNvPr id="2" name="タイトル 1">
+            <a:extLst>
+              <a:ext uri="{FF2B5EF4-FFF2-40B4-BE49-F238E27FC236}">
+                <a16:creationId xmlns:a16="http://schemas.microsoft.com/office/drawing/2014/main" id="{1C878911-0E99-4C7F-A17C-E4C6E06AD3EB}"/>
+              </a:ext>
+            </a:extLst>
+          </p:cNvPr>
+          <p:cNvSpPr>
+            <a:spLocks noGrp="1"/>
+          </p:cNvSpPr>
+          <p:nvPr>
+            <p:ph type="title"/>
+          </p:nvPr>
+        </p:nvSpPr>
+        <p:spPr/>
+        <p:txBody>
+          <a:bodyPr/>
+          <a:lstStyle>
+            <a:lvl1pPr>
+              <a:defRPr>
+                <a:latin typeface="Meiryo UI" panose="020B0604030504040204" pitchFamily="34" charset="-128"/>
+                <a:ea typeface="Meiryo UI" panose="020B0604030504040204" pitchFamily="34" charset="-128"/>
+              </a:defRPr>
+            </a:lvl1pPr>
+          </a:lstStyle>
+          <a:p>
+            <a:r>
+              <a:rPr kumimoji="1" lang="ja-JP" altLang="en-US"/>
+              <a:t>マスター タイトルの書式設定</a:t>
+            </a:r>
+          </a:p>
+        </p:txBody>
+      </p:sp>
+      <p:sp>
+        <p:nvSpPr>
+          <p:cNvPr id="3" name="Body">
+            <a:extLst>
+              <a:ext uri="{FF2B5EF4-FFF2-40B4-BE49-F238E27FC236}">
+                <a16:creationId xmlns:a16="http://schemas.microsoft.com/office/drawing/2014/main" id="{CE3F0D44-172A-CF1D-E1C1-730B2FD3226F}"/>
+              </a:ext>
+            </a:extLst>
+          </p:cNvPr>
+          <p:cNvSpPr>
+            <a:spLocks noGrp="1"/>
+          </p:cNvSpPr>
+          <p:nvPr>
+            <p:ph idx="1"/>
+          </p:nvPr>
+        </p:nvSpPr>
+        <p:spPr>
+          <a:xfrm>
+            <a:off x="312420" y="1591294"/>
+            <a:ext cx="11567160" cy="4585669"/>
+          </a:xfrm>
+        </p:spPr>
+        <p:txBody>
+          <a:bodyPr>
+            <a:normAutofit/>
+          </a:bodyPr>
+          <a:lstStyle>
+            <a:lvl1pPr>
+              <a:defRPr sz="1800">
+                <a:latin typeface="Meiryo UI" panose="020B0604030504040204" pitchFamily="34" charset="-128"/>
+                <a:ea typeface="Meiryo UI" panose="020B0604030504040204" pitchFamily="34" charset="-128"/>
+              </a:defRPr>
+            </a:lvl1pPr>
+            <a:lvl2pPr>
+              <a:defRPr sz="1600">
+                <a:latin typeface="Meiryo UI" panose="020B0604030504040204" pitchFamily="34" charset="-128"/>
+                <a:ea typeface="Meiryo UI" panose="020B0604030504040204" pitchFamily="34" charset="-128"/>
+              </a:defRPr>
+            </a:lvl2pPr>
+            <a:lvl3pPr>
+              <a:defRPr sz="1400">
+                <a:latin typeface="Meiryo UI" panose="020B0604030504040204" pitchFamily="34" charset="-128"/>
+                <a:ea typeface="Meiryo UI" panose="020B0604030504040204" pitchFamily="34" charset="-128"/>
+              </a:defRPr>
+            </a:lvl3pPr>
+            <a:lvl4pPr>
+              <a:defRPr sz="1200">
+                <a:latin typeface="Meiryo UI" panose="020B0604030504040204" pitchFamily="34" charset="-128"/>
+                <a:ea typeface="Meiryo UI" panose="020B0604030504040204" pitchFamily="34" charset="-128"/>
+              </a:defRPr>
+            </a:lvl4pPr>
+            <a:lvl5pPr>
+              <a:defRPr sz="1200">
+                <a:latin typeface="Meiryo UI" panose="020B0604030504040204" pitchFamily="34" charset="-128"/>
+                <a:ea typeface="Meiryo UI" panose="020B0604030504040204" pitchFamily="34" charset="-128"/>
+              </a:defRPr>
+            </a:lvl5pPr>
+          </a:lstStyle>
+          <a:p>
+            <a:pPr lvl="0"/>
+            <a:r>
+              <a:rPr kumimoji="1" lang="ja-JP" altLang="en-US"/>
+              <a:t>マスター テキストの書式設定</a:t>
+            </a:r>
+          </a:p>
+          <a:p>
+            <a:pPr lvl="1"/>
+            <a:r>
+              <a:rPr kumimoji="1" lang="ja-JP" altLang="en-US"/>
+              <a:t>第 </a:t>
+            </a:r>
+            <a:r>
+              <a:rPr kumimoji="1" lang="en-US" altLang="ja-JP"/>
+              <a:t>2 </a:t>
+            </a:r>
+            <a:r>
+              <a:rPr kumimoji="1" lang="ja-JP" altLang="en-US"/>
+              <a:t>レベル</a:t>
+            </a:r>
+          </a:p>
+          <a:p>
+            <a:pPr lvl="2"/>
+            <a:r>
+              <a:rPr kumimoji="1" lang="ja-JP" altLang="en-US"/>
+              <a:t>第 </a:t>
+            </a:r>
+            <a:r>
+              <a:rPr kumimoji="1" lang="en-US" altLang="ja-JP"/>
+              <a:t>3 </a:t>
+            </a:r>
+            <a:r>
+              <a:rPr kumimoji="1" lang="ja-JP" altLang="en-US"/>
+              <a:t>レベル</a:t>
+            </a:r>
+          </a:p>
+          <a:p>
+            <a:pPr lvl="3"/>
+            <a:r>
+              <a:rPr kumimoji="1" lang="ja-JP" altLang="en-US"/>
+              <a:t>第 </a:t>
+            </a:r>
+            <a:r>
+              <a:rPr kumimoji="1" lang="en-US" altLang="ja-JP"/>
+              <a:t>4 </a:t>
+            </a:r>
+            <a:r>
+              <a:rPr kumimoji="1" lang="ja-JP" altLang="en-US"/>
+              <a:t>レベル</a:t>
+            </a:r>
+          </a:p>
+          <a:p>
+            <a:pPr lvl="4"/>
+            <a:r>
+              <a:rPr kumimoji="1" lang="ja-JP" altLang="en-US"/>
+              <a:t>第 </a:t>
+            </a:r>
+            <a:r>
+              <a:rPr kumimoji="1" lang="en-US" altLang="ja-JP"/>
+              <a:t>5 </a:t>
+            </a:r>
+            <a:r>
+              <a:rPr kumimoji="1" lang="ja-JP" altLang="en-US"/>
+              <a:t>レベル</a:t>
+            </a:r>
+          </a:p>
+        </p:txBody>
+      </p:sp>
+      <p:sp>
+        <p:nvSpPr>
+          <p:cNvPr id="6" name="スライド番号プレースホルダー 5">
+            <a:extLst>
+              <a:ext uri="{FF2B5EF4-FFF2-40B4-BE49-F238E27FC236}">
+                <a16:creationId xmlns:a16="http://schemas.microsoft.com/office/drawing/2014/main" id="{ED36DFD0-93B2-8751-F203-50EE02E97C4C}"/>
+              </a:ext>
+            </a:extLst>
+          </p:cNvPr>
+          <p:cNvSpPr>
+            <a:spLocks noGrp="1"/>
+          </p:cNvSpPr>
+          <p:nvPr>
+            <p:ph type="sldNum" sz="quarter" idx="12"/>
+          </p:nvPr>
+        </p:nvSpPr>
+        <p:spPr/>
+        <p:txBody>
+          <a:bodyPr/>
+          <a:lstStyle>
+            <a:lvl1pPr>
+              <a:defRPr>
+                <a:latin typeface="Meiryo UI" panose="020B0604030504040204" pitchFamily="34" charset="-128"/>
+                <a:ea typeface="Meiryo UI" panose="020B0604030504040204" pitchFamily="34" charset="-128"/>
+              </a:defRPr>
+            </a:lvl1pPr>
+          </a:lstStyle>
+          <a:p>
+            <a:fld id="{C9FB15DA-11C7-0141-B5F8-718388A4C1CD}" type="slidenum">
+              <a:rPr lang="ja-JP" altLang="en-US" smtClean="0"/>
+              <a:pPr/>
+              <a:t>‹#›</a:t>
+            </a:fld>
+            <a:endParaRPr lang="ja-JP" altLang="en-US"/>
+          </a:p>
+        </p:txBody>
+      </p:sp>
+      <p:sp>
+        <p:nvSpPr>
+          <p:cNvPr id="4" name="字幕 2">
+            <a:extLst>
+              <a:ext uri="{FF2B5EF4-FFF2-40B4-BE49-F238E27FC236}">
+                <a16:creationId xmlns:a16="http://schemas.microsoft.com/office/drawing/2014/main" id="{2238D88A-EC8C-13E2-E5D1-E68433D47AB0}"/>
+              </a:ext>
+            </a:extLst>
+          </p:cNvPr>
+          <p:cNvSpPr>
+            <a:spLocks noGrp="1"/>
+          </p:cNvSpPr>
+          <p:nvPr>
+            <p:ph type="subTitle" idx="16" hasCustomPrompt="1"/>
+          </p:nvPr>
+        </p:nvSpPr>
+        <p:spPr>
+          <a:xfrm>
+            <a:off x="312420" y="0"/>
+            <a:ext cx="4694586" cy="320634"/>
+          </a:xfrm>
+        </p:spPr>
+        <p:txBody>
+          <a:bodyPr anchor="b">
+            <a:normAutofit/>
+          </a:bodyPr>
+          <a:lstStyle>
+            <a:lvl1pPr marL="0" indent="0" algn="l">
+              <a:buNone/>
+              <a:defRPr sz="1800">
+                <a:solidFill>
+                  <a:srgbClr val="767676"/>
+                </a:solidFill>
+              </a:defRPr>
+            </a:lvl1pPr>
+            <a:lvl2pPr marL="457200" indent="0" algn="ctr">
+              <a:buNone/>
+              <a:defRPr sz="2000"/>
+            </a:lvl2pPr>
+            <a:lvl3pPr marL="914400" indent="0" algn="ctr">
+              <a:buNone/>
+              <a:defRPr sz="1800"/>
+            </a:lvl3pPr>
+            <a:lvl4pPr marL="1371600" indent="0" algn="ctr">
+              <a:buNone/>
+              <a:defRPr sz="1600"/>
+            </a:lvl4pPr>
+            <a:lvl5pPr marL="1828800" indent="0" algn="ctr">
+              <a:buNone/>
+              <a:defRPr sz="1600"/>
+            </a:lvl5pPr>
+            <a:lvl6pPr marL="2286000" indent="0" algn="ctr">
+              <a:buNone/>
+              <a:defRPr sz="1600"/>
+            </a:lvl6pPr>
+            <a:lvl7pPr marL="2743200" indent="0" algn="ctr">
+              <a:buNone/>
+              <a:defRPr sz="1600"/>
+            </a:lvl7pPr>
+            <a:lvl8pPr marL="3200400" indent="0" algn="ctr">
+              <a:buNone/>
+              <a:defRPr sz="1600"/>
+            </a:lvl8pPr>
+            <a:lvl9pPr marL="3657600" indent="0" algn="ctr">
+              <a:buNone/>
+              <a:defRPr sz="1600"/>
+            </a:lvl9pPr>
+          </a:lstStyle>
+          <a:p>
+            <a:pPr lvl="0"/>
+            <a:r>
+              <a:rPr kumimoji="1" lang="ja-JP" altLang="en-US"/>
+              <a:t>サブタイトル</a:t>
+            </a:r>
+            <a:r>
+              <a:rPr kumimoji="1" lang="en-US" altLang="ja-JP" dirty="0"/>
+              <a:t> </a:t>
+            </a:r>
+            <a:r>
+              <a:rPr kumimoji="1" lang="ja-JP" altLang="en-US"/>
+              <a:t>の書式設定</a:t>
+            </a:r>
+          </a:p>
+        </p:txBody>
+      </p:sp>
+      <p:sp>
+        <p:nvSpPr>
+          <p:cNvPr id="7" name="Logo">
+            <a:extLst>
+              <a:ext uri="{FF2B5EF4-FFF2-40B4-BE49-F238E27FC236}">
+                <a16:creationId xmlns:a16="http://schemas.microsoft.com/office/drawing/2014/main" id="{E016B53F-B8D3-0D88-2D0A-C239AE719669}"/>
+              </a:ext>
+            </a:extLst>
+          </p:cNvPr>
+          <p:cNvSpPr>
+            <a:spLocks noGrp="1"/>
+          </p:cNvSpPr>
+          <p:nvPr>
+            <p:ph sz="quarter" idx="14" hasCustomPrompt="1"/>
+          </p:nvPr>
+        </p:nvSpPr>
+        <p:spPr>
+          <a:xfrm>
+            <a:off x="10965176" y="5262563"/>
+            <a:ext cx="914400" cy="914400"/>
+          </a:xfrm>
+        </p:spPr>
+        <p:txBody>
+          <a:bodyPr/>
+          <a:lstStyle>
+            <a:lvl1pPr marL="0" indent="0">
+              <a:buNone/>
+              <a:defRPr/>
+            </a:lvl1pPr>
+          </a:lstStyle>
+          <a:p>
+            <a:pPr lvl="0"/>
+            <a:r>
+              <a:rPr kumimoji="1" lang="en-US" altLang="ja-JP" dirty="0"/>
+              <a:t>logo</a:t>
+            </a:r>
+            <a:endParaRPr kumimoji="1" lang="ja-JP" altLang="en-US"/>
+          </a:p>
+        </p:txBody>
+      </p:sp>
+    </p:spTree>
+    <p:extLst>
+      <p:ext uri="{BB962C8B-B14F-4D97-AF65-F5344CB8AC3E}">
+        <p14:creationId xmlns:p14="http://schemas.microsoft.com/office/powerpoint/2010/main" val="1313070591"/>
+      </p:ext>
+    </p:extLst>
+  </p:cSld>
+  <p:clrMapOvr>
+    <a:masterClrMapping/>
+  </p:clrMapOvr>
+</p:sldLayout>
+</file>
+
+<file path=ppt/slideLayouts/slideLayout6.xml><?xml version="1.0" encoding="utf-8"?>
+<p:sldLayout xmlns:a="http://schemas.openxmlformats.org/drawingml/2006/main" xmlns:r="http://schemas.openxmlformats.org/officeDocument/2006/relationships" xmlns:p="http://schemas.openxmlformats.org/presentationml/2006/main" preserve="1" userDrawn="1">
+  <p:cSld name="_bk">
+    <p:spTree>
+      <p:nvGrpSpPr>
+        <p:cNvPr id="1" name=""/>
+        <p:cNvGrpSpPr/>
+        <p:nvPr/>
+      </p:nvGrpSpPr>
+      <p:grpSpPr>
+        <a:xfrm>
+          <a:off x="0" y="0"/>
+          <a:ext cx="0" cy="0"/>
+          <a:chOff x="0" y="0"/>
+          <a:chExt cx="0" cy="0"/>
+        </a:xfrm>
+      </p:grpSpPr>
+      <p:sp>
+        <p:nvSpPr>
+          <p:cNvPr id="2" name="タイトル 1">
+            <a:extLst>
+              <a:ext uri="{FF2B5EF4-FFF2-40B4-BE49-F238E27FC236}">
+                <a16:creationId xmlns:a16="http://schemas.microsoft.com/office/drawing/2014/main" id="{1C878911-0E99-4C7F-A17C-E4C6E06AD3EB}"/>
+              </a:ext>
+            </a:extLst>
+          </p:cNvPr>
+          <p:cNvSpPr>
+            <a:spLocks noGrp="1"/>
+          </p:cNvSpPr>
+          <p:nvPr>
+            <p:ph type="title"/>
+          </p:nvPr>
+        </p:nvSpPr>
+        <p:spPr/>
+        <p:txBody>
+          <a:bodyPr/>
           <a:lstStyle/>
           <a:p>
             <a:r>
@@ -2021,10 +2883,10 @@
       </p:sp>
       <p:sp>
         <p:nvSpPr>
-          <p:cNvPr id="10" name="テキスト プレースホルダー 2">
+          <p:cNvPr id="7" name="字幕 2">
             <a:extLst>
               <a:ext uri="{FF2B5EF4-FFF2-40B4-BE49-F238E27FC236}">
-                <a16:creationId xmlns:a16="http://schemas.microsoft.com/office/drawing/2014/main" id="{DE1636C1-00D4-4103-3E74-73A327AD6CE5}"/>
+                <a16:creationId xmlns:a16="http://schemas.microsoft.com/office/drawing/2014/main" id="{BBCFCD4E-923C-D79E-C6C6-9C46247B1AFC}"/>
               </a:ext>
             </a:extLst>
           </p:cNvPr>
@@ -2032,7 +2894,7 @@
             <a:spLocks noGrp="1"/>
           </p:cNvSpPr>
           <p:nvPr>
-            <p:ph type="body" idx="13"/>
+            <p:ph type="subTitle" idx="15" hasCustomPrompt="1"/>
           </p:nvPr>
         </p:nvSpPr>
         <p:spPr>
@@ -2042,108 +2904,64 @@
           </a:xfrm>
         </p:spPr>
         <p:txBody>
-          <a:bodyPr>
+          <a:bodyPr anchor="b">
             <a:normAutofit/>
           </a:bodyPr>
           <a:lstStyle>
-            <a:lvl1pPr marL="0" indent="0">
+            <a:lvl1pPr marL="0" indent="0" algn="l">
               <a:buNone/>
               <a:defRPr sz="1800">
                 <a:solidFill>
-                  <a:schemeClr val="tx1">
-                    <a:tint val="82000"/>
-                  </a:schemeClr>
+                  <a:srgbClr val="767676"/>
                 </a:solidFill>
-                <a:latin typeface="Meiryo UI" panose="020B0604030504040204" pitchFamily="34" charset="-128"/>
-                <a:ea typeface="Meiryo UI" panose="020B0604030504040204" pitchFamily="34" charset="-128"/>
               </a:defRPr>
             </a:lvl1pPr>
-            <a:lvl2pPr marL="457200" indent="0">
-              <a:buNone/>
-              <a:defRPr sz="2000">
-                <a:solidFill>
-                  <a:schemeClr val="tx1">
-                    <a:tint val="82000"/>
-                  </a:schemeClr>
-                </a:solidFill>
-              </a:defRPr>
+            <a:lvl2pPr marL="457200" indent="0" algn="ctr">
+              <a:buNone/>
+              <a:defRPr sz="2000"/>
             </a:lvl2pPr>
-            <a:lvl3pPr marL="914400" indent="0">
-              <a:buNone/>
-              <a:defRPr sz="1800">
-                <a:solidFill>
-                  <a:schemeClr val="tx1">
-                    <a:tint val="82000"/>
-                  </a:schemeClr>
-                </a:solidFill>
-              </a:defRPr>
+            <a:lvl3pPr marL="914400" indent="0" algn="ctr">
+              <a:buNone/>
+              <a:defRPr sz="1800"/>
             </a:lvl3pPr>
-            <a:lvl4pPr marL="1371600" indent="0">
-              <a:buNone/>
-              <a:defRPr sz="1600">
-                <a:solidFill>
-                  <a:schemeClr val="tx1">
-                    <a:tint val="82000"/>
-                  </a:schemeClr>
-                </a:solidFill>
-              </a:defRPr>
+            <a:lvl4pPr marL="1371600" indent="0" algn="ctr">
+              <a:buNone/>
+              <a:defRPr sz="1600"/>
             </a:lvl4pPr>
-            <a:lvl5pPr marL="1828800" indent="0">
-              <a:buNone/>
-              <a:defRPr sz="1600">
-                <a:solidFill>
-                  <a:schemeClr val="tx1">
-                    <a:tint val="82000"/>
-                  </a:schemeClr>
-                </a:solidFill>
-              </a:defRPr>
+            <a:lvl5pPr marL="1828800" indent="0" algn="ctr">
+              <a:buNone/>
+              <a:defRPr sz="1600"/>
             </a:lvl5pPr>
-            <a:lvl6pPr marL="2286000" indent="0">
-              <a:buNone/>
-              <a:defRPr sz="1600">
-                <a:solidFill>
-                  <a:schemeClr val="tx1">
-                    <a:tint val="82000"/>
-                  </a:schemeClr>
-                </a:solidFill>
-              </a:defRPr>
+            <a:lvl6pPr marL="2286000" indent="0" algn="ctr">
+              <a:buNone/>
+              <a:defRPr sz="1600"/>
             </a:lvl6pPr>
-            <a:lvl7pPr marL="2743200" indent="0">
-              <a:buNone/>
-              <a:defRPr sz="1600">
-                <a:solidFill>
-                  <a:schemeClr val="tx1">
-                    <a:tint val="82000"/>
-                  </a:schemeClr>
-                </a:solidFill>
-              </a:defRPr>
+            <a:lvl7pPr marL="2743200" indent="0" algn="ctr">
+              <a:buNone/>
+              <a:defRPr sz="1600"/>
             </a:lvl7pPr>
-            <a:lvl8pPr marL="3200400" indent="0">
-              <a:buNone/>
-              <a:defRPr sz="1600">
-                <a:solidFill>
-                  <a:schemeClr val="tx1">
-                    <a:tint val="82000"/>
-                  </a:schemeClr>
-                </a:solidFill>
-              </a:defRPr>
+            <a:lvl8pPr marL="3200400" indent="0" algn="ctr">
+              <a:buNone/>
+              <a:defRPr sz="1600"/>
             </a:lvl8pPr>
-            <a:lvl9pPr marL="3657600" indent="0">
-              <a:buNone/>
-              <a:defRPr sz="1600">
-                <a:solidFill>
-                  <a:schemeClr val="tx1">
-                    <a:tint val="82000"/>
-                  </a:schemeClr>
-                </a:solidFill>
-              </a:defRPr>
+            <a:lvl9pPr marL="3657600" indent="0" algn="ctr">
+              <a:buNone/>
+              <a:defRPr sz="1600"/>
             </a:lvl9pPr>
           </a:lstStyle>
           <a:p>
             <a:pPr lvl="0"/>
             <a:r>
               <a:rPr kumimoji="1" lang="ja-JP" altLang="en-US"/>
-              <a:t>マスター テキストの書式設定</a:t>
+              <a:t>サブタイトル</a:t>
+            </a:r>
+            <a:r>
+              <a:rPr kumimoji="1" lang="en-US" altLang="ja-JP" dirty="0"/>
+              <a:t> </a:t>
+            </a:r>
+            <a:r>
+              <a:rPr kumimoji="1" lang="ja-JP" altLang="en-US"/>
+              <a:t>の書式設定</a:t>
             </a:r>
           </a:p>
         </p:txBody>
@@ -2152,359 +2970,6 @@
     <p:extLst>
       <p:ext uri="{BB962C8B-B14F-4D97-AF65-F5344CB8AC3E}">
         <p14:creationId xmlns:p14="http://schemas.microsoft.com/office/powerpoint/2010/main" val="2005540275"/>
-      </p:ext>
-    </p:extLst>
-  </p:cSld>
-  <p:clrMapOvr>
-    <a:masterClrMapping/>
-  </p:clrMapOvr>
-</p:sldLayout>
-</file>
-
-<file path=ppt/slideLayouts/slideLayout5.xml><?xml version="1.0" encoding="utf-8"?>
-<p:sldLayout xmlns:a="http://schemas.openxmlformats.org/drawingml/2006/main" xmlns:r="http://schemas.openxmlformats.org/officeDocument/2006/relationships" xmlns:p="http://schemas.openxmlformats.org/presentationml/2006/main" preserve="1" userDrawn="1">
-  <p:cSld name="目次">
-    <p:spTree>
-      <p:nvGrpSpPr>
-        <p:cNvPr id="1" name=""/>
-        <p:cNvGrpSpPr/>
-        <p:nvPr/>
-      </p:nvGrpSpPr>
-      <p:grpSpPr>
-        <a:xfrm>
-          <a:off x="0" y="0"/>
-          <a:ext cx="0" cy="0"/>
-          <a:chOff x="0" y="0"/>
-          <a:chExt cx="0" cy="0"/>
-        </a:xfrm>
-      </p:grpSpPr>
-      <p:sp>
-        <p:nvSpPr>
-          <p:cNvPr id="6" name="スライド番号プレースホルダー 5">
-            <a:extLst>
-              <a:ext uri="{FF2B5EF4-FFF2-40B4-BE49-F238E27FC236}">
-                <a16:creationId xmlns:a16="http://schemas.microsoft.com/office/drawing/2014/main" id="{ED36DFD0-93B2-8751-F203-50EE02E97C4C}"/>
-              </a:ext>
-            </a:extLst>
-          </p:cNvPr>
-          <p:cNvSpPr>
-            <a:spLocks noGrp="1"/>
-          </p:cNvSpPr>
-          <p:nvPr>
-            <p:ph type="sldNum" sz="quarter" idx="12"/>
-          </p:nvPr>
-        </p:nvSpPr>
-        <p:spPr/>
-        <p:txBody>
-          <a:bodyPr/>
-          <a:lstStyle>
-            <a:lvl1pPr>
-              <a:defRPr>
-                <a:latin typeface="Meiryo UI" panose="020B0604030504040204" pitchFamily="34" charset="-128"/>
-                <a:ea typeface="Meiryo UI" panose="020B0604030504040204" pitchFamily="34" charset="-128"/>
-              </a:defRPr>
-            </a:lvl1pPr>
-          </a:lstStyle>
-          <a:p>
-            <a:fld id="{C9FB15DA-11C7-0141-B5F8-718388A4C1CD}" type="slidenum">
-              <a:rPr lang="ja-JP" altLang="en-US" smtClean="0"/>
-              <a:pPr/>
-              <a:t>‹#›</a:t>
-            </a:fld>
-            <a:endParaRPr lang="ja-JP" altLang="en-US"/>
-          </a:p>
-        </p:txBody>
-      </p:sp>
-      <p:sp>
-        <p:nvSpPr>
-          <p:cNvPr id="3" name="コンテンツ プレースホルダー 2">
-            <a:extLst>
-              <a:ext uri="{FF2B5EF4-FFF2-40B4-BE49-F238E27FC236}">
-                <a16:creationId xmlns:a16="http://schemas.microsoft.com/office/drawing/2014/main" id="{67FE441F-46D6-37C5-59B1-23F540F0D0B3}"/>
-              </a:ext>
-            </a:extLst>
-          </p:cNvPr>
-          <p:cNvSpPr>
-            <a:spLocks noGrp="1"/>
-          </p:cNvSpPr>
-          <p:nvPr>
-            <p:ph idx="1" hasCustomPrompt="1"/>
-          </p:nvPr>
-        </p:nvSpPr>
-        <p:spPr>
-          <a:xfrm>
-            <a:off x="312420" y="593766"/>
-            <a:ext cx="11567160" cy="5540704"/>
-          </a:xfrm>
-        </p:spPr>
-        <p:txBody>
-          <a:bodyPr>
-            <a:normAutofit/>
-          </a:bodyPr>
-          <a:lstStyle>
-            <a:lvl1pPr marL="342900" indent="-342900">
-              <a:lnSpc>
-                <a:spcPct val="150000"/>
-              </a:lnSpc>
-              <a:buFont typeface="+mj-lt"/>
-              <a:buAutoNum type="arabicPeriod"/>
-              <a:defRPr sz="1800">
-                <a:latin typeface="Meiryo UI" panose="020B0604030504040204" pitchFamily="34" charset="-128"/>
-                <a:ea typeface="Meiryo UI" panose="020B0604030504040204" pitchFamily="34" charset="-128"/>
-              </a:defRPr>
-            </a:lvl1pPr>
-            <a:lvl2pPr marL="800100" indent="-342900">
-              <a:lnSpc>
-                <a:spcPct val="150000"/>
-              </a:lnSpc>
-              <a:buFont typeface="+mj-lt"/>
-              <a:buAutoNum type="arabicPeriod"/>
-              <a:defRPr sz="1600">
-                <a:latin typeface="Meiryo UI" panose="020B0604030504040204" pitchFamily="34" charset="-128"/>
-                <a:ea typeface="Meiryo UI" panose="020B0604030504040204" pitchFamily="34" charset="-128"/>
-              </a:defRPr>
-            </a:lvl2pPr>
-            <a:lvl3pPr marL="1257300" indent="-342900">
-              <a:lnSpc>
-                <a:spcPct val="150000"/>
-              </a:lnSpc>
-              <a:buFont typeface="+mj-lt"/>
-              <a:buAutoNum type="arabicPeriod"/>
-              <a:defRPr sz="1400">
-                <a:latin typeface="Meiryo UI" panose="020B0604030504040204" pitchFamily="34" charset="-128"/>
-                <a:ea typeface="Meiryo UI" panose="020B0604030504040204" pitchFamily="34" charset="-128"/>
-              </a:defRPr>
-            </a:lvl3pPr>
-            <a:lvl4pPr>
-              <a:buFont typeface="+mj-lt"/>
-              <a:buAutoNum type="arabicPeriod"/>
-              <a:defRPr sz="1200">
-                <a:latin typeface="Meiryo UI" panose="020B0604030504040204" pitchFamily="34" charset="-128"/>
-                <a:ea typeface="Meiryo UI" panose="020B0604030504040204" pitchFamily="34" charset="-128"/>
-              </a:defRPr>
-            </a:lvl4pPr>
-            <a:lvl5pPr>
-              <a:buFont typeface="+mj-lt"/>
-              <a:buAutoNum type="arabicPeriod"/>
-              <a:defRPr sz="1200">
-                <a:latin typeface="Meiryo UI" panose="020B0604030504040204" pitchFamily="34" charset="-128"/>
-                <a:ea typeface="Meiryo UI" panose="020B0604030504040204" pitchFamily="34" charset="-128"/>
-              </a:defRPr>
-            </a:lvl5pPr>
-          </a:lstStyle>
-          <a:p>
-            <a:pPr lvl="0"/>
-            <a:r>
-              <a:rPr kumimoji="1" lang="ja-JP" altLang="en-US"/>
-              <a:t>目次</a:t>
-            </a:r>
-            <a:r>
-              <a:rPr kumimoji="1" lang="en-US" altLang="ja-JP" dirty="0"/>
-              <a:t>1</a:t>
-            </a:r>
-          </a:p>
-          <a:p>
-            <a:pPr lvl="0"/>
-            <a:r>
-              <a:rPr kumimoji="1" lang="ja-JP" altLang="en-US"/>
-              <a:t>目次</a:t>
-            </a:r>
-            <a:r>
-              <a:rPr kumimoji="1" lang="en-US" altLang="ja-JP" dirty="0"/>
-              <a:t>2</a:t>
-            </a:r>
-          </a:p>
-          <a:p>
-            <a:pPr lvl="1"/>
-            <a:r>
-              <a:rPr kumimoji="1" lang="ja-JP" altLang="en-US"/>
-              <a:t>目次</a:t>
-            </a:r>
-            <a:r>
-              <a:rPr kumimoji="1" lang="en-US" altLang="ja-JP" dirty="0"/>
-              <a:t>2-1</a:t>
-            </a:r>
-          </a:p>
-          <a:p>
-            <a:pPr lvl="1"/>
-            <a:r>
-              <a:rPr kumimoji="1" lang="ja-JP" altLang="en-US"/>
-              <a:t>目次</a:t>
-            </a:r>
-            <a:r>
-              <a:rPr kumimoji="1" lang="en-US" altLang="ja-JP" dirty="0"/>
-              <a:t>2-2</a:t>
-            </a:r>
-          </a:p>
-          <a:p>
-            <a:pPr lvl="2"/>
-            <a:r>
-              <a:rPr kumimoji="1" lang="ja-JP" altLang="en-US"/>
-              <a:t>目次</a:t>
-            </a:r>
-            <a:r>
-              <a:rPr kumimoji="1" lang="en-US" altLang="ja-JP" dirty="0"/>
-              <a:t>2-2-1</a:t>
-            </a:r>
-          </a:p>
-          <a:p>
-            <a:pPr lvl="2"/>
-            <a:r>
-              <a:rPr kumimoji="1" lang="ja-JP" altLang="en-US"/>
-              <a:t>目次</a:t>
-            </a:r>
-            <a:r>
-              <a:rPr kumimoji="1" lang="en-US" altLang="ja-JP" dirty="0"/>
-              <a:t>2-2-2</a:t>
-            </a:r>
-          </a:p>
-          <a:p>
-            <a:pPr lvl="0"/>
-            <a:endParaRPr kumimoji="1" lang="en-US" altLang="ja-JP" dirty="0"/>
-          </a:p>
-        </p:txBody>
-      </p:sp>
-      <p:sp>
-        <p:nvSpPr>
-          <p:cNvPr id="2" name="テキスト プレースホルダー 2">
-            <a:extLst>
-              <a:ext uri="{FF2B5EF4-FFF2-40B4-BE49-F238E27FC236}">
-                <a16:creationId xmlns:a16="http://schemas.microsoft.com/office/drawing/2014/main" id="{193080AA-BA6D-C778-7D2C-D016AE233690}"/>
-              </a:ext>
-            </a:extLst>
-          </p:cNvPr>
-          <p:cNvSpPr>
-            <a:spLocks noGrp="1"/>
-          </p:cNvSpPr>
-          <p:nvPr>
-            <p:ph type="body" idx="13" hasCustomPrompt="1"/>
-          </p:nvPr>
-        </p:nvSpPr>
-        <p:spPr>
-          <a:xfrm>
-            <a:off x="312420" y="0"/>
-            <a:ext cx="4694586" cy="320634"/>
-          </a:xfrm>
-        </p:spPr>
-        <p:txBody>
-          <a:bodyPr>
-            <a:normAutofit/>
-          </a:bodyPr>
-          <a:lstStyle>
-            <a:lvl1pPr marL="0" indent="0">
-              <a:buNone/>
-              <a:defRPr sz="1800">
-                <a:solidFill>
-                  <a:schemeClr val="tx1">
-                    <a:tint val="82000"/>
-                  </a:schemeClr>
-                </a:solidFill>
-                <a:latin typeface="Meiryo UI" panose="020B0604030504040204" pitchFamily="34" charset="-128"/>
-                <a:ea typeface="Meiryo UI" panose="020B0604030504040204" pitchFamily="34" charset="-128"/>
-              </a:defRPr>
-            </a:lvl1pPr>
-            <a:lvl2pPr marL="457200" indent="0">
-              <a:buNone/>
-              <a:defRPr sz="2000">
-                <a:solidFill>
-                  <a:schemeClr val="tx1">
-                    <a:tint val="82000"/>
-                  </a:schemeClr>
-                </a:solidFill>
-              </a:defRPr>
-            </a:lvl2pPr>
-            <a:lvl3pPr marL="914400" indent="0">
-              <a:buNone/>
-              <a:defRPr sz="1800">
-                <a:solidFill>
-                  <a:schemeClr val="tx1">
-                    <a:tint val="82000"/>
-                  </a:schemeClr>
-                </a:solidFill>
-              </a:defRPr>
-            </a:lvl3pPr>
-            <a:lvl4pPr marL="1371600" indent="0">
-              <a:buNone/>
-              <a:defRPr sz="1600">
-                <a:solidFill>
-                  <a:schemeClr val="tx1">
-                    <a:tint val="82000"/>
-                  </a:schemeClr>
-                </a:solidFill>
-              </a:defRPr>
-            </a:lvl4pPr>
-            <a:lvl5pPr marL="1828800" indent="0">
-              <a:buNone/>
-              <a:defRPr sz="1600">
-                <a:solidFill>
-                  <a:schemeClr val="tx1">
-                    <a:tint val="82000"/>
-                  </a:schemeClr>
-                </a:solidFill>
-              </a:defRPr>
-            </a:lvl5pPr>
-            <a:lvl6pPr marL="2286000" indent="0">
-              <a:buNone/>
-              <a:defRPr sz="1600">
-                <a:solidFill>
-                  <a:schemeClr val="tx1">
-                    <a:tint val="82000"/>
-                  </a:schemeClr>
-                </a:solidFill>
-              </a:defRPr>
-            </a:lvl6pPr>
-            <a:lvl7pPr marL="2743200" indent="0">
-              <a:buNone/>
-              <a:defRPr sz="1600">
-                <a:solidFill>
-                  <a:schemeClr val="tx1">
-                    <a:tint val="82000"/>
-                  </a:schemeClr>
-                </a:solidFill>
-              </a:defRPr>
-            </a:lvl7pPr>
-            <a:lvl8pPr marL="3200400" indent="0">
-              <a:buNone/>
-              <a:defRPr sz="1600">
-                <a:solidFill>
-                  <a:schemeClr val="tx1">
-                    <a:tint val="82000"/>
-                  </a:schemeClr>
-                </a:solidFill>
-              </a:defRPr>
-            </a:lvl8pPr>
-            <a:lvl9pPr marL="3657600" indent="0">
-              <a:buNone/>
-              <a:defRPr sz="1600">
-                <a:solidFill>
-                  <a:schemeClr val="tx1">
-                    <a:tint val="82000"/>
-                  </a:schemeClr>
-                </a:solidFill>
-              </a:defRPr>
-            </a:lvl9pPr>
-          </a:lstStyle>
-          <a:p>
-            <a:pPr lvl="0"/>
-            <a:r>
-              <a:rPr kumimoji="1" lang="ja-JP" altLang="en-US"/>
-              <a:t>目次</a:t>
-            </a:r>
-            <a:r>
-              <a:rPr kumimoji="1" lang="en-US" altLang="ja-JP" dirty="0"/>
-              <a:t> </a:t>
-            </a:r>
-            <a:r>
-              <a:rPr kumimoji="1" lang="ja-JP" altLang="en-US"/>
-              <a:t>の書式設定</a:t>
-            </a:r>
-          </a:p>
-        </p:txBody>
-      </p:sp>
-    </p:spTree>
-    <p:extLst>
-      <p:ext uri="{BB962C8B-B14F-4D97-AF65-F5344CB8AC3E}">
-        <p14:creationId xmlns:p14="http://schemas.microsoft.com/office/powerpoint/2010/main" val="1160662263"/>
       </p:ext>
     </p:extLst>
   </p:cSld>
@@ -2778,10 +3243,11 @@
   <p:clrMap bg1="lt1" tx1="dk1" bg2="lt2" tx2="dk2" accent1="accent1" accent2="accent2" accent3="accent3" accent4="accent4" accent5="accent5" accent6="accent6" hlink="hlink" folHlink="folHlink"/>
   <p:sldLayoutIdLst>
     <p:sldLayoutId id="2147483649" r:id="rId1"/>
-    <p:sldLayoutId id="2147483652" r:id="rId2"/>
-    <p:sldLayoutId id="2147483653" r:id="rId3"/>
-    <p:sldLayoutId id="2147483654" r:id="rId4"/>
-    <p:sldLayoutId id="2147483650" r:id="rId5"/>
+    <p:sldLayoutId id="2147483650" r:id="rId2"/>
+    <p:sldLayoutId id="2147483652" r:id="rId3"/>
+    <p:sldLayoutId id="2147483653" r:id="rId4"/>
+    <p:sldLayoutId id="2147483655" r:id="rId5"/>
+    <p:sldLayoutId id="2147483654" r:id="rId6"/>
   </p:sldLayoutIdLst>
   <p:hf sldNum="0" hdr="0" dt="0"/>
   <p:txStyles>
@@ -3065,111 +3531,6 @@
     </p:otherStyle>
   </p:txStyles>
 </p:sldMaster>
-</file>
-
-<file path=ppt/slides/slide1.xml><?xml version="1.0" encoding="utf-8"?>
-<p:sld xmlns:a="http://schemas.openxmlformats.org/drawingml/2006/main" xmlns:r="http://schemas.openxmlformats.org/officeDocument/2006/relationships" xmlns:p="http://schemas.openxmlformats.org/presentationml/2006/main">
-  <p:cSld>
-    <p:spTree>
-      <p:nvGrpSpPr>
-        <p:cNvPr id="1" name=""/>
-        <p:cNvGrpSpPr/>
-        <p:nvPr/>
-      </p:nvGrpSpPr>
-      <p:grpSpPr>
-        <a:xfrm>
-          <a:off x="0" y="0"/>
-          <a:ext cx="0" cy="0"/>
-          <a:chOff x="0" y="0"/>
-          <a:chExt cx="0" cy="0"/>
-        </a:xfrm>
-      </p:grpSpPr>
-      <p:sp>
-        <p:nvSpPr>
-          <p:cNvPr id="2" name="タイトル 1">
-            <a:extLst>
-              <a:ext uri="{FF2B5EF4-FFF2-40B4-BE49-F238E27FC236}">
-                <a16:creationId xmlns:a16="http://schemas.microsoft.com/office/drawing/2014/main" id="{48C41E59-D23B-9B1C-0D9D-9A2B9B16BB69}"/>
-              </a:ext>
-            </a:extLst>
-          </p:cNvPr>
-          <p:cNvSpPr>
-            <a:spLocks noGrp="1"/>
-          </p:cNvSpPr>
-          <p:nvPr>
-            <p:ph type="ctrTitle"/>
-          </p:nvPr>
-        </p:nvSpPr>
-        <p:spPr/>
-        <p:txBody>
-          <a:bodyPr/>
-          <a:lstStyle/>
-          <a:p>
-            <a:endParaRPr kumimoji="1" lang="ja-JP" altLang="en-US"/>
-          </a:p>
-        </p:txBody>
-      </p:sp>
-      <p:sp>
-        <p:nvSpPr>
-          <p:cNvPr id="3" name="字幕 2">
-            <a:extLst>
-              <a:ext uri="{FF2B5EF4-FFF2-40B4-BE49-F238E27FC236}">
-                <a16:creationId xmlns:a16="http://schemas.microsoft.com/office/drawing/2014/main" id="{B69D726B-ECC0-AEE7-AB75-B35607AD8952}"/>
-              </a:ext>
-            </a:extLst>
-          </p:cNvPr>
-          <p:cNvSpPr>
-            <a:spLocks noGrp="1"/>
-          </p:cNvSpPr>
-          <p:nvPr>
-            <p:ph type="subTitle" idx="1"/>
-          </p:nvPr>
-        </p:nvSpPr>
-        <p:spPr/>
-        <p:txBody>
-          <a:bodyPr/>
-          <a:lstStyle/>
-          <a:p>
-            <a:endParaRPr kumimoji="1" lang="ja-JP" altLang="en-US"/>
-          </a:p>
-        </p:txBody>
-      </p:sp>
-      <p:sp>
-        <p:nvSpPr>
-          <p:cNvPr id="4" name="テキスト プレースホルダー 3">
-            <a:extLst>
-              <a:ext uri="{FF2B5EF4-FFF2-40B4-BE49-F238E27FC236}">
-                <a16:creationId xmlns:a16="http://schemas.microsoft.com/office/drawing/2014/main" id="{56FBA02A-130D-D702-0F27-DDB520436AFC}"/>
-              </a:ext>
-            </a:extLst>
-          </p:cNvPr>
-          <p:cNvSpPr>
-            <a:spLocks noGrp="1"/>
-          </p:cNvSpPr>
-          <p:nvPr>
-            <p:ph type="body" idx="13"/>
-          </p:nvPr>
-        </p:nvSpPr>
-        <p:spPr/>
-        <p:txBody>
-          <a:bodyPr/>
-          <a:lstStyle/>
-          <a:p>
-            <a:endParaRPr kumimoji="1" lang="ja-JP" altLang="en-US"/>
-          </a:p>
-        </p:txBody>
-      </p:sp>
-    </p:spTree>
-    <p:extLst>
-      <p:ext uri="{BB962C8B-B14F-4D97-AF65-F5344CB8AC3E}">
-        <p14:creationId xmlns:p14="http://schemas.microsoft.com/office/powerpoint/2010/main" val="2622301429"/>
-      </p:ext>
-    </p:extLst>
-  </p:cSld>
-  <p:clrMapOvr>
-    <a:masterClrMapping/>
-  </p:clrMapOvr>
-</p:sld>
 </file>
 
 <file path=ppt/theme/theme1.xml><?xml version="1.0" encoding="utf-8"?>

</xml_diff>

<commit_message>
feat(templates): add rm038 layout patterns
</commit_message>
<xml_diff>
--- a/samples/templates/templates.pptx
+++ b/samples/templates/templates.pptx
@@ -2979,6 +2979,1317 @@
 </p:sldLayout>
 </file>
 
+<file path=ppt/slideLayouts/slideLayout7.xml><?xml version="1.0" encoding="utf-8"?>
+<p:sldLayout xmlns:a="http://schemas.openxmlformats.org/drawingml/2006/main" xmlns:r="http://schemas.openxmlformats.org/officeDocument/2006/relationships" xmlns:p="http://schemas.openxmlformats.org/presentationml/2006/main" preserve="1" userDrawn="1">
+  <p:cSld name="Timeline Detail">
+    <p:spTree>
+      <p:nvGrpSpPr>
+        <p:cNvPr id="1" name=""/>
+        <p:cNvGrpSpPr/>
+        <p:nvPr/>
+      </p:nvGrpSpPr>
+      <p:grpSpPr>
+        <a:xfrm>
+          <a:off x="0" y="0"/>
+          <a:ext cx="0" cy="0"/>
+          <a:chOff x="0" y="0"/>
+          <a:chExt cx="0" cy="0"/>
+        </a:xfrm>
+      </p:grpSpPr>
+      <p:sp>
+        <p:nvSpPr>
+          <p:cNvPr id="2" name="タイトル 1">
+            <a:extLst>
+              <a:ext uri="{FF2B5EF4-FFF2-40B4-BE49-F238E27FC236}">
+                <a16:creationId xmlns:a16="http://schemas.microsoft.com/office/drawing/2014/main" id="{1C878911-0E99-4C7F-A17C-E4C6E06AD3EB}"/>
+              </a:ext>
+            </a:extLst>
+          </p:cNvPr>
+          <p:cNvSpPr>
+            <a:spLocks noGrp="1"/>
+          </p:cNvSpPr>
+          <p:nvPr>
+            <p:ph type="title"/>
+          </p:nvPr>
+        </p:nvSpPr>
+        <p:spPr/>
+        <p:txBody>
+          <a:bodyPr/>
+          <a:lstStyle>
+            <a:lvl1pPr>
+              <a:defRPr>
+                <a:latin typeface="Meiryo UI" panose="020B0604030504040204" pitchFamily="34" charset="-128"/>
+                <a:ea typeface="Meiryo UI" panose="020B0604030504040204" pitchFamily="34" charset="-128"/>
+              </a:defRPr>
+            </a:lvl1pPr>
+          </a:lstStyle>
+          <a:p>
+            <a:r>
+              <a:rPr kumimoji="1" lang="ja-JP" altLang="en-US"/>
+              <a:t>マスター タイトルの書式設定</a:t>
+            </a:r>
+          </a:p>
+        </p:txBody>
+      </p:sp>
+      <p:sp>
+        <p:nvSpPr>
+          <p:cNvPr id="3" name="Timeline Track">
+            <a:extLst>
+              <a:ext uri="{FF2B5EF4-FFF2-40B4-BE49-F238E27FC236}">
+                <a16:creationId xmlns:a16="http://schemas.microsoft.com/office/drawing/2014/main" id="{CE3F0D44-172A-CF1D-E1C1-730B2FD3226F}"/>
+              </a:ext>
+            </a:extLst>
+          </p:cNvPr>
+          <p:cNvSpPr>
+            <a:spLocks noGrp="1"/>
+          </p:cNvSpPr>
+          <p:nvPr>
+            <p:ph idx="1"/>
+          </p:nvPr>
+        </p:nvSpPr>
+        <p:spPr>
+          <a:xfrm>
+            <a:off x="312420" y="1591294"/>
+            <a:ext cx="5653374" cy="4585669"/>
+          </a:xfrm>
+        </p:spPr>
+        <p:txBody>
+          <a:bodyPr>
+            <a:normAutofit/>
+          </a:bodyPr>
+          <a:lstStyle>
+            <a:lvl1pPr>
+              <a:defRPr sz="1800">
+                <a:latin typeface="Meiryo UI" panose="020B0604030504040204" pitchFamily="34" charset="-128"/>
+                <a:ea typeface="Meiryo UI" panose="020B0604030504040204" pitchFamily="34" charset="-128"/>
+              </a:defRPr>
+            </a:lvl1pPr>
+            <a:lvl2pPr>
+              <a:defRPr sz="1600">
+                <a:latin typeface="Meiryo UI" panose="020B0604030504040204" pitchFamily="34" charset="-128"/>
+                <a:ea typeface="Meiryo UI" panose="020B0604030504040204" pitchFamily="34" charset="-128"/>
+              </a:defRPr>
+            </a:lvl2pPr>
+            <a:lvl3pPr>
+              <a:defRPr sz="1400">
+                <a:latin typeface="Meiryo UI" panose="020B0604030504040204" pitchFamily="34" charset="-128"/>
+                <a:ea typeface="Meiryo UI" panose="020B0604030504040204" pitchFamily="34" charset="-128"/>
+              </a:defRPr>
+            </a:lvl3pPr>
+            <a:lvl4pPr>
+              <a:defRPr sz="1200">
+                <a:latin typeface="Meiryo UI" panose="020B0604030504040204" pitchFamily="34" charset="-128"/>
+                <a:ea typeface="Meiryo UI" panose="020B0604030504040204" pitchFamily="34" charset="-128"/>
+              </a:defRPr>
+            </a:lvl4pPr>
+            <a:lvl5pPr>
+              <a:defRPr sz="1200">
+                <a:latin typeface="Meiryo UI" panose="020B0604030504040204" pitchFamily="34" charset="-128"/>
+                <a:ea typeface="Meiryo UI" panose="020B0604030504040204" pitchFamily="34" charset="-128"/>
+              </a:defRPr>
+            </a:lvl5pPr>
+          </a:lstStyle>
+          <a:p>
+            <a:pPr lvl="0"/>
+            <a:r>
+              <a:rPr kumimoji="1" lang="ja-JP" altLang="en-US"/>
+              <a:t>マスター テキストの書式設定</a:t>
+            </a:r>
+          </a:p>
+          <a:p>
+            <a:pPr lvl="1"/>
+            <a:r>
+              <a:rPr kumimoji="1" lang="ja-JP" altLang="en-US"/>
+              <a:t>第 </a:t>
+            </a:r>
+            <a:r>
+              <a:rPr kumimoji="1" lang="en-US" altLang="ja-JP"/>
+              <a:t>2 </a:t>
+            </a:r>
+            <a:r>
+              <a:rPr kumimoji="1" lang="ja-JP" altLang="en-US"/>
+              <a:t>レベル</a:t>
+            </a:r>
+          </a:p>
+          <a:p>
+            <a:pPr lvl="2"/>
+            <a:r>
+              <a:rPr kumimoji="1" lang="ja-JP" altLang="en-US"/>
+              <a:t>第 </a:t>
+            </a:r>
+            <a:r>
+              <a:rPr kumimoji="1" lang="en-US" altLang="ja-JP"/>
+              <a:t>3 </a:t>
+            </a:r>
+            <a:r>
+              <a:rPr kumimoji="1" lang="ja-JP" altLang="en-US"/>
+              <a:t>レベル</a:t>
+            </a:r>
+          </a:p>
+          <a:p>
+            <a:pPr lvl="3"/>
+            <a:r>
+              <a:rPr kumimoji="1" lang="ja-JP" altLang="en-US"/>
+              <a:t>第 </a:t>
+            </a:r>
+            <a:r>
+              <a:rPr kumimoji="1" lang="en-US" altLang="ja-JP"/>
+              <a:t>4 </a:t>
+            </a:r>
+            <a:r>
+              <a:rPr kumimoji="1" lang="ja-JP" altLang="en-US"/>
+              <a:t>レベル</a:t>
+            </a:r>
+          </a:p>
+          <a:p>
+            <a:pPr lvl="4"/>
+            <a:r>
+              <a:rPr kumimoji="1" lang="ja-JP" altLang="en-US"/>
+              <a:t>第 </a:t>
+            </a:r>
+            <a:r>
+              <a:rPr kumimoji="1" lang="en-US" altLang="ja-JP"/>
+              <a:t>5 </a:t>
+            </a:r>
+            <a:r>
+              <a:rPr kumimoji="1" lang="ja-JP" altLang="en-US"/>
+              <a:t>レベル</a:t>
+            </a:r>
+          </a:p>
+        </p:txBody>
+      </p:sp>
+      <p:sp>
+        <p:nvSpPr>
+          <p:cNvPr id="6" name="スライド番号プレースホルダー 5">
+            <a:extLst>
+              <a:ext uri="{FF2B5EF4-FFF2-40B4-BE49-F238E27FC236}">
+                <a16:creationId xmlns:a16="http://schemas.microsoft.com/office/drawing/2014/main" id="{ED36DFD0-93B2-8751-F203-50EE02E97C4C}"/>
+              </a:ext>
+            </a:extLst>
+          </p:cNvPr>
+          <p:cNvSpPr>
+            <a:spLocks noGrp="1"/>
+          </p:cNvSpPr>
+          <p:nvPr>
+            <p:ph type="sldNum" sz="quarter" idx="12"/>
+          </p:nvPr>
+        </p:nvSpPr>
+        <p:spPr/>
+        <p:txBody>
+          <a:bodyPr/>
+          <a:lstStyle>
+            <a:lvl1pPr>
+              <a:defRPr>
+                <a:latin typeface="Meiryo UI" panose="020B0604030504040204" pitchFamily="34" charset="-128"/>
+                <a:ea typeface="Meiryo UI" panose="020B0604030504040204" pitchFamily="34" charset="-128"/>
+              </a:defRPr>
+            </a:lvl1pPr>
+          </a:lstStyle>
+          <a:p>
+            <a:fld id="{C9FB15DA-11C7-0141-B5F8-718388A4C1CD}" type="slidenum">
+              <a:rPr lang="ja-JP" altLang="en-US" smtClean="0"/>
+              <a:pPr/>
+              <a:t>‹#›</a:t>
+            </a:fld>
+            <a:endParaRPr lang="ja-JP" altLang="en-US"/>
+          </a:p>
+        </p:txBody>
+      </p:sp>
+      <p:sp>
+        <p:nvSpPr>
+          <p:cNvPr id="4" name="Timeline Notes">
+            <a:extLst>
+              <a:ext uri="{FF2B5EF4-FFF2-40B4-BE49-F238E27FC236}">
+                <a16:creationId xmlns:a16="http://schemas.microsoft.com/office/drawing/2014/main" id="{F8E60AB5-72BD-C2E5-C767-BC6D3DD300C1}"/>
+              </a:ext>
+            </a:extLst>
+          </p:cNvPr>
+          <p:cNvSpPr>
+            <a:spLocks noGrp="1"/>
+          </p:cNvSpPr>
+          <p:nvPr>
+            <p:ph idx="14"/>
+          </p:nvPr>
+        </p:nvSpPr>
+        <p:spPr>
+          <a:xfrm>
+            <a:off x="6226206" y="1591293"/>
+            <a:ext cx="5653374" cy="4585669"/>
+          </a:xfrm>
+        </p:spPr>
+        <p:txBody>
+          <a:bodyPr>
+            <a:normAutofit/>
+          </a:bodyPr>
+          <a:lstStyle>
+            <a:lvl1pPr>
+              <a:defRPr sz="1800">
+                <a:latin typeface="Meiryo UI" panose="020B0604030504040204" pitchFamily="34" charset="-128"/>
+                <a:ea typeface="Meiryo UI" panose="020B0604030504040204" pitchFamily="34" charset="-128"/>
+              </a:defRPr>
+            </a:lvl1pPr>
+            <a:lvl2pPr>
+              <a:defRPr sz="1600">
+                <a:latin typeface="Meiryo UI" panose="020B0604030504040204" pitchFamily="34" charset="-128"/>
+                <a:ea typeface="Meiryo UI" panose="020B0604030504040204" pitchFamily="34" charset="-128"/>
+              </a:defRPr>
+            </a:lvl2pPr>
+            <a:lvl3pPr>
+              <a:defRPr sz="1400">
+                <a:latin typeface="Meiryo UI" panose="020B0604030504040204" pitchFamily="34" charset="-128"/>
+                <a:ea typeface="Meiryo UI" panose="020B0604030504040204" pitchFamily="34" charset="-128"/>
+              </a:defRPr>
+            </a:lvl3pPr>
+            <a:lvl4pPr>
+              <a:defRPr sz="1200">
+                <a:latin typeface="Meiryo UI" panose="020B0604030504040204" pitchFamily="34" charset="-128"/>
+                <a:ea typeface="Meiryo UI" panose="020B0604030504040204" pitchFamily="34" charset="-128"/>
+              </a:defRPr>
+            </a:lvl4pPr>
+            <a:lvl5pPr>
+              <a:defRPr sz="1200">
+                <a:latin typeface="Meiryo UI" panose="020B0604030504040204" pitchFamily="34" charset="-128"/>
+                <a:ea typeface="Meiryo UI" panose="020B0604030504040204" pitchFamily="34" charset="-128"/>
+              </a:defRPr>
+            </a:lvl5pPr>
+          </a:lstStyle>
+          <a:p>
+            <a:pPr lvl="0"/>
+            <a:r>
+              <a:rPr kumimoji="1" lang="ja-JP" altLang="en-US"/>
+              <a:t>マスター テキストの書式設定</a:t>
+            </a:r>
+          </a:p>
+          <a:p>
+            <a:pPr lvl="1"/>
+            <a:r>
+              <a:rPr kumimoji="1" lang="ja-JP" altLang="en-US"/>
+              <a:t>第 </a:t>
+            </a:r>
+            <a:r>
+              <a:rPr kumimoji="1" lang="en-US" altLang="ja-JP"/>
+              <a:t>2 </a:t>
+            </a:r>
+            <a:r>
+              <a:rPr kumimoji="1" lang="ja-JP" altLang="en-US"/>
+              <a:t>レベル</a:t>
+            </a:r>
+          </a:p>
+          <a:p>
+            <a:pPr lvl="2"/>
+            <a:r>
+              <a:rPr kumimoji="1" lang="ja-JP" altLang="en-US"/>
+              <a:t>第 </a:t>
+            </a:r>
+            <a:r>
+              <a:rPr kumimoji="1" lang="en-US" altLang="ja-JP"/>
+              <a:t>3 </a:t>
+            </a:r>
+            <a:r>
+              <a:rPr kumimoji="1" lang="ja-JP" altLang="en-US"/>
+              <a:t>レベル</a:t>
+            </a:r>
+          </a:p>
+          <a:p>
+            <a:pPr lvl="3"/>
+            <a:r>
+              <a:rPr kumimoji="1" lang="ja-JP" altLang="en-US"/>
+              <a:t>第 </a:t>
+            </a:r>
+            <a:r>
+              <a:rPr kumimoji="1" lang="en-US" altLang="ja-JP"/>
+              <a:t>4 </a:t>
+            </a:r>
+            <a:r>
+              <a:rPr kumimoji="1" lang="ja-JP" altLang="en-US"/>
+              <a:t>レベル</a:t>
+            </a:r>
+          </a:p>
+          <a:p>
+            <a:pPr lvl="4"/>
+            <a:r>
+              <a:rPr kumimoji="1" lang="ja-JP" altLang="en-US"/>
+              <a:t>第 </a:t>
+            </a:r>
+            <a:r>
+              <a:rPr kumimoji="1" lang="en-US" altLang="ja-JP"/>
+              <a:t>5 </a:t>
+            </a:r>
+            <a:r>
+              <a:rPr kumimoji="1" lang="ja-JP" altLang="en-US"/>
+              <a:t>レベル</a:t>
+            </a:r>
+          </a:p>
+        </p:txBody>
+      </p:sp>
+      <p:sp>
+        <p:nvSpPr>
+          <p:cNvPr id="7" name="Timeline Subtitle">
+            <a:extLst>
+              <a:ext uri="{FF2B5EF4-FFF2-40B4-BE49-F238E27FC236}">
+                <a16:creationId xmlns:a16="http://schemas.microsoft.com/office/drawing/2014/main" id="{1637E228-8434-900D-0254-AF837975524B}"/>
+              </a:ext>
+            </a:extLst>
+          </p:cNvPr>
+          <p:cNvSpPr>
+            <a:spLocks noGrp="1"/>
+          </p:cNvSpPr>
+          <p:nvPr>
+            <p:ph type="subTitle" idx="15" hasCustomPrompt="1"/>
+          </p:nvPr>
+        </p:nvSpPr>
+        <p:spPr>
+          <a:xfrm>
+            <a:off x="312420" y="0"/>
+            <a:ext cx="4694586" cy="320634"/>
+          </a:xfrm>
+        </p:spPr>
+        <p:txBody>
+          <a:bodyPr anchor="b">
+            <a:normAutofit/>
+          </a:bodyPr>
+          <a:lstStyle>
+            <a:lvl1pPr marL="0" indent="0" algn="l">
+              <a:buNone/>
+              <a:defRPr sz="1800">
+                <a:solidFill>
+                  <a:srgbClr val="767676"/>
+                </a:solidFill>
+              </a:defRPr>
+            </a:lvl1pPr>
+            <a:lvl2pPr marL="457200" indent="0" algn="ctr">
+              <a:buNone/>
+              <a:defRPr sz="2000"/>
+            </a:lvl2pPr>
+            <a:lvl3pPr marL="914400" indent="0" algn="ctr">
+              <a:buNone/>
+              <a:defRPr sz="1800"/>
+            </a:lvl3pPr>
+            <a:lvl4pPr marL="1371600" indent="0" algn="ctr">
+              <a:buNone/>
+              <a:defRPr sz="1600"/>
+            </a:lvl4pPr>
+            <a:lvl5pPr marL="1828800" indent="0" algn="ctr">
+              <a:buNone/>
+              <a:defRPr sz="1600"/>
+            </a:lvl5pPr>
+            <a:lvl6pPr marL="2286000" indent="0" algn="ctr">
+              <a:buNone/>
+              <a:defRPr sz="1600"/>
+            </a:lvl6pPr>
+            <a:lvl7pPr marL="2743200" indent="0" algn="ctr">
+              <a:buNone/>
+              <a:defRPr sz="1600"/>
+            </a:lvl7pPr>
+            <a:lvl8pPr marL="3200400" indent="0" algn="ctr">
+              <a:buNone/>
+              <a:defRPr sz="1600"/>
+            </a:lvl8pPr>
+            <a:lvl9pPr marL="3657600" indent="0" algn="ctr">
+              <a:buNone/>
+              <a:defRPr sz="1600"/>
+            </a:lvl9pPr>
+          </a:lstStyle>
+          <a:p>
+            <a:pPr lvl="0"/>
+            <a:r>
+              <a:rPr kumimoji="1" lang="ja-JP" altLang="en-US"/>
+              <a:t>サブタイトル</a:t>
+            </a:r>
+            <a:r>
+              <a:rPr kumimoji="1" lang="en-US" altLang="ja-JP" dirty="0"/>
+              <a:t> </a:t>
+            </a:r>
+            <a:r>
+              <a:rPr kumimoji="1" lang="ja-JP" altLang="en-US"/>
+              <a:t>の書式設定</a:t>
+            </a:r>
+          </a:p>
+        </p:txBody>
+      </p:sp>
+      <p:sp>
+        <p:nvSpPr>
+          <p:cNvPr id="5" name="Logo">
+            <a:extLst>
+              <a:ext uri="{FF2B5EF4-FFF2-40B4-BE49-F238E27FC236}">
+                <a16:creationId xmlns:a16="http://schemas.microsoft.com/office/drawing/2014/main" id="{4E369FD4-93A8-E2C2-D23D-495B39C171AF}"/>
+              </a:ext>
+            </a:extLst>
+          </p:cNvPr>
+          <p:cNvSpPr>
+            <a:spLocks noGrp="1"/>
+          </p:cNvSpPr>
+          <p:nvPr>
+            <p:ph sz="quarter" idx="16" hasCustomPrompt="1"/>
+          </p:nvPr>
+        </p:nvSpPr>
+        <p:spPr>
+          <a:xfrm>
+            <a:off x="10965176" y="5262563"/>
+            <a:ext cx="914400" cy="914400"/>
+          </a:xfrm>
+        </p:spPr>
+        <p:txBody>
+          <a:bodyPr/>
+          <a:lstStyle>
+            <a:lvl1pPr marL="0" indent="0">
+              <a:buNone/>
+              <a:defRPr/>
+            </a:lvl1pPr>
+          </a:lstStyle>
+          <a:p>
+            <a:pPr lvl="0"/>
+            <a:r>
+              <a:rPr kumimoji="1" lang="en-US" altLang="ja-JP" dirty="0"/>
+              <a:t>logo</a:t>
+            </a:r>
+            <a:endParaRPr kumimoji="1" lang="ja-JP" altLang="en-US"/>
+          </a:p>
+        </p:txBody>
+      </p:sp>
+    </p:spTree>
+    <p:extLst>
+      <p:ext uri="{BB962C8B-B14F-4D97-AF65-F5344CB8AC3E}">
+        <p14:creationId xmlns:p14="http://schemas.microsoft.com/office/powerpoint/2010/main" val="3761077251"/>
+      </p:ext>
+    </p:extLst>
+  </p:cSld>
+  <p:clrMapOvr>
+    <a:masterClrMapping/>
+  </p:clrMapOvr>
+</p:sldLayout>
+</file>
+
+<file path=ppt/slideLayouts/slideLayout8.xml><?xml version="1.0" encoding="utf-8"?>
+<p:sldLayout xmlns:a="http://schemas.openxmlformats.org/drawingml/2006/main" xmlns:r="http://schemas.openxmlformats.org/officeDocument/2006/relationships" xmlns:p="http://schemas.openxmlformats.org/presentationml/2006/main" preserve="1" userDrawn="1">
+  <p:cSld name="Comparison Two Axis">
+    <p:spTree>
+      <p:nvGrpSpPr>
+        <p:cNvPr id="1" name=""/>
+        <p:cNvGrpSpPr/>
+        <p:nvPr/>
+      </p:nvGrpSpPr>
+      <p:grpSpPr>
+        <a:xfrm>
+          <a:off x="0" y="0"/>
+          <a:ext cx="0" cy="0"/>
+          <a:chOff x="0" y="0"/>
+          <a:chExt cx="0" cy="0"/>
+        </a:xfrm>
+      </p:grpSpPr>
+      <p:sp>
+        <p:nvSpPr>
+          <p:cNvPr id="2" name="タイトル 1">
+            <a:extLst>
+              <a:ext uri="{FF2B5EF4-FFF2-40B4-BE49-F238E27FC236}">
+                <a16:creationId xmlns:a16="http://schemas.microsoft.com/office/drawing/2014/main" id="{1C878911-0E99-4C7F-A17C-E4C6E06AD3EB}"/>
+              </a:ext>
+            </a:extLst>
+          </p:cNvPr>
+          <p:cNvSpPr>
+            <a:spLocks noGrp="1"/>
+          </p:cNvSpPr>
+          <p:nvPr>
+            <p:ph type="title"/>
+          </p:nvPr>
+        </p:nvSpPr>
+        <p:spPr/>
+        <p:txBody>
+          <a:bodyPr/>
+          <a:lstStyle>
+            <a:lvl1pPr>
+              <a:defRPr>
+                <a:latin typeface="Meiryo UI" panose="020B0604030504040204" pitchFamily="34" charset="-128"/>
+                <a:ea typeface="Meiryo UI" panose="020B0604030504040204" pitchFamily="34" charset="-128"/>
+              </a:defRPr>
+            </a:lvl1pPr>
+          </a:lstStyle>
+          <a:p>
+            <a:r>
+              <a:rPr kumimoji="1" lang="ja-JP" altLang="en-US"/>
+              <a:t>マスター タイトルの書式設定</a:t>
+            </a:r>
+          </a:p>
+        </p:txBody>
+      </p:sp>
+      <p:sp>
+        <p:nvSpPr>
+          <p:cNvPr id="3" name="Axis Left">
+            <a:extLst>
+              <a:ext uri="{FF2B5EF4-FFF2-40B4-BE49-F238E27FC236}">
+                <a16:creationId xmlns:a16="http://schemas.microsoft.com/office/drawing/2014/main" id="{CE3F0D44-172A-CF1D-E1C1-730B2FD3226F}"/>
+              </a:ext>
+            </a:extLst>
+          </p:cNvPr>
+          <p:cNvSpPr>
+            <a:spLocks noGrp="1"/>
+          </p:cNvSpPr>
+          <p:nvPr>
+            <p:ph idx="1"/>
+          </p:nvPr>
+        </p:nvSpPr>
+        <p:spPr>
+          <a:xfrm>
+            <a:off x="312420" y="1591294"/>
+            <a:ext cx="5653374" cy="4585669"/>
+          </a:xfrm>
+        </p:spPr>
+        <p:txBody>
+          <a:bodyPr>
+            <a:normAutofit/>
+          </a:bodyPr>
+          <a:lstStyle>
+            <a:lvl1pPr>
+              <a:defRPr sz="1800">
+                <a:latin typeface="Meiryo UI" panose="020B0604030504040204" pitchFamily="34" charset="-128"/>
+                <a:ea typeface="Meiryo UI" panose="020B0604030504040204" pitchFamily="34" charset="-128"/>
+              </a:defRPr>
+            </a:lvl1pPr>
+            <a:lvl2pPr>
+              <a:defRPr sz="1600">
+                <a:latin typeface="Meiryo UI" panose="020B0604030504040204" pitchFamily="34" charset="-128"/>
+                <a:ea typeface="Meiryo UI" panose="020B0604030504040204" pitchFamily="34" charset="-128"/>
+              </a:defRPr>
+            </a:lvl2pPr>
+            <a:lvl3pPr>
+              <a:defRPr sz="1400">
+                <a:latin typeface="Meiryo UI" panose="020B0604030504040204" pitchFamily="34" charset="-128"/>
+                <a:ea typeface="Meiryo UI" panose="020B0604030504040204" pitchFamily="34" charset="-128"/>
+              </a:defRPr>
+            </a:lvl3pPr>
+            <a:lvl4pPr>
+              <a:defRPr sz="1200">
+                <a:latin typeface="Meiryo UI" panose="020B0604030504040204" pitchFamily="34" charset="-128"/>
+                <a:ea typeface="Meiryo UI" panose="020B0604030504040204" pitchFamily="34" charset="-128"/>
+              </a:defRPr>
+            </a:lvl4pPr>
+            <a:lvl5pPr>
+              <a:defRPr sz="1200">
+                <a:latin typeface="Meiryo UI" panose="020B0604030504040204" pitchFamily="34" charset="-128"/>
+                <a:ea typeface="Meiryo UI" panose="020B0604030504040204" pitchFamily="34" charset="-128"/>
+              </a:defRPr>
+            </a:lvl5pPr>
+          </a:lstStyle>
+          <a:p>
+            <a:pPr lvl="0"/>
+            <a:r>
+              <a:rPr kumimoji="1" lang="ja-JP" altLang="en-US"/>
+              <a:t>マスター テキストの書式設定</a:t>
+            </a:r>
+          </a:p>
+          <a:p>
+            <a:pPr lvl="1"/>
+            <a:r>
+              <a:rPr kumimoji="1" lang="ja-JP" altLang="en-US"/>
+              <a:t>第 </a:t>
+            </a:r>
+            <a:r>
+              <a:rPr kumimoji="1" lang="en-US" altLang="ja-JP"/>
+              <a:t>2 </a:t>
+            </a:r>
+            <a:r>
+              <a:rPr kumimoji="1" lang="ja-JP" altLang="en-US"/>
+              <a:t>レベル</a:t>
+            </a:r>
+          </a:p>
+          <a:p>
+            <a:pPr lvl="2"/>
+            <a:r>
+              <a:rPr kumimoji="1" lang="ja-JP" altLang="en-US"/>
+              <a:t>第 </a:t>
+            </a:r>
+            <a:r>
+              <a:rPr kumimoji="1" lang="en-US" altLang="ja-JP"/>
+              <a:t>3 </a:t>
+            </a:r>
+            <a:r>
+              <a:rPr kumimoji="1" lang="ja-JP" altLang="en-US"/>
+              <a:t>レベル</a:t>
+            </a:r>
+          </a:p>
+          <a:p>
+            <a:pPr lvl="3"/>
+            <a:r>
+              <a:rPr kumimoji="1" lang="ja-JP" altLang="en-US"/>
+              <a:t>第 </a:t>
+            </a:r>
+            <a:r>
+              <a:rPr kumimoji="1" lang="en-US" altLang="ja-JP"/>
+              <a:t>4 </a:t>
+            </a:r>
+            <a:r>
+              <a:rPr kumimoji="1" lang="ja-JP" altLang="en-US"/>
+              <a:t>レベル</a:t>
+            </a:r>
+          </a:p>
+          <a:p>
+            <a:pPr lvl="4"/>
+            <a:r>
+              <a:rPr kumimoji="1" lang="ja-JP" altLang="en-US"/>
+              <a:t>第 </a:t>
+            </a:r>
+            <a:r>
+              <a:rPr kumimoji="1" lang="en-US" altLang="ja-JP"/>
+              <a:t>5 </a:t>
+            </a:r>
+            <a:r>
+              <a:rPr kumimoji="1" lang="ja-JP" altLang="en-US"/>
+              <a:t>レベル</a:t>
+            </a:r>
+          </a:p>
+        </p:txBody>
+      </p:sp>
+      <p:sp>
+        <p:nvSpPr>
+          <p:cNvPr id="6" name="スライド番号プレースホルダー 5">
+            <a:extLst>
+              <a:ext uri="{FF2B5EF4-FFF2-40B4-BE49-F238E27FC236}">
+                <a16:creationId xmlns:a16="http://schemas.microsoft.com/office/drawing/2014/main" id="{ED36DFD0-93B2-8751-F203-50EE02E97C4C}"/>
+              </a:ext>
+            </a:extLst>
+          </p:cNvPr>
+          <p:cNvSpPr>
+            <a:spLocks noGrp="1"/>
+          </p:cNvSpPr>
+          <p:nvPr>
+            <p:ph type="sldNum" sz="quarter" idx="12"/>
+          </p:nvPr>
+        </p:nvSpPr>
+        <p:spPr/>
+        <p:txBody>
+          <a:bodyPr/>
+          <a:lstStyle>
+            <a:lvl1pPr>
+              <a:defRPr>
+                <a:latin typeface="Meiryo UI" panose="020B0604030504040204" pitchFamily="34" charset="-128"/>
+                <a:ea typeface="Meiryo UI" panose="020B0604030504040204" pitchFamily="34" charset="-128"/>
+              </a:defRPr>
+            </a:lvl1pPr>
+          </a:lstStyle>
+          <a:p>
+            <a:fld id="{C9FB15DA-11C7-0141-B5F8-718388A4C1CD}" type="slidenum">
+              <a:rPr lang="ja-JP" altLang="en-US" smtClean="0"/>
+              <a:pPr/>
+              <a:t>‹#›</a:t>
+            </a:fld>
+            <a:endParaRPr lang="ja-JP" altLang="en-US"/>
+          </a:p>
+        </p:txBody>
+      </p:sp>
+      <p:sp>
+        <p:nvSpPr>
+          <p:cNvPr id="4" name="Axis Right">
+            <a:extLst>
+              <a:ext uri="{FF2B5EF4-FFF2-40B4-BE49-F238E27FC236}">
+                <a16:creationId xmlns:a16="http://schemas.microsoft.com/office/drawing/2014/main" id="{F8E60AB5-72BD-C2E5-C767-BC6D3DD300C1}"/>
+              </a:ext>
+            </a:extLst>
+          </p:cNvPr>
+          <p:cNvSpPr>
+            <a:spLocks noGrp="1"/>
+          </p:cNvSpPr>
+          <p:nvPr>
+            <p:ph idx="14"/>
+          </p:nvPr>
+        </p:nvSpPr>
+        <p:spPr>
+          <a:xfrm>
+            <a:off x="6226206" y="1591293"/>
+            <a:ext cx="5653374" cy="4585669"/>
+          </a:xfrm>
+        </p:spPr>
+        <p:txBody>
+          <a:bodyPr>
+            <a:normAutofit/>
+          </a:bodyPr>
+          <a:lstStyle>
+            <a:lvl1pPr>
+              <a:defRPr sz="1800">
+                <a:latin typeface="Meiryo UI" panose="020B0604030504040204" pitchFamily="34" charset="-128"/>
+                <a:ea typeface="Meiryo UI" panose="020B0604030504040204" pitchFamily="34" charset="-128"/>
+              </a:defRPr>
+            </a:lvl1pPr>
+            <a:lvl2pPr>
+              <a:defRPr sz="1600">
+                <a:latin typeface="Meiryo UI" panose="020B0604030504040204" pitchFamily="34" charset="-128"/>
+                <a:ea typeface="Meiryo UI" panose="020B0604030504040204" pitchFamily="34" charset="-128"/>
+              </a:defRPr>
+            </a:lvl2pPr>
+            <a:lvl3pPr>
+              <a:defRPr sz="1400">
+                <a:latin typeface="Meiryo UI" panose="020B0604030504040204" pitchFamily="34" charset="-128"/>
+                <a:ea typeface="Meiryo UI" panose="020B0604030504040204" pitchFamily="34" charset="-128"/>
+              </a:defRPr>
+            </a:lvl3pPr>
+            <a:lvl4pPr>
+              <a:defRPr sz="1200">
+                <a:latin typeface="Meiryo UI" panose="020B0604030504040204" pitchFamily="34" charset="-128"/>
+                <a:ea typeface="Meiryo UI" panose="020B0604030504040204" pitchFamily="34" charset="-128"/>
+              </a:defRPr>
+            </a:lvl4pPr>
+            <a:lvl5pPr>
+              <a:defRPr sz="1200">
+                <a:latin typeface="Meiryo UI" panose="020B0604030504040204" pitchFamily="34" charset="-128"/>
+                <a:ea typeface="Meiryo UI" panose="020B0604030504040204" pitchFamily="34" charset="-128"/>
+              </a:defRPr>
+            </a:lvl5pPr>
+          </a:lstStyle>
+          <a:p>
+            <a:pPr lvl="0"/>
+            <a:r>
+              <a:rPr kumimoji="1" lang="ja-JP" altLang="en-US"/>
+              <a:t>マスター テキストの書式設定</a:t>
+            </a:r>
+          </a:p>
+          <a:p>
+            <a:pPr lvl="1"/>
+            <a:r>
+              <a:rPr kumimoji="1" lang="ja-JP" altLang="en-US"/>
+              <a:t>第 </a:t>
+            </a:r>
+            <a:r>
+              <a:rPr kumimoji="1" lang="en-US" altLang="ja-JP"/>
+              <a:t>2 </a:t>
+            </a:r>
+            <a:r>
+              <a:rPr kumimoji="1" lang="ja-JP" altLang="en-US"/>
+              <a:t>レベル</a:t>
+            </a:r>
+          </a:p>
+          <a:p>
+            <a:pPr lvl="2"/>
+            <a:r>
+              <a:rPr kumimoji="1" lang="ja-JP" altLang="en-US"/>
+              <a:t>第 </a:t>
+            </a:r>
+            <a:r>
+              <a:rPr kumimoji="1" lang="en-US" altLang="ja-JP"/>
+              <a:t>3 </a:t>
+            </a:r>
+            <a:r>
+              <a:rPr kumimoji="1" lang="ja-JP" altLang="en-US"/>
+              <a:t>レベル</a:t>
+            </a:r>
+          </a:p>
+          <a:p>
+            <a:pPr lvl="3"/>
+            <a:r>
+              <a:rPr kumimoji="1" lang="ja-JP" altLang="en-US"/>
+              <a:t>第 </a:t>
+            </a:r>
+            <a:r>
+              <a:rPr kumimoji="1" lang="en-US" altLang="ja-JP"/>
+              <a:t>4 </a:t>
+            </a:r>
+            <a:r>
+              <a:rPr kumimoji="1" lang="ja-JP" altLang="en-US"/>
+              <a:t>レベル</a:t>
+            </a:r>
+          </a:p>
+          <a:p>
+            <a:pPr lvl="4"/>
+            <a:r>
+              <a:rPr kumimoji="1" lang="ja-JP" altLang="en-US"/>
+              <a:t>第 </a:t>
+            </a:r>
+            <a:r>
+              <a:rPr kumimoji="1" lang="en-US" altLang="ja-JP"/>
+              <a:t>5 </a:t>
+            </a:r>
+            <a:r>
+              <a:rPr kumimoji="1" lang="ja-JP" altLang="en-US"/>
+              <a:t>レベル</a:t>
+            </a:r>
+          </a:p>
+        </p:txBody>
+      </p:sp>
+      <p:sp>
+        <p:nvSpPr>
+          <p:cNvPr id="7" name="Axis Subtitle">
+            <a:extLst>
+              <a:ext uri="{FF2B5EF4-FFF2-40B4-BE49-F238E27FC236}">
+                <a16:creationId xmlns:a16="http://schemas.microsoft.com/office/drawing/2014/main" id="{1637E228-8434-900D-0254-AF837975524B}"/>
+              </a:ext>
+            </a:extLst>
+          </p:cNvPr>
+          <p:cNvSpPr>
+            <a:spLocks noGrp="1"/>
+          </p:cNvSpPr>
+          <p:nvPr>
+            <p:ph type="subTitle" idx="15" hasCustomPrompt="1"/>
+          </p:nvPr>
+        </p:nvSpPr>
+        <p:spPr>
+          <a:xfrm>
+            <a:off x="312420" y="0"/>
+            <a:ext cx="4694586" cy="320634"/>
+          </a:xfrm>
+        </p:spPr>
+        <p:txBody>
+          <a:bodyPr anchor="b">
+            <a:normAutofit/>
+          </a:bodyPr>
+          <a:lstStyle>
+            <a:lvl1pPr marL="0" indent="0" algn="l">
+              <a:buNone/>
+              <a:defRPr sz="1800">
+                <a:solidFill>
+                  <a:srgbClr val="767676"/>
+                </a:solidFill>
+              </a:defRPr>
+            </a:lvl1pPr>
+            <a:lvl2pPr marL="457200" indent="0" algn="ctr">
+              <a:buNone/>
+              <a:defRPr sz="2000"/>
+            </a:lvl2pPr>
+            <a:lvl3pPr marL="914400" indent="0" algn="ctr">
+              <a:buNone/>
+              <a:defRPr sz="1800"/>
+            </a:lvl3pPr>
+            <a:lvl4pPr marL="1371600" indent="0" algn="ctr">
+              <a:buNone/>
+              <a:defRPr sz="1600"/>
+            </a:lvl4pPr>
+            <a:lvl5pPr marL="1828800" indent="0" algn="ctr">
+              <a:buNone/>
+              <a:defRPr sz="1600"/>
+            </a:lvl5pPr>
+            <a:lvl6pPr marL="2286000" indent="0" algn="ctr">
+              <a:buNone/>
+              <a:defRPr sz="1600"/>
+            </a:lvl6pPr>
+            <a:lvl7pPr marL="2743200" indent="0" algn="ctr">
+              <a:buNone/>
+              <a:defRPr sz="1600"/>
+            </a:lvl7pPr>
+            <a:lvl8pPr marL="3200400" indent="0" algn="ctr">
+              <a:buNone/>
+              <a:defRPr sz="1600"/>
+            </a:lvl8pPr>
+            <a:lvl9pPr marL="3657600" indent="0" algn="ctr">
+              <a:buNone/>
+              <a:defRPr sz="1600"/>
+            </a:lvl9pPr>
+          </a:lstStyle>
+          <a:p>
+            <a:pPr lvl="0"/>
+            <a:r>
+              <a:rPr kumimoji="1" lang="ja-JP" altLang="en-US"/>
+              <a:t>サブタイトル</a:t>
+            </a:r>
+            <a:r>
+              <a:rPr kumimoji="1" lang="en-US" altLang="ja-JP" dirty="0"/>
+              <a:t> </a:t>
+            </a:r>
+            <a:r>
+              <a:rPr kumimoji="1" lang="ja-JP" altLang="en-US"/>
+              <a:t>の書式設定</a:t>
+            </a:r>
+          </a:p>
+        </p:txBody>
+      </p:sp>
+      <p:sp>
+        <p:nvSpPr>
+          <p:cNvPr id="5" name="Logo">
+            <a:extLst>
+              <a:ext uri="{FF2B5EF4-FFF2-40B4-BE49-F238E27FC236}">
+                <a16:creationId xmlns:a16="http://schemas.microsoft.com/office/drawing/2014/main" id="{4E369FD4-93A8-E2C2-D23D-495B39C171AF}"/>
+              </a:ext>
+            </a:extLst>
+          </p:cNvPr>
+          <p:cNvSpPr>
+            <a:spLocks noGrp="1"/>
+          </p:cNvSpPr>
+          <p:nvPr>
+            <p:ph sz="quarter" idx="16" hasCustomPrompt="1"/>
+          </p:nvPr>
+        </p:nvSpPr>
+        <p:spPr>
+          <a:xfrm>
+            <a:off x="10965176" y="5262563"/>
+            <a:ext cx="914400" cy="914400"/>
+          </a:xfrm>
+        </p:spPr>
+        <p:txBody>
+          <a:bodyPr/>
+          <a:lstStyle>
+            <a:lvl1pPr marL="0" indent="0">
+              <a:buNone/>
+              <a:defRPr/>
+            </a:lvl1pPr>
+          </a:lstStyle>
+          <a:p>
+            <a:pPr lvl="0"/>
+            <a:r>
+              <a:rPr kumimoji="1" lang="en-US" altLang="ja-JP" dirty="0"/>
+              <a:t>logo</a:t>
+            </a:r>
+            <a:endParaRPr kumimoji="1" lang="ja-JP" altLang="en-US"/>
+          </a:p>
+        </p:txBody>
+      </p:sp>
+    </p:spTree>
+    <p:extLst>
+      <p:ext uri="{BB962C8B-B14F-4D97-AF65-F5344CB8AC3E}">
+        <p14:creationId xmlns:p14="http://schemas.microsoft.com/office/powerpoint/2010/main" val="3761077251"/>
+      </p:ext>
+    </p:extLst>
+  </p:cSld>
+  <p:clrMapOvr>
+    <a:masterClrMapping/>
+  </p:clrMapOvr>
+</p:sldLayout>
+</file>
+
+<file path=ppt/slideLayouts/slideLayout9.xml><?xml version="1.0" encoding="utf-8"?>
+<p:sldLayout xmlns:a="http://schemas.openxmlformats.org/drawingml/2006/main" xmlns:r="http://schemas.openxmlformats.org/officeDocument/2006/relationships" xmlns:p="http://schemas.openxmlformats.org/presentationml/2006/main" preserve="1" userDrawn="1">
+  <p:cSld name="Fact Sheet">
+    <p:spTree>
+      <p:nvGrpSpPr>
+        <p:cNvPr id="1" name=""/>
+        <p:cNvGrpSpPr/>
+        <p:nvPr/>
+      </p:nvGrpSpPr>
+      <p:grpSpPr>
+        <a:xfrm>
+          <a:off x="0" y="0"/>
+          <a:ext cx="0" cy="0"/>
+          <a:chOff x="0" y="0"/>
+          <a:chExt cx="0" cy="0"/>
+        </a:xfrm>
+      </p:grpSpPr>
+      <p:sp>
+        <p:nvSpPr>
+          <p:cNvPr id="2" name="タイトル 1">
+            <a:extLst>
+              <a:ext uri="{FF2B5EF4-FFF2-40B4-BE49-F238E27FC236}">
+                <a16:creationId xmlns:a16="http://schemas.microsoft.com/office/drawing/2014/main" id="{1C878911-0E99-4C7F-A17C-E4C6E06AD3EB}"/>
+              </a:ext>
+            </a:extLst>
+          </p:cNvPr>
+          <p:cNvSpPr>
+            <a:spLocks noGrp="1"/>
+          </p:cNvSpPr>
+          <p:nvPr>
+            <p:ph type="title"/>
+          </p:nvPr>
+        </p:nvSpPr>
+        <p:spPr/>
+        <p:txBody>
+          <a:bodyPr/>
+          <a:lstStyle>
+            <a:lvl1pPr>
+              <a:defRPr>
+                <a:latin typeface="Meiryo UI" panose="020B0604030504040204" pitchFamily="34" charset="-128"/>
+                <a:ea typeface="Meiryo UI" panose="020B0604030504040204" pitchFamily="34" charset="-128"/>
+              </a:defRPr>
+            </a:lvl1pPr>
+          </a:lstStyle>
+          <a:p>
+            <a:r>
+              <a:rPr kumimoji="1" lang="ja-JP" altLang="en-US"/>
+              <a:t>マスター タイトルの書式設定</a:t>
+            </a:r>
+          </a:p>
+        </p:txBody>
+      </p:sp>
+      <p:sp>
+        <p:nvSpPr>
+          <p:cNvPr id="3" name="Fact Summary">
+            <a:extLst>
+              <a:ext uri="{FF2B5EF4-FFF2-40B4-BE49-F238E27FC236}">
+                <a16:creationId xmlns:a16="http://schemas.microsoft.com/office/drawing/2014/main" id="{CE3F0D44-172A-CF1D-E1C1-730B2FD3226F}"/>
+              </a:ext>
+            </a:extLst>
+          </p:cNvPr>
+          <p:cNvSpPr>
+            <a:spLocks noGrp="1"/>
+          </p:cNvSpPr>
+          <p:nvPr>
+            <p:ph idx="1"/>
+          </p:nvPr>
+        </p:nvSpPr>
+        <p:spPr/>
+        <p:txBody>
+          <a:bodyPr>
+            <a:normAutofit/>
+          </a:bodyPr>
+          <a:lstStyle>
+            <a:lvl1pPr>
+              <a:defRPr sz="1800">
+                <a:latin typeface="Meiryo UI" panose="020B0604030504040204" pitchFamily="34" charset="-128"/>
+                <a:ea typeface="Meiryo UI" panose="020B0604030504040204" pitchFamily="34" charset="-128"/>
+              </a:defRPr>
+            </a:lvl1pPr>
+            <a:lvl2pPr>
+              <a:defRPr sz="1600">
+                <a:latin typeface="Meiryo UI" panose="020B0604030504040204" pitchFamily="34" charset="-128"/>
+                <a:ea typeface="Meiryo UI" panose="020B0604030504040204" pitchFamily="34" charset="-128"/>
+              </a:defRPr>
+            </a:lvl2pPr>
+            <a:lvl3pPr>
+              <a:defRPr sz="1400">
+                <a:latin typeface="Meiryo UI" panose="020B0604030504040204" pitchFamily="34" charset="-128"/>
+                <a:ea typeface="Meiryo UI" panose="020B0604030504040204" pitchFamily="34" charset="-128"/>
+              </a:defRPr>
+            </a:lvl3pPr>
+            <a:lvl4pPr>
+              <a:defRPr sz="1200">
+                <a:latin typeface="Meiryo UI" panose="020B0604030504040204" pitchFamily="34" charset="-128"/>
+                <a:ea typeface="Meiryo UI" panose="020B0604030504040204" pitchFamily="34" charset="-128"/>
+              </a:defRPr>
+            </a:lvl4pPr>
+            <a:lvl5pPr>
+              <a:defRPr sz="1200">
+                <a:latin typeface="Meiryo UI" panose="020B0604030504040204" pitchFamily="34" charset="-128"/>
+                <a:ea typeface="Meiryo UI" panose="020B0604030504040204" pitchFamily="34" charset="-128"/>
+              </a:defRPr>
+            </a:lvl5pPr>
+          </a:lstStyle>
+          <a:p>
+            <a:pPr lvl="0"/>
+            <a:r>
+              <a:rPr kumimoji="1" lang="ja-JP" altLang="en-US"/>
+              <a:t>マスター テキストの書式設定</a:t>
+            </a:r>
+          </a:p>
+          <a:p>
+            <a:pPr lvl="1"/>
+            <a:r>
+              <a:rPr kumimoji="1" lang="ja-JP" altLang="en-US"/>
+              <a:t>第 </a:t>
+            </a:r>
+            <a:r>
+              <a:rPr kumimoji="1" lang="en-US" altLang="ja-JP"/>
+              <a:t>2 </a:t>
+            </a:r>
+            <a:r>
+              <a:rPr kumimoji="1" lang="ja-JP" altLang="en-US"/>
+              <a:t>レベル</a:t>
+            </a:r>
+          </a:p>
+          <a:p>
+            <a:pPr lvl="2"/>
+            <a:r>
+              <a:rPr kumimoji="1" lang="ja-JP" altLang="en-US"/>
+              <a:t>第 </a:t>
+            </a:r>
+            <a:r>
+              <a:rPr kumimoji="1" lang="en-US" altLang="ja-JP"/>
+              <a:t>3 </a:t>
+            </a:r>
+            <a:r>
+              <a:rPr kumimoji="1" lang="ja-JP" altLang="en-US"/>
+              <a:t>レベル</a:t>
+            </a:r>
+          </a:p>
+          <a:p>
+            <a:pPr lvl="3"/>
+            <a:r>
+              <a:rPr kumimoji="1" lang="ja-JP" altLang="en-US"/>
+              <a:t>第 </a:t>
+            </a:r>
+            <a:r>
+              <a:rPr kumimoji="1" lang="en-US" altLang="ja-JP"/>
+              <a:t>4 </a:t>
+            </a:r>
+            <a:r>
+              <a:rPr kumimoji="1" lang="ja-JP" altLang="en-US"/>
+              <a:t>レベル</a:t>
+            </a:r>
+          </a:p>
+          <a:p>
+            <a:pPr lvl="4"/>
+            <a:r>
+              <a:rPr kumimoji="1" lang="ja-JP" altLang="en-US"/>
+              <a:t>第 </a:t>
+            </a:r>
+            <a:r>
+              <a:rPr kumimoji="1" lang="en-US" altLang="ja-JP"/>
+              <a:t>5 </a:t>
+            </a:r>
+            <a:r>
+              <a:rPr kumimoji="1" lang="ja-JP" altLang="en-US"/>
+              <a:t>レベル</a:t>
+            </a:r>
+          </a:p>
+        </p:txBody>
+      </p:sp>
+      <p:sp>
+        <p:nvSpPr>
+          <p:cNvPr id="6" name="スライド番号プレースホルダー 5">
+            <a:extLst>
+              <a:ext uri="{FF2B5EF4-FFF2-40B4-BE49-F238E27FC236}">
+                <a16:creationId xmlns:a16="http://schemas.microsoft.com/office/drawing/2014/main" id="{ED36DFD0-93B2-8751-F203-50EE02E97C4C}"/>
+              </a:ext>
+            </a:extLst>
+          </p:cNvPr>
+          <p:cNvSpPr>
+            <a:spLocks noGrp="1"/>
+          </p:cNvSpPr>
+          <p:nvPr>
+            <p:ph type="sldNum" sz="quarter" idx="12"/>
+          </p:nvPr>
+        </p:nvSpPr>
+        <p:spPr/>
+        <p:txBody>
+          <a:bodyPr/>
+          <a:lstStyle>
+            <a:lvl1pPr>
+              <a:defRPr>
+                <a:latin typeface="Meiryo UI" panose="020B0604030504040204" pitchFamily="34" charset="-128"/>
+                <a:ea typeface="Meiryo UI" panose="020B0604030504040204" pitchFamily="34" charset="-128"/>
+              </a:defRPr>
+            </a:lvl1pPr>
+          </a:lstStyle>
+          <a:p>
+            <a:fld id="{C9FB15DA-11C7-0141-B5F8-718388A4C1CD}" type="slidenum">
+              <a:rPr lang="ja-JP" altLang="en-US" smtClean="0"/>
+              <a:pPr/>
+              <a:t>‹#›</a:t>
+            </a:fld>
+            <a:endParaRPr lang="ja-JP" altLang="en-US"/>
+          </a:p>
+        </p:txBody>
+      </p:sp>
+      <p:sp>
+        <p:nvSpPr>
+          <p:cNvPr id="5" name="Fact Subtitle">
+            <a:extLst>
+              <a:ext uri="{FF2B5EF4-FFF2-40B4-BE49-F238E27FC236}">
+                <a16:creationId xmlns:a16="http://schemas.microsoft.com/office/drawing/2014/main" id="{BC739F27-A820-A358-F2A4-B0876CFE8CED}"/>
+              </a:ext>
+            </a:extLst>
+          </p:cNvPr>
+          <p:cNvSpPr>
+            <a:spLocks noGrp="1"/>
+          </p:cNvSpPr>
+          <p:nvPr>
+            <p:ph type="subTitle" idx="15" hasCustomPrompt="1"/>
+          </p:nvPr>
+        </p:nvSpPr>
+        <p:spPr>
+          <a:xfrm>
+            <a:off x="312420" y="0"/>
+            <a:ext cx="4694586" cy="320634"/>
+          </a:xfrm>
+        </p:spPr>
+        <p:txBody>
+          <a:bodyPr anchor="b">
+            <a:normAutofit/>
+          </a:bodyPr>
+          <a:lstStyle>
+            <a:lvl1pPr marL="0" indent="0" algn="l">
+              <a:buNone/>
+              <a:defRPr sz="1800">
+                <a:solidFill>
+                  <a:srgbClr val="767676"/>
+                </a:solidFill>
+              </a:defRPr>
+            </a:lvl1pPr>
+            <a:lvl2pPr marL="457200" indent="0" algn="ctr">
+              <a:buNone/>
+              <a:defRPr sz="2000"/>
+            </a:lvl2pPr>
+            <a:lvl3pPr marL="914400" indent="0" algn="ctr">
+              <a:buNone/>
+              <a:defRPr sz="1800"/>
+            </a:lvl3pPr>
+            <a:lvl4pPr marL="1371600" indent="0" algn="ctr">
+              <a:buNone/>
+              <a:defRPr sz="1600"/>
+            </a:lvl4pPr>
+            <a:lvl5pPr marL="1828800" indent="0" algn="ctr">
+              <a:buNone/>
+              <a:defRPr sz="1600"/>
+            </a:lvl5pPr>
+            <a:lvl6pPr marL="2286000" indent="0" algn="ctr">
+              <a:buNone/>
+              <a:defRPr sz="1600"/>
+            </a:lvl6pPr>
+            <a:lvl7pPr marL="2743200" indent="0" algn="ctr">
+              <a:buNone/>
+              <a:defRPr sz="1600"/>
+            </a:lvl7pPr>
+            <a:lvl8pPr marL="3200400" indent="0" algn="ctr">
+              <a:buNone/>
+              <a:defRPr sz="1600"/>
+            </a:lvl8pPr>
+            <a:lvl9pPr marL="3657600" indent="0" algn="ctr">
+              <a:buNone/>
+              <a:defRPr sz="1600"/>
+            </a:lvl9pPr>
+          </a:lstStyle>
+          <a:p>
+            <a:pPr lvl="0"/>
+            <a:r>
+              <a:rPr kumimoji="1" lang="ja-JP" altLang="en-US"/>
+              <a:t>サブタイトル</a:t>
+            </a:r>
+            <a:r>
+              <a:rPr kumimoji="1" lang="en-US" altLang="ja-JP" dirty="0"/>
+              <a:t> </a:t>
+            </a:r>
+            <a:r>
+              <a:rPr kumimoji="1" lang="ja-JP" altLang="en-US"/>
+              <a:t>の書式設定</a:t>
+            </a:r>
+          </a:p>
+        </p:txBody>
+      </p:sp>
+      <p:sp>
+        <p:nvSpPr>
+          <p:cNvPr id="4" name="Logo">
+            <a:extLst>
+              <a:ext uri="{FF2B5EF4-FFF2-40B4-BE49-F238E27FC236}">
+                <a16:creationId xmlns:a16="http://schemas.microsoft.com/office/drawing/2014/main" id="{C8B9E751-8D56-C809-58EB-50C7E7A35524}"/>
+              </a:ext>
+            </a:extLst>
+          </p:cNvPr>
+          <p:cNvSpPr>
+            <a:spLocks noGrp="1"/>
+          </p:cNvSpPr>
+          <p:nvPr>
+            <p:ph sz="quarter" idx="14" hasCustomPrompt="1"/>
+          </p:nvPr>
+        </p:nvSpPr>
+        <p:spPr>
+          <a:xfrm>
+            <a:off x="10965176" y="5262563"/>
+            <a:ext cx="914400" cy="914400"/>
+          </a:xfrm>
+        </p:spPr>
+        <p:txBody>
+          <a:bodyPr/>
+          <a:lstStyle>
+            <a:lvl1pPr marL="0" indent="0">
+              <a:buNone/>
+              <a:defRPr/>
+            </a:lvl1pPr>
+          </a:lstStyle>
+          <a:p>
+            <a:pPr lvl="0"/>
+            <a:r>
+              <a:rPr kumimoji="1" lang="en-US" altLang="ja-JP" dirty="0"/>
+              <a:t>logo</a:t>
+            </a:r>
+            <a:endParaRPr kumimoji="1" lang="ja-JP" altLang="en-US"/>
+          </a:p>
+        </p:txBody>
+      </p:sp>
+    </p:spTree>
+    <p:extLst>
+      <p:ext uri="{BB962C8B-B14F-4D97-AF65-F5344CB8AC3E}">
+        <p14:creationId xmlns:p14="http://schemas.microsoft.com/office/powerpoint/2010/main" val="3983333325"/>
+      </p:ext>
+    </p:extLst>
+  </p:cSld>
+  <p:clrMapOvr>
+    <a:masterClrMapping/>
+  </p:clrMapOvr>
+</p:sldLayout>
+</file>
+
 <file path=ppt/slideMasters/slideMaster1.xml><?xml version="1.0" encoding="utf-8"?>
 <p:sldMaster xmlns:a="http://schemas.openxmlformats.org/drawingml/2006/main" xmlns:r="http://schemas.openxmlformats.org/officeDocument/2006/relationships" xmlns:p="http://schemas.openxmlformats.org/presentationml/2006/main" preserve="1">
   <p:cSld>
@@ -3248,6 +4559,9 @@
     <p:sldLayoutId id="2147483653" r:id="rId4"/>
     <p:sldLayoutId id="2147483655" r:id="rId5"/>
     <p:sldLayoutId id="2147483654" r:id="rId6"/>
+    <p:sldLayoutId id="2147483656" r:id="rId8"/>
+    <p:sldLayoutId id="2147483657" r:id="rId9"/>
+    <p:sldLayoutId id="2147483658" r:id="rId10"/>
   </p:sldLayoutIdLst>
   <p:hf sldNum="0" hdr="0" dt="0"/>
   <p:txStyles>

</xml_diff>

<commit_message>
feat: expand template layout patterns for RM-038 (#238)
* docs(todo): add rm038 template pattern todo

* docs(todo): record rm038 branch setup

* docs(roadmap): track rm038 todo kickoff

* feat(templates): add rm038 layout patterns

* chore(todo): sync todo files → issues [skip md->issues]

* feat: integrate draft intelligence PoC (#235)

* docs(todo): add rm-036 kickoff todo

* chore(todo): sync todo files → issues [skip md->issues]

* feat(draft): add draft intelligence poc pipeline

* chore(todo): auto-complete PR #235

* chore(samples): add layout jsonl sample

---------

Co-authored-by: github-actions[bot] <41898282+github-actions[bot]@users.noreply.github.com>

* docs: document new layout patterns

* docs(todo): log rm038 progress

* chore(todo): sync todo files → issues [skip md->issues]

* docs(todo): close rm038 requirements check

* chore(todo): auto-complete PR #238

---------

Co-authored-by: github-actions[bot] <41898282+github-actions[bot]@users.noreply.github.com>
</commit_message>
<xml_diff>
--- a/samples/templates/templates.pptx
+++ b/samples/templates/templates.pptx
@@ -2979,6 +2979,1317 @@
 </p:sldLayout>
 </file>
 
+<file path=ppt/slideLayouts/slideLayout7.xml><?xml version="1.0" encoding="utf-8"?>
+<p:sldLayout xmlns:a="http://schemas.openxmlformats.org/drawingml/2006/main" xmlns:r="http://schemas.openxmlformats.org/officeDocument/2006/relationships" xmlns:p="http://schemas.openxmlformats.org/presentationml/2006/main" preserve="1" userDrawn="1">
+  <p:cSld name="Timeline Detail">
+    <p:spTree>
+      <p:nvGrpSpPr>
+        <p:cNvPr id="1" name=""/>
+        <p:cNvGrpSpPr/>
+        <p:nvPr/>
+      </p:nvGrpSpPr>
+      <p:grpSpPr>
+        <a:xfrm>
+          <a:off x="0" y="0"/>
+          <a:ext cx="0" cy="0"/>
+          <a:chOff x="0" y="0"/>
+          <a:chExt cx="0" cy="0"/>
+        </a:xfrm>
+      </p:grpSpPr>
+      <p:sp>
+        <p:nvSpPr>
+          <p:cNvPr id="2" name="タイトル 1">
+            <a:extLst>
+              <a:ext uri="{FF2B5EF4-FFF2-40B4-BE49-F238E27FC236}">
+                <a16:creationId xmlns:a16="http://schemas.microsoft.com/office/drawing/2014/main" id="{1C878911-0E99-4C7F-A17C-E4C6E06AD3EB}"/>
+              </a:ext>
+            </a:extLst>
+          </p:cNvPr>
+          <p:cNvSpPr>
+            <a:spLocks noGrp="1"/>
+          </p:cNvSpPr>
+          <p:nvPr>
+            <p:ph type="title"/>
+          </p:nvPr>
+        </p:nvSpPr>
+        <p:spPr/>
+        <p:txBody>
+          <a:bodyPr/>
+          <a:lstStyle>
+            <a:lvl1pPr>
+              <a:defRPr>
+                <a:latin typeface="Meiryo UI" panose="020B0604030504040204" pitchFamily="34" charset="-128"/>
+                <a:ea typeface="Meiryo UI" panose="020B0604030504040204" pitchFamily="34" charset="-128"/>
+              </a:defRPr>
+            </a:lvl1pPr>
+          </a:lstStyle>
+          <a:p>
+            <a:r>
+              <a:rPr kumimoji="1" lang="ja-JP" altLang="en-US"/>
+              <a:t>マスター タイトルの書式設定</a:t>
+            </a:r>
+          </a:p>
+        </p:txBody>
+      </p:sp>
+      <p:sp>
+        <p:nvSpPr>
+          <p:cNvPr id="3" name="Timeline Track">
+            <a:extLst>
+              <a:ext uri="{FF2B5EF4-FFF2-40B4-BE49-F238E27FC236}">
+                <a16:creationId xmlns:a16="http://schemas.microsoft.com/office/drawing/2014/main" id="{CE3F0D44-172A-CF1D-E1C1-730B2FD3226F}"/>
+              </a:ext>
+            </a:extLst>
+          </p:cNvPr>
+          <p:cNvSpPr>
+            <a:spLocks noGrp="1"/>
+          </p:cNvSpPr>
+          <p:nvPr>
+            <p:ph idx="1"/>
+          </p:nvPr>
+        </p:nvSpPr>
+        <p:spPr>
+          <a:xfrm>
+            <a:off x="312420" y="1591294"/>
+            <a:ext cx="5653374" cy="4585669"/>
+          </a:xfrm>
+        </p:spPr>
+        <p:txBody>
+          <a:bodyPr>
+            <a:normAutofit/>
+          </a:bodyPr>
+          <a:lstStyle>
+            <a:lvl1pPr>
+              <a:defRPr sz="1800">
+                <a:latin typeface="Meiryo UI" panose="020B0604030504040204" pitchFamily="34" charset="-128"/>
+                <a:ea typeface="Meiryo UI" panose="020B0604030504040204" pitchFamily="34" charset="-128"/>
+              </a:defRPr>
+            </a:lvl1pPr>
+            <a:lvl2pPr>
+              <a:defRPr sz="1600">
+                <a:latin typeface="Meiryo UI" panose="020B0604030504040204" pitchFamily="34" charset="-128"/>
+                <a:ea typeface="Meiryo UI" panose="020B0604030504040204" pitchFamily="34" charset="-128"/>
+              </a:defRPr>
+            </a:lvl2pPr>
+            <a:lvl3pPr>
+              <a:defRPr sz="1400">
+                <a:latin typeface="Meiryo UI" panose="020B0604030504040204" pitchFamily="34" charset="-128"/>
+                <a:ea typeface="Meiryo UI" panose="020B0604030504040204" pitchFamily="34" charset="-128"/>
+              </a:defRPr>
+            </a:lvl3pPr>
+            <a:lvl4pPr>
+              <a:defRPr sz="1200">
+                <a:latin typeface="Meiryo UI" panose="020B0604030504040204" pitchFamily="34" charset="-128"/>
+                <a:ea typeface="Meiryo UI" panose="020B0604030504040204" pitchFamily="34" charset="-128"/>
+              </a:defRPr>
+            </a:lvl4pPr>
+            <a:lvl5pPr>
+              <a:defRPr sz="1200">
+                <a:latin typeface="Meiryo UI" panose="020B0604030504040204" pitchFamily="34" charset="-128"/>
+                <a:ea typeface="Meiryo UI" panose="020B0604030504040204" pitchFamily="34" charset="-128"/>
+              </a:defRPr>
+            </a:lvl5pPr>
+          </a:lstStyle>
+          <a:p>
+            <a:pPr lvl="0"/>
+            <a:r>
+              <a:rPr kumimoji="1" lang="ja-JP" altLang="en-US"/>
+              <a:t>マスター テキストの書式設定</a:t>
+            </a:r>
+          </a:p>
+          <a:p>
+            <a:pPr lvl="1"/>
+            <a:r>
+              <a:rPr kumimoji="1" lang="ja-JP" altLang="en-US"/>
+              <a:t>第 </a:t>
+            </a:r>
+            <a:r>
+              <a:rPr kumimoji="1" lang="en-US" altLang="ja-JP"/>
+              <a:t>2 </a:t>
+            </a:r>
+            <a:r>
+              <a:rPr kumimoji="1" lang="ja-JP" altLang="en-US"/>
+              <a:t>レベル</a:t>
+            </a:r>
+          </a:p>
+          <a:p>
+            <a:pPr lvl="2"/>
+            <a:r>
+              <a:rPr kumimoji="1" lang="ja-JP" altLang="en-US"/>
+              <a:t>第 </a:t>
+            </a:r>
+            <a:r>
+              <a:rPr kumimoji="1" lang="en-US" altLang="ja-JP"/>
+              <a:t>3 </a:t>
+            </a:r>
+            <a:r>
+              <a:rPr kumimoji="1" lang="ja-JP" altLang="en-US"/>
+              <a:t>レベル</a:t>
+            </a:r>
+          </a:p>
+          <a:p>
+            <a:pPr lvl="3"/>
+            <a:r>
+              <a:rPr kumimoji="1" lang="ja-JP" altLang="en-US"/>
+              <a:t>第 </a:t>
+            </a:r>
+            <a:r>
+              <a:rPr kumimoji="1" lang="en-US" altLang="ja-JP"/>
+              <a:t>4 </a:t>
+            </a:r>
+            <a:r>
+              <a:rPr kumimoji="1" lang="ja-JP" altLang="en-US"/>
+              <a:t>レベル</a:t>
+            </a:r>
+          </a:p>
+          <a:p>
+            <a:pPr lvl="4"/>
+            <a:r>
+              <a:rPr kumimoji="1" lang="ja-JP" altLang="en-US"/>
+              <a:t>第 </a:t>
+            </a:r>
+            <a:r>
+              <a:rPr kumimoji="1" lang="en-US" altLang="ja-JP"/>
+              <a:t>5 </a:t>
+            </a:r>
+            <a:r>
+              <a:rPr kumimoji="1" lang="ja-JP" altLang="en-US"/>
+              <a:t>レベル</a:t>
+            </a:r>
+          </a:p>
+        </p:txBody>
+      </p:sp>
+      <p:sp>
+        <p:nvSpPr>
+          <p:cNvPr id="6" name="スライド番号プレースホルダー 5">
+            <a:extLst>
+              <a:ext uri="{FF2B5EF4-FFF2-40B4-BE49-F238E27FC236}">
+                <a16:creationId xmlns:a16="http://schemas.microsoft.com/office/drawing/2014/main" id="{ED36DFD0-93B2-8751-F203-50EE02E97C4C}"/>
+              </a:ext>
+            </a:extLst>
+          </p:cNvPr>
+          <p:cNvSpPr>
+            <a:spLocks noGrp="1"/>
+          </p:cNvSpPr>
+          <p:nvPr>
+            <p:ph type="sldNum" sz="quarter" idx="12"/>
+          </p:nvPr>
+        </p:nvSpPr>
+        <p:spPr/>
+        <p:txBody>
+          <a:bodyPr/>
+          <a:lstStyle>
+            <a:lvl1pPr>
+              <a:defRPr>
+                <a:latin typeface="Meiryo UI" panose="020B0604030504040204" pitchFamily="34" charset="-128"/>
+                <a:ea typeface="Meiryo UI" panose="020B0604030504040204" pitchFamily="34" charset="-128"/>
+              </a:defRPr>
+            </a:lvl1pPr>
+          </a:lstStyle>
+          <a:p>
+            <a:fld id="{C9FB15DA-11C7-0141-B5F8-718388A4C1CD}" type="slidenum">
+              <a:rPr lang="ja-JP" altLang="en-US" smtClean="0"/>
+              <a:pPr/>
+              <a:t>‹#›</a:t>
+            </a:fld>
+            <a:endParaRPr lang="ja-JP" altLang="en-US"/>
+          </a:p>
+        </p:txBody>
+      </p:sp>
+      <p:sp>
+        <p:nvSpPr>
+          <p:cNvPr id="4" name="Timeline Notes">
+            <a:extLst>
+              <a:ext uri="{FF2B5EF4-FFF2-40B4-BE49-F238E27FC236}">
+                <a16:creationId xmlns:a16="http://schemas.microsoft.com/office/drawing/2014/main" id="{F8E60AB5-72BD-C2E5-C767-BC6D3DD300C1}"/>
+              </a:ext>
+            </a:extLst>
+          </p:cNvPr>
+          <p:cNvSpPr>
+            <a:spLocks noGrp="1"/>
+          </p:cNvSpPr>
+          <p:nvPr>
+            <p:ph idx="14"/>
+          </p:nvPr>
+        </p:nvSpPr>
+        <p:spPr>
+          <a:xfrm>
+            <a:off x="6226206" y="1591293"/>
+            <a:ext cx="5653374" cy="4585669"/>
+          </a:xfrm>
+        </p:spPr>
+        <p:txBody>
+          <a:bodyPr>
+            <a:normAutofit/>
+          </a:bodyPr>
+          <a:lstStyle>
+            <a:lvl1pPr>
+              <a:defRPr sz="1800">
+                <a:latin typeface="Meiryo UI" panose="020B0604030504040204" pitchFamily="34" charset="-128"/>
+                <a:ea typeface="Meiryo UI" panose="020B0604030504040204" pitchFamily="34" charset="-128"/>
+              </a:defRPr>
+            </a:lvl1pPr>
+            <a:lvl2pPr>
+              <a:defRPr sz="1600">
+                <a:latin typeface="Meiryo UI" panose="020B0604030504040204" pitchFamily="34" charset="-128"/>
+                <a:ea typeface="Meiryo UI" panose="020B0604030504040204" pitchFamily="34" charset="-128"/>
+              </a:defRPr>
+            </a:lvl2pPr>
+            <a:lvl3pPr>
+              <a:defRPr sz="1400">
+                <a:latin typeface="Meiryo UI" panose="020B0604030504040204" pitchFamily="34" charset="-128"/>
+                <a:ea typeface="Meiryo UI" panose="020B0604030504040204" pitchFamily="34" charset="-128"/>
+              </a:defRPr>
+            </a:lvl3pPr>
+            <a:lvl4pPr>
+              <a:defRPr sz="1200">
+                <a:latin typeface="Meiryo UI" panose="020B0604030504040204" pitchFamily="34" charset="-128"/>
+                <a:ea typeface="Meiryo UI" panose="020B0604030504040204" pitchFamily="34" charset="-128"/>
+              </a:defRPr>
+            </a:lvl4pPr>
+            <a:lvl5pPr>
+              <a:defRPr sz="1200">
+                <a:latin typeface="Meiryo UI" panose="020B0604030504040204" pitchFamily="34" charset="-128"/>
+                <a:ea typeface="Meiryo UI" panose="020B0604030504040204" pitchFamily="34" charset="-128"/>
+              </a:defRPr>
+            </a:lvl5pPr>
+          </a:lstStyle>
+          <a:p>
+            <a:pPr lvl="0"/>
+            <a:r>
+              <a:rPr kumimoji="1" lang="ja-JP" altLang="en-US"/>
+              <a:t>マスター テキストの書式設定</a:t>
+            </a:r>
+          </a:p>
+          <a:p>
+            <a:pPr lvl="1"/>
+            <a:r>
+              <a:rPr kumimoji="1" lang="ja-JP" altLang="en-US"/>
+              <a:t>第 </a:t>
+            </a:r>
+            <a:r>
+              <a:rPr kumimoji="1" lang="en-US" altLang="ja-JP"/>
+              <a:t>2 </a:t>
+            </a:r>
+            <a:r>
+              <a:rPr kumimoji="1" lang="ja-JP" altLang="en-US"/>
+              <a:t>レベル</a:t>
+            </a:r>
+          </a:p>
+          <a:p>
+            <a:pPr lvl="2"/>
+            <a:r>
+              <a:rPr kumimoji="1" lang="ja-JP" altLang="en-US"/>
+              <a:t>第 </a:t>
+            </a:r>
+            <a:r>
+              <a:rPr kumimoji="1" lang="en-US" altLang="ja-JP"/>
+              <a:t>3 </a:t>
+            </a:r>
+            <a:r>
+              <a:rPr kumimoji="1" lang="ja-JP" altLang="en-US"/>
+              <a:t>レベル</a:t>
+            </a:r>
+          </a:p>
+          <a:p>
+            <a:pPr lvl="3"/>
+            <a:r>
+              <a:rPr kumimoji="1" lang="ja-JP" altLang="en-US"/>
+              <a:t>第 </a:t>
+            </a:r>
+            <a:r>
+              <a:rPr kumimoji="1" lang="en-US" altLang="ja-JP"/>
+              <a:t>4 </a:t>
+            </a:r>
+            <a:r>
+              <a:rPr kumimoji="1" lang="ja-JP" altLang="en-US"/>
+              <a:t>レベル</a:t>
+            </a:r>
+          </a:p>
+          <a:p>
+            <a:pPr lvl="4"/>
+            <a:r>
+              <a:rPr kumimoji="1" lang="ja-JP" altLang="en-US"/>
+              <a:t>第 </a:t>
+            </a:r>
+            <a:r>
+              <a:rPr kumimoji="1" lang="en-US" altLang="ja-JP"/>
+              <a:t>5 </a:t>
+            </a:r>
+            <a:r>
+              <a:rPr kumimoji="1" lang="ja-JP" altLang="en-US"/>
+              <a:t>レベル</a:t>
+            </a:r>
+          </a:p>
+        </p:txBody>
+      </p:sp>
+      <p:sp>
+        <p:nvSpPr>
+          <p:cNvPr id="7" name="Timeline Subtitle">
+            <a:extLst>
+              <a:ext uri="{FF2B5EF4-FFF2-40B4-BE49-F238E27FC236}">
+                <a16:creationId xmlns:a16="http://schemas.microsoft.com/office/drawing/2014/main" id="{1637E228-8434-900D-0254-AF837975524B}"/>
+              </a:ext>
+            </a:extLst>
+          </p:cNvPr>
+          <p:cNvSpPr>
+            <a:spLocks noGrp="1"/>
+          </p:cNvSpPr>
+          <p:nvPr>
+            <p:ph type="subTitle" idx="15" hasCustomPrompt="1"/>
+          </p:nvPr>
+        </p:nvSpPr>
+        <p:spPr>
+          <a:xfrm>
+            <a:off x="312420" y="0"/>
+            <a:ext cx="4694586" cy="320634"/>
+          </a:xfrm>
+        </p:spPr>
+        <p:txBody>
+          <a:bodyPr anchor="b">
+            <a:normAutofit/>
+          </a:bodyPr>
+          <a:lstStyle>
+            <a:lvl1pPr marL="0" indent="0" algn="l">
+              <a:buNone/>
+              <a:defRPr sz="1800">
+                <a:solidFill>
+                  <a:srgbClr val="767676"/>
+                </a:solidFill>
+              </a:defRPr>
+            </a:lvl1pPr>
+            <a:lvl2pPr marL="457200" indent="0" algn="ctr">
+              <a:buNone/>
+              <a:defRPr sz="2000"/>
+            </a:lvl2pPr>
+            <a:lvl3pPr marL="914400" indent="0" algn="ctr">
+              <a:buNone/>
+              <a:defRPr sz="1800"/>
+            </a:lvl3pPr>
+            <a:lvl4pPr marL="1371600" indent="0" algn="ctr">
+              <a:buNone/>
+              <a:defRPr sz="1600"/>
+            </a:lvl4pPr>
+            <a:lvl5pPr marL="1828800" indent="0" algn="ctr">
+              <a:buNone/>
+              <a:defRPr sz="1600"/>
+            </a:lvl5pPr>
+            <a:lvl6pPr marL="2286000" indent="0" algn="ctr">
+              <a:buNone/>
+              <a:defRPr sz="1600"/>
+            </a:lvl6pPr>
+            <a:lvl7pPr marL="2743200" indent="0" algn="ctr">
+              <a:buNone/>
+              <a:defRPr sz="1600"/>
+            </a:lvl7pPr>
+            <a:lvl8pPr marL="3200400" indent="0" algn="ctr">
+              <a:buNone/>
+              <a:defRPr sz="1600"/>
+            </a:lvl8pPr>
+            <a:lvl9pPr marL="3657600" indent="0" algn="ctr">
+              <a:buNone/>
+              <a:defRPr sz="1600"/>
+            </a:lvl9pPr>
+          </a:lstStyle>
+          <a:p>
+            <a:pPr lvl="0"/>
+            <a:r>
+              <a:rPr kumimoji="1" lang="ja-JP" altLang="en-US"/>
+              <a:t>サブタイトル</a:t>
+            </a:r>
+            <a:r>
+              <a:rPr kumimoji="1" lang="en-US" altLang="ja-JP" dirty="0"/>
+              <a:t> </a:t>
+            </a:r>
+            <a:r>
+              <a:rPr kumimoji="1" lang="ja-JP" altLang="en-US"/>
+              <a:t>の書式設定</a:t>
+            </a:r>
+          </a:p>
+        </p:txBody>
+      </p:sp>
+      <p:sp>
+        <p:nvSpPr>
+          <p:cNvPr id="5" name="Logo">
+            <a:extLst>
+              <a:ext uri="{FF2B5EF4-FFF2-40B4-BE49-F238E27FC236}">
+                <a16:creationId xmlns:a16="http://schemas.microsoft.com/office/drawing/2014/main" id="{4E369FD4-93A8-E2C2-D23D-495B39C171AF}"/>
+              </a:ext>
+            </a:extLst>
+          </p:cNvPr>
+          <p:cNvSpPr>
+            <a:spLocks noGrp="1"/>
+          </p:cNvSpPr>
+          <p:nvPr>
+            <p:ph sz="quarter" idx="16" hasCustomPrompt="1"/>
+          </p:nvPr>
+        </p:nvSpPr>
+        <p:spPr>
+          <a:xfrm>
+            <a:off x="10965176" y="5262563"/>
+            <a:ext cx="914400" cy="914400"/>
+          </a:xfrm>
+        </p:spPr>
+        <p:txBody>
+          <a:bodyPr/>
+          <a:lstStyle>
+            <a:lvl1pPr marL="0" indent="0">
+              <a:buNone/>
+              <a:defRPr/>
+            </a:lvl1pPr>
+          </a:lstStyle>
+          <a:p>
+            <a:pPr lvl="0"/>
+            <a:r>
+              <a:rPr kumimoji="1" lang="en-US" altLang="ja-JP" dirty="0"/>
+              <a:t>logo</a:t>
+            </a:r>
+            <a:endParaRPr kumimoji="1" lang="ja-JP" altLang="en-US"/>
+          </a:p>
+        </p:txBody>
+      </p:sp>
+    </p:spTree>
+    <p:extLst>
+      <p:ext uri="{BB962C8B-B14F-4D97-AF65-F5344CB8AC3E}">
+        <p14:creationId xmlns:p14="http://schemas.microsoft.com/office/powerpoint/2010/main" val="3761077251"/>
+      </p:ext>
+    </p:extLst>
+  </p:cSld>
+  <p:clrMapOvr>
+    <a:masterClrMapping/>
+  </p:clrMapOvr>
+</p:sldLayout>
+</file>
+
+<file path=ppt/slideLayouts/slideLayout8.xml><?xml version="1.0" encoding="utf-8"?>
+<p:sldLayout xmlns:a="http://schemas.openxmlformats.org/drawingml/2006/main" xmlns:r="http://schemas.openxmlformats.org/officeDocument/2006/relationships" xmlns:p="http://schemas.openxmlformats.org/presentationml/2006/main" preserve="1" userDrawn="1">
+  <p:cSld name="Comparison Two Axis">
+    <p:spTree>
+      <p:nvGrpSpPr>
+        <p:cNvPr id="1" name=""/>
+        <p:cNvGrpSpPr/>
+        <p:nvPr/>
+      </p:nvGrpSpPr>
+      <p:grpSpPr>
+        <a:xfrm>
+          <a:off x="0" y="0"/>
+          <a:ext cx="0" cy="0"/>
+          <a:chOff x="0" y="0"/>
+          <a:chExt cx="0" cy="0"/>
+        </a:xfrm>
+      </p:grpSpPr>
+      <p:sp>
+        <p:nvSpPr>
+          <p:cNvPr id="2" name="タイトル 1">
+            <a:extLst>
+              <a:ext uri="{FF2B5EF4-FFF2-40B4-BE49-F238E27FC236}">
+                <a16:creationId xmlns:a16="http://schemas.microsoft.com/office/drawing/2014/main" id="{1C878911-0E99-4C7F-A17C-E4C6E06AD3EB}"/>
+              </a:ext>
+            </a:extLst>
+          </p:cNvPr>
+          <p:cNvSpPr>
+            <a:spLocks noGrp="1"/>
+          </p:cNvSpPr>
+          <p:nvPr>
+            <p:ph type="title"/>
+          </p:nvPr>
+        </p:nvSpPr>
+        <p:spPr/>
+        <p:txBody>
+          <a:bodyPr/>
+          <a:lstStyle>
+            <a:lvl1pPr>
+              <a:defRPr>
+                <a:latin typeface="Meiryo UI" panose="020B0604030504040204" pitchFamily="34" charset="-128"/>
+                <a:ea typeface="Meiryo UI" panose="020B0604030504040204" pitchFamily="34" charset="-128"/>
+              </a:defRPr>
+            </a:lvl1pPr>
+          </a:lstStyle>
+          <a:p>
+            <a:r>
+              <a:rPr kumimoji="1" lang="ja-JP" altLang="en-US"/>
+              <a:t>マスター タイトルの書式設定</a:t>
+            </a:r>
+          </a:p>
+        </p:txBody>
+      </p:sp>
+      <p:sp>
+        <p:nvSpPr>
+          <p:cNvPr id="3" name="Axis Left">
+            <a:extLst>
+              <a:ext uri="{FF2B5EF4-FFF2-40B4-BE49-F238E27FC236}">
+                <a16:creationId xmlns:a16="http://schemas.microsoft.com/office/drawing/2014/main" id="{CE3F0D44-172A-CF1D-E1C1-730B2FD3226F}"/>
+              </a:ext>
+            </a:extLst>
+          </p:cNvPr>
+          <p:cNvSpPr>
+            <a:spLocks noGrp="1"/>
+          </p:cNvSpPr>
+          <p:nvPr>
+            <p:ph idx="1"/>
+          </p:nvPr>
+        </p:nvSpPr>
+        <p:spPr>
+          <a:xfrm>
+            <a:off x="312420" y="1591294"/>
+            <a:ext cx="5653374" cy="4585669"/>
+          </a:xfrm>
+        </p:spPr>
+        <p:txBody>
+          <a:bodyPr>
+            <a:normAutofit/>
+          </a:bodyPr>
+          <a:lstStyle>
+            <a:lvl1pPr>
+              <a:defRPr sz="1800">
+                <a:latin typeface="Meiryo UI" panose="020B0604030504040204" pitchFamily="34" charset="-128"/>
+                <a:ea typeface="Meiryo UI" panose="020B0604030504040204" pitchFamily="34" charset="-128"/>
+              </a:defRPr>
+            </a:lvl1pPr>
+            <a:lvl2pPr>
+              <a:defRPr sz="1600">
+                <a:latin typeface="Meiryo UI" panose="020B0604030504040204" pitchFamily="34" charset="-128"/>
+                <a:ea typeface="Meiryo UI" panose="020B0604030504040204" pitchFamily="34" charset="-128"/>
+              </a:defRPr>
+            </a:lvl2pPr>
+            <a:lvl3pPr>
+              <a:defRPr sz="1400">
+                <a:latin typeface="Meiryo UI" panose="020B0604030504040204" pitchFamily="34" charset="-128"/>
+                <a:ea typeface="Meiryo UI" panose="020B0604030504040204" pitchFamily="34" charset="-128"/>
+              </a:defRPr>
+            </a:lvl3pPr>
+            <a:lvl4pPr>
+              <a:defRPr sz="1200">
+                <a:latin typeface="Meiryo UI" panose="020B0604030504040204" pitchFamily="34" charset="-128"/>
+                <a:ea typeface="Meiryo UI" panose="020B0604030504040204" pitchFamily="34" charset="-128"/>
+              </a:defRPr>
+            </a:lvl4pPr>
+            <a:lvl5pPr>
+              <a:defRPr sz="1200">
+                <a:latin typeface="Meiryo UI" panose="020B0604030504040204" pitchFamily="34" charset="-128"/>
+                <a:ea typeface="Meiryo UI" panose="020B0604030504040204" pitchFamily="34" charset="-128"/>
+              </a:defRPr>
+            </a:lvl5pPr>
+          </a:lstStyle>
+          <a:p>
+            <a:pPr lvl="0"/>
+            <a:r>
+              <a:rPr kumimoji="1" lang="ja-JP" altLang="en-US"/>
+              <a:t>マスター テキストの書式設定</a:t>
+            </a:r>
+          </a:p>
+          <a:p>
+            <a:pPr lvl="1"/>
+            <a:r>
+              <a:rPr kumimoji="1" lang="ja-JP" altLang="en-US"/>
+              <a:t>第 </a:t>
+            </a:r>
+            <a:r>
+              <a:rPr kumimoji="1" lang="en-US" altLang="ja-JP"/>
+              <a:t>2 </a:t>
+            </a:r>
+            <a:r>
+              <a:rPr kumimoji="1" lang="ja-JP" altLang="en-US"/>
+              <a:t>レベル</a:t>
+            </a:r>
+          </a:p>
+          <a:p>
+            <a:pPr lvl="2"/>
+            <a:r>
+              <a:rPr kumimoji="1" lang="ja-JP" altLang="en-US"/>
+              <a:t>第 </a:t>
+            </a:r>
+            <a:r>
+              <a:rPr kumimoji="1" lang="en-US" altLang="ja-JP"/>
+              <a:t>3 </a:t>
+            </a:r>
+            <a:r>
+              <a:rPr kumimoji="1" lang="ja-JP" altLang="en-US"/>
+              <a:t>レベル</a:t>
+            </a:r>
+          </a:p>
+          <a:p>
+            <a:pPr lvl="3"/>
+            <a:r>
+              <a:rPr kumimoji="1" lang="ja-JP" altLang="en-US"/>
+              <a:t>第 </a:t>
+            </a:r>
+            <a:r>
+              <a:rPr kumimoji="1" lang="en-US" altLang="ja-JP"/>
+              <a:t>4 </a:t>
+            </a:r>
+            <a:r>
+              <a:rPr kumimoji="1" lang="ja-JP" altLang="en-US"/>
+              <a:t>レベル</a:t>
+            </a:r>
+          </a:p>
+          <a:p>
+            <a:pPr lvl="4"/>
+            <a:r>
+              <a:rPr kumimoji="1" lang="ja-JP" altLang="en-US"/>
+              <a:t>第 </a:t>
+            </a:r>
+            <a:r>
+              <a:rPr kumimoji="1" lang="en-US" altLang="ja-JP"/>
+              <a:t>5 </a:t>
+            </a:r>
+            <a:r>
+              <a:rPr kumimoji="1" lang="ja-JP" altLang="en-US"/>
+              <a:t>レベル</a:t>
+            </a:r>
+          </a:p>
+        </p:txBody>
+      </p:sp>
+      <p:sp>
+        <p:nvSpPr>
+          <p:cNvPr id="6" name="スライド番号プレースホルダー 5">
+            <a:extLst>
+              <a:ext uri="{FF2B5EF4-FFF2-40B4-BE49-F238E27FC236}">
+                <a16:creationId xmlns:a16="http://schemas.microsoft.com/office/drawing/2014/main" id="{ED36DFD0-93B2-8751-F203-50EE02E97C4C}"/>
+              </a:ext>
+            </a:extLst>
+          </p:cNvPr>
+          <p:cNvSpPr>
+            <a:spLocks noGrp="1"/>
+          </p:cNvSpPr>
+          <p:nvPr>
+            <p:ph type="sldNum" sz="quarter" idx="12"/>
+          </p:nvPr>
+        </p:nvSpPr>
+        <p:spPr/>
+        <p:txBody>
+          <a:bodyPr/>
+          <a:lstStyle>
+            <a:lvl1pPr>
+              <a:defRPr>
+                <a:latin typeface="Meiryo UI" panose="020B0604030504040204" pitchFamily="34" charset="-128"/>
+                <a:ea typeface="Meiryo UI" panose="020B0604030504040204" pitchFamily="34" charset="-128"/>
+              </a:defRPr>
+            </a:lvl1pPr>
+          </a:lstStyle>
+          <a:p>
+            <a:fld id="{C9FB15DA-11C7-0141-B5F8-718388A4C1CD}" type="slidenum">
+              <a:rPr lang="ja-JP" altLang="en-US" smtClean="0"/>
+              <a:pPr/>
+              <a:t>‹#›</a:t>
+            </a:fld>
+            <a:endParaRPr lang="ja-JP" altLang="en-US"/>
+          </a:p>
+        </p:txBody>
+      </p:sp>
+      <p:sp>
+        <p:nvSpPr>
+          <p:cNvPr id="4" name="Axis Right">
+            <a:extLst>
+              <a:ext uri="{FF2B5EF4-FFF2-40B4-BE49-F238E27FC236}">
+                <a16:creationId xmlns:a16="http://schemas.microsoft.com/office/drawing/2014/main" id="{F8E60AB5-72BD-C2E5-C767-BC6D3DD300C1}"/>
+              </a:ext>
+            </a:extLst>
+          </p:cNvPr>
+          <p:cNvSpPr>
+            <a:spLocks noGrp="1"/>
+          </p:cNvSpPr>
+          <p:nvPr>
+            <p:ph idx="14"/>
+          </p:nvPr>
+        </p:nvSpPr>
+        <p:spPr>
+          <a:xfrm>
+            <a:off x="6226206" y="1591293"/>
+            <a:ext cx="5653374" cy="4585669"/>
+          </a:xfrm>
+        </p:spPr>
+        <p:txBody>
+          <a:bodyPr>
+            <a:normAutofit/>
+          </a:bodyPr>
+          <a:lstStyle>
+            <a:lvl1pPr>
+              <a:defRPr sz="1800">
+                <a:latin typeface="Meiryo UI" panose="020B0604030504040204" pitchFamily="34" charset="-128"/>
+                <a:ea typeface="Meiryo UI" panose="020B0604030504040204" pitchFamily="34" charset="-128"/>
+              </a:defRPr>
+            </a:lvl1pPr>
+            <a:lvl2pPr>
+              <a:defRPr sz="1600">
+                <a:latin typeface="Meiryo UI" panose="020B0604030504040204" pitchFamily="34" charset="-128"/>
+                <a:ea typeface="Meiryo UI" panose="020B0604030504040204" pitchFamily="34" charset="-128"/>
+              </a:defRPr>
+            </a:lvl2pPr>
+            <a:lvl3pPr>
+              <a:defRPr sz="1400">
+                <a:latin typeface="Meiryo UI" panose="020B0604030504040204" pitchFamily="34" charset="-128"/>
+                <a:ea typeface="Meiryo UI" panose="020B0604030504040204" pitchFamily="34" charset="-128"/>
+              </a:defRPr>
+            </a:lvl3pPr>
+            <a:lvl4pPr>
+              <a:defRPr sz="1200">
+                <a:latin typeface="Meiryo UI" panose="020B0604030504040204" pitchFamily="34" charset="-128"/>
+                <a:ea typeface="Meiryo UI" panose="020B0604030504040204" pitchFamily="34" charset="-128"/>
+              </a:defRPr>
+            </a:lvl4pPr>
+            <a:lvl5pPr>
+              <a:defRPr sz="1200">
+                <a:latin typeface="Meiryo UI" panose="020B0604030504040204" pitchFamily="34" charset="-128"/>
+                <a:ea typeface="Meiryo UI" panose="020B0604030504040204" pitchFamily="34" charset="-128"/>
+              </a:defRPr>
+            </a:lvl5pPr>
+          </a:lstStyle>
+          <a:p>
+            <a:pPr lvl="0"/>
+            <a:r>
+              <a:rPr kumimoji="1" lang="ja-JP" altLang="en-US"/>
+              <a:t>マスター テキストの書式設定</a:t>
+            </a:r>
+          </a:p>
+          <a:p>
+            <a:pPr lvl="1"/>
+            <a:r>
+              <a:rPr kumimoji="1" lang="ja-JP" altLang="en-US"/>
+              <a:t>第 </a:t>
+            </a:r>
+            <a:r>
+              <a:rPr kumimoji="1" lang="en-US" altLang="ja-JP"/>
+              <a:t>2 </a:t>
+            </a:r>
+            <a:r>
+              <a:rPr kumimoji="1" lang="ja-JP" altLang="en-US"/>
+              <a:t>レベル</a:t>
+            </a:r>
+          </a:p>
+          <a:p>
+            <a:pPr lvl="2"/>
+            <a:r>
+              <a:rPr kumimoji="1" lang="ja-JP" altLang="en-US"/>
+              <a:t>第 </a:t>
+            </a:r>
+            <a:r>
+              <a:rPr kumimoji="1" lang="en-US" altLang="ja-JP"/>
+              <a:t>3 </a:t>
+            </a:r>
+            <a:r>
+              <a:rPr kumimoji="1" lang="ja-JP" altLang="en-US"/>
+              <a:t>レベル</a:t>
+            </a:r>
+          </a:p>
+          <a:p>
+            <a:pPr lvl="3"/>
+            <a:r>
+              <a:rPr kumimoji="1" lang="ja-JP" altLang="en-US"/>
+              <a:t>第 </a:t>
+            </a:r>
+            <a:r>
+              <a:rPr kumimoji="1" lang="en-US" altLang="ja-JP"/>
+              <a:t>4 </a:t>
+            </a:r>
+            <a:r>
+              <a:rPr kumimoji="1" lang="ja-JP" altLang="en-US"/>
+              <a:t>レベル</a:t>
+            </a:r>
+          </a:p>
+          <a:p>
+            <a:pPr lvl="4"/>
+            <a:r>
+              <a:rPr kumimoji="1" lang="ja-JP" altLang="en-US"/>
+              <a:t>第 </a:t>
+            </a:r>
+            <a:r>
+              <a:rPr kumimoji="1" lang="en-US" altLang="ja-JP"/>
+              <a:t>5 </a:t>
+            </a:r>
+            <a:r>
+              <a:rPr kumimoji="1" lang="ja-JP" altLang="en-US"/>
+              <a:t>レベル</a:t>
+            </a:r>
+          </a:p>
+        </p:txBody>
+      </p:sp>
+      <p:sp>
+        <p:nvSpPr>
+          <p:cNvPr id="7" name="Axis Subtitle">
+            <a:extLst>
+              <a:ext uri="{FF2B5EF4-FFF2-40B4-BE49-F238E27FC236}">
+                <a16:creationId xmlns:a16="http://schemas.microsoft.com/office/drawing/2014/main" id="{1637E228-8434-900D-0254-AF837975524B}"/>
+              </a:ext>
+            </a:extLst>
+          </p:cNvPr>
+          <p:cNvSpPr>
+            <a:spLocks noGrp="1"/>
+          </p:cNvSpPr>
+          <p:nvPr>
+            <p:ph type="subTitle" idx="15" hasCustomPrompt="1"/>
+          </p:nvPr>
+        </p:nvSpPr>
+        <p:spPr>
+          <a:xfrm>
+            <a:off x="312420" y="0"/>
+            <a:ext cx="4694586" cy="320634"/>
+          </a:xfrm>
+        </p:spPr>
+        <p:txBody>
+          <a:bodyPr anchor="b">
+            <a:normAutofit/>
+          </a:bodyPr>
+          <a:lstStyle>
+            <a:lvl1pPr marL="0" indent="0" algn="l">
+              <a:buNone/>
+              <a:defRPr sz="1800">
+                <a:solidFill>
+                  <a:srgbClr val="767676"/>
+                </a:solidFill>
+              </a:defRPr>
+            </a:lvl1pPr>
+            <a:lvl2pPr marL="457200" indent="0" algn="ctr">
+              <a:buNone/>
+              <a:defRPr sz="2000"/>
+            </a:lvl2pPr>
+            <a:lvl3pPr marL="914400" indent="0" algn="ctr">
+              <a:buNone/>
+              <a:defRPr sz="1800"/>
+            </a:lvl3pPr>
+            <a:lvl4pPr marL="1371600" indent="0" algn="ctr">
+              <a:buNone/>
+              <a:defRPr sz="1600"/>
+            </a:lvl4pPr>
+            <a:lvl5pPr marL="1828800" indent="0" algn="ctr">
+              <a:buNone/>
+              <a:defRPr sz="1600"/>
+            </a:lvl5pPr>
+            <a:lvl6pPr marL="2286000" indent="0" algn="ctr">
+              <a:buNone/>
+              <a:defRPr sz="1600"/>
+            </a:lvl6pPr>
+            <a:lvl7pPr marL="2743200" indent="0" algn="ctr">
+              <a:buNone/>
+              <a:defRPr sz="1600"/>
+            </a:lvl7pPr>
+            <a:lvl8pPr marL="3200400" indent="0" algn="ctr">
+              <a:buNone/>
+              <a:defRPr sz="1600"/>
+            </a:lvl8pPr>
+            <a:lvl9pPr marL="3657600" indent="0" algn="ctr">
+              <a:buNone/>
+              <a:defRPr sz="1600"/>
+            </a:lvl9pPr>
+          </a:lstStyle>
+          <a:p>
+            <a:pPr lvl="0"/>
+            <a:r>
+              <a:rPr kumimoji="1" lang="ja-JP" altLang="en-US"/>
+              <a:t>サブタイトル</a:t>
+            </a:r>
+            <a:r>
+              <a:rPr kumimoji="1" lang="en-US" altLang="ja-JP" dirty="0"/>
+              <a:t> </a:t>
+            </a:r>
+            <a:r>
+              <a:rPr kumimoji="1" lang="ja-JP" altLang="en-US"/>
+              <a:t>の書式設定</a:t>
+            </a:r>
+          </a:p>
+        </p:txBody>
+      </p:sp>
+      <p:sp>
+        <p:nvSpPr>
+          <p:cNvPr id="5" name="Logo">
+            <a:extLst>
+              <a:ext uri="{FF2B5EF4-FFF2-40B4-BE49-F238E27FC236}">
+                <a16:creationId xmlns:a16="http://schemas.microsoft.com/office/drawing/2014/main" id="{4E369FD4-93A8-E2C2-D23D-495B39C171AF}"/>
+              </a:ext>
+            </a:extLst>
+          </p:cNvPr>
+          <p:cNvSpPr>
+            <a:spLocks noGrp="1"/>
+          </p:cNvSpPr>
+          <p:nvPr>
+            <p:ph sz="quarter" idx="16" hasCustomPrompt="1"/>
+          </p:nvPr>
+        </p:nvSpPr>
+        <p:spPr>
+          <a:xfrm>
+            <a:off x="10965176" y="5262563"/>
+            <a:ext cx="914400" cy="914400"/>
+          </a:xfrm>
+        </p:spPr>
+        <p:txBody>
+          <a:bodyPr/>
+          <a:lstStyle>
+            <a:lvl1pPr marL="0" indent="0">
+              <a:buNone/>
+              <a:defRPr/>
+            </a:lvl1pPr>
+          </a:lstStyle>
+          <a:p>
+            <a:pPr lvl="0"/>
+            <a:r>
+              <a:rPr kumimoji="1" lang="en-US" altLang="ja-JP" dirty="0"/>
+              <a:t>logo</a:t>
+            </a:r>
+            <a:endParaRPr kumimoji="1" lang="ja-JP" altLang="en-US"/>
+          </a:p>
+        </p:txBody>
+      </p:sp>
+    </p:spTree>
+    <p:extLst>
+      <p:ext uri="{BB962C8B-B14F-4D97-AF65-F5344CB8AC3E}">
+        <p14:creationId xmlns:p14="http://schemas.microsoft.com/office/powerpoint/2010/main" val="3761077251"/>
+      </p:ext>
+    </p:extLst>
+  </p:cSld>
+  <p:clrMapOvr>
+    <a:masterClrMapping/>
+  </p:clrMapOvr>
+</p:sldLayout>
+</file>
+
+<file path=ppt/slideLayouts/slideLayout9.xml><?xml version="1.0" encoding="utf-8"?>
+<p:sldLayout xmlns:a="http://schemas.openxmlformats.org/drawingml/2006/main" xmlns:r="http://schemas.openxmlformats.org/officeDocument/2006/relationships" xmlns:p="http://schemas.openxmlformats.org/presentationml/2006/main" preserve="1" userDrawn="1">
+  <p:cSld name="Fact Sheet">
+    <p:spTree>
+      <p:nvGrpSpPr>
+        <p:cNvPr id="1" name=""/>
+        <p:cNvGrpSpPr/>
+        <p:nvPr/>
+      </p:nvGrpSpPr>
+      <p:grpSpPr>
+        <a:xfrm>
+          <a:off x="0" y="0"/>
+          <a:ext cx="0" cy="0"/>
+          <a:chOff x="0" y="0"/>
+          <a:chExt cx="0" cy="0"/>
+        </a:xfrm>
+      </p:grpSpPr>
+      <p:sp>
+        <p:nvSpPr>
+          <p:cNvPr id="2" name="タイトル 1">
+            <a:extLst>
+              <a:ext uri="{FF2B5EF4-FFF2-40B4-BE49-F238E27FC236}">
+                <a16:creationId xmlns:a16="http://schemas.microsoft.com/office/drawing/2014/main" id="{1C878911-0E99-4C7F-A17C-E4C6E06AD3EB}"/>
+              </a:ext>
+            </a:extLst>
+          </p:cNvPr>
+          <p:cNvSpPr>
+            <a:spLocks noGrp="1"/>
+          </p:cNvSpPr>
+          <p:nvPr>
+            <p:ph type="title"/>
+          </p:nvPr>
+        </p:nvSpPr>
+        <p:spPr/>
+        <p:txBody>
+          <a:bodyPr/>
+          <a:lstStyle>
+            <a:lvl1pPr>
+              <a:defRPr>
+                <a:latin typeface="Meiryo UI" panose="020B0604030504040204" pitchFamily="34" charset="-128"/>
+                <a:ea typeface="Meiryo UI" panose="020B0604030504040204" pitchFamily="34" charset="-128"/>
+              </a:defRPr>
+            </a:lvl1pPr>
+          </a:lstStyle>
+          <a:p>
+            <a:r>
+              <a:rPr kumimoji="1" lang="ja-JP" altLang="en-US"/>
+              <a:t>マスター タイトルの書式設定</a:t>
+            </a:r>
+          </a:p>
+        </p:txBody>
+      </p:sp>
+      <p:sp>
+        <p:nvSpPr>
+          <p:cNvPr id="3" name="Fact Summary">
+            <a:extLst>
+              <a:ext uri="{FF2B5EF4-FFF2-40B4-BE49-F238E27FC236}">
+                <a16:creationId xmlns:a16="http://schemas.microsoft.com/office/drawing/2014/main" id="{CE3F0D44-172A-CF1D-E1C1-730B2FD3226F}"/>
+              </a:ext>
+            </a:extLst>
+          </p:cNvPr>
+          <p:cNvSpPr>
+            <a:spLocks noGrp="1"/>
+          </p:cNvSpPr>
+          <p:nvPr>
+            <p:ph idx="1"/>
+          </p:nvPr>
+        </p:nvSpPr>
+        <p:spPr/>
+        <p:txBody>
+          <a:bodyPr>
+            <a:normAutofit/>
+          </a:bodyPr>
+          <a:lstStyle>
+            <a:lvl1pPr>
+              <a:defRPr sz="1800">
+                <a:latin typeface="Meiryo UI" panose="020B0604030504040204" pitchFamily="34" charset="-128"/>
+                <a:ea typeface="Meiryo UI" panose="020B0604030504040204" pitchFamily="34" charset="-128"/>
+              </a:defRPr>
+            </a:lvl1pPr>
+            <a:lvl2pPr>
+              <a:defRPr sz="1600">
+                <a:latin typeface="Meiryo UI" panose="020B0604030504040204" pitchFamily="34" charset="-128"/>
+                <a:ea typeface="Meiryo UI" panose="020B0604030504040204" pitchFamily="34" charset="-128"/>
+              </a:defRPr>
+            </a:lvl2pPr>
+            <a:lvl3pPr>
+              <a:defRPr sz="1400">
+                <a:latin typeface="Meiryo UI" panose="020B0604030504040204" pitchFamily="34" charset="-128"/>
+                <a:ea typeface="Meiryo UI" panose="020B0604030504040204" pitchFamily="34" charset="-128"/>
+              </a:defRPr>
+            </a:lvl3pPr>
+            <a:lvl4pPr>
+              <a:defRPr sz="1200">
+                <a:latin typeface="Meiryo UI" panose="020B0604030504040204" pitchFamily="34" charset="-128"/>
+                <a:ea typeface="Meiryo UI" panose="020B0604030504040204" pitchFamily="34" charset="-128"/>
+              </a:defRPr>
+            </a:lvl4pPr>
+            <a:lvl5pPr>
+              <a:defRPr sz="1200">
+                <a:latin typeface="Meiryo UI" panose="020B0604030504040204" pitchFamily="34" charset="-128"/>
+                <a:ea typeface="Meiryo UI" panose="020B0604030504040204" pitchFamily="34" charset="-128"/>
+              </a:defRPr>
+            </a:lvl5pPr>
+          </a:lstStyle>
+          <a:p>
+            <a:pPr lvl="0"/>
+            <a:r>
+              <a:rPr kumimoji="1" lang="ja-JP" altLang="en-US"/>
+              <a:t>マスター テキストの書式設定</a:t>
+            </a:r>
+          </a:p>
+          <a:p>
+            <a:pPr lvl="1"/>
+            <a:r>
+              <a:rPr kumimoji="1" lang="ja-JP" altLang="en-US"/>
+              <a:t>第 </a:t>
+            </a:r>
+            <a:r>
+              <a:rPr kumimoji="1" lang="en-US" altLang="ja-JP"/>
+              <a:t>2 </a:t>
+            </a:r>
+            <a:r>
+              <a:rPr kumimoji="1" lang="ja-JP" altLang="en-US"/>
+              <a:t>レベル</a:t>
+            </a:r>
+          </a:p>
+          <a:p>
+            <a:pPr lvl="2"/>
+            <a:r>
+              <a:rPr kumimoji="1" lang="ja-JP" altLang="en-US"/>
+              <a:t>第 </a:t>
+            </a:r>
+            <a:r>
+              <a:rPr kumimoji="1" lang="en-US" altLang="ja-JP"/>
+              <a:t>3 </a:t>
+            </a:r>
+            <a:r>
+              <a:rPr kumimoji="1" lang="ja-JP" altLang="en-US"/>
+              <a:t>レベル</a:t>
+            </a:r>
+          </a:p>
+          <a:p>
+            <a:pPr lvl="3"/>
+            <a:r>
+              <a:rPr kumimoji="1" lang="ja-JP" altLang="en-US"/>
+              <a:t>第 </a:t>
+            </a:r>
+            <a:r>
+              <a:rPr kumimoji="1" lang="en-US" altLang="ja-JP"/>
+              <a:t>4 </a:t>
+            </a:r>
+            <a:r>
+              <a:rPr kumimoji="1" lang="ja-JP" altLang="en-US"/>
+              <a:t>レベル</a:t>
+            </a:r>
+          </a:p>
+          <a:p>
+            <a:pPr lvl="4"/>
+            <a:r>
+              <a:rPr kumimoji="1" lang="ja-JP" altLang="en-US"/>
+              <a:t>第 </a:t>
+            </a:r>
+            <a:r>
+              <a:rPr kumimoji="1" lang="en-US" altLang="ja-JP"/>
+              <a:t>5 </a:t>
+            </a:r>
+            <a:r>
+              <a:rPr kumimoji="1" lang="ja-JP" altLang="en-US"/>
+              <a:t>レベル</a:t>
+            </a:r>
+          </a:p>
+        </p:txBody>
+      </p:sp>
+      <p:sp>
+        <p:nvSpPr>
+          <p:cNvPr id="6" name="スライド番号プレースホルダー 5">
+            <a:extLst>
+              <a:ext uri="{FF2B5EF4-FFF2-40B4-BE49-F238E27FC236}">
+                <a16:creationId xmlns:a16="http://schemas.microsoft.com/office/drawing/2014/main" id="{ED36DFD0-93B2-8751-F203-50EE02E97C4C}"/>
+              </a:ext>
+            </a:extLst>
+          </p:cNvPr>
+          <p:cNvSpPr>
+            <a:spLocks noGrp="1"/>
+          </p:cNvSpPr>
+          <p:nvPr>
+            <p:ph type="sldNum" sz="quarter" idx="12"/>
+          </p:nvPr>
+        </p:nvSpPr>
+        <p:spPr/>
+        <p:txBody>
+          <a:bodyPr/>
+          <a:lstStyle>
+            <a:lvl1pPr>
+              <a:defRPr>
+                <a:latin typeface="Meiryo UI" panose="020B0604030504040204" pitchFamily="34" charset="-128"/>
+                <a:ea typeface="Meiryo UI" panose="020B0604030504040204" pitchFamily="34" charset="-128"/>
+              </a:defRPr>
+            </a:lvl1pPr>
+          </a:lstStyle>
+          <a:p>
+            <a:fld id="{C9FB15DA-11C7-0141-B5F8-718388A4C1CD}" type="slidenum">
+              <a:rPr lang="ja-JP" altLang="en-US" smtClean="0"/>
+              <a:pPr/>
+              <a:t>‹#›</a:t>
+            </a:fld>
+            <a:endParaRPr lang="ja-JP" altLang="en-US"/>
+          </a:p>
+        </p:txBody>
+      </p:sp>
+      <p:sp>
+        <p:nvSpPr>
+          <p:cNvPr id="5" name="Fact Subtitle">
+            <a:extLst>
+              <a:ext uri="{FF2B5EF4-FFF2-40B4-BE49-F238E27FC236}">
+                <a16:creationId xmlns:a16="http://schemas.microsoft.com/office/drawing/2014/main" id="{BC739F27-A820-A358-F2A4-B0876CFE8CED}"/>
+              </a:ext>
+            </a:extLst>
+          </p:cNvPr>
+          <p:cNvSpPr>
+            <a:spLocks noGrp="1"/>
+          </p:cNvSpPr>
+          <p:nvPr>
+            <p:ph type="subTitle" idx="15" hasCustomPrompt="1"/>
+          </p:nvPr>
+        </p:nvSpPr>
+        <p:spPr>
+          <a:xfrm>
+            <a:off x="312420" y="0"/>
+            <a:ext cx="4694586" cy="320634"/>
+          </a:xfrm>
+        </p:spPr>
+        <p:txBody>
+          <a:bodyPr anchor="b">
+            <a:normAutofit/>
+          </a:bodyPr>
+          <a:lstStyle>
+            <a:lvl1pPr marL="0" indent="0" algn="l">
+              <a:buNone/>
+              <a:defRPr sz="1800">
+                <a:solidFill>
+                  <a:srgbClr val="767676"/>
+                </a:solidFill>
+              </a:defRPr>
+            </a:lvl1pPr>
+            <a:lvl2pPr marL="457200" indent="0" algn="ctr">
+              <a:buNone/>
+              <a:defRPr sz="2000"/>
+            </a:lvl2pPr>
+            <a:lvl3pPr marL="914400" indent="0" algn="ctr">
+              <a:buNone/>
+              <a:defRPr sz="1800"/>
+            </a:lvl3pPr>
+            <a:lvl4pPr marL="1371600" indent="0" algn="ctr">
+              <a:buNone/>
+              <a:defRPr sz="1600"/>
+            </a:lvl4pPr>
+            <a:lvl5pPr marL="1828800" indent="0" algn="ctr">
+              <a:buNone/>
+              <a:defRPr sz="1600"/>
+            </a:lvl5pPr>
+            <a:lvl6pPr marL="2286000" indent="0" algn="ctr">
+              <a:buNone/>
+              <a:defRPr sz="1600"/>
+            </a:lvl6pPr>
+            <a:lvl7pPr marL="2743200" indent="0" algn="ctr">
+              <a:buNone/>
+              <a:defRPr sz="1600"/>
+            </a:lvl7pPr>
+            <a:lvl8pPr marL="3200400" indent="0" algn="ctr">
+              <a:buNone/>
+              <a:defRPr sz="1600"/>
+            </a:lvl8pPr>
+            <a:lvl9pPr marL="3657600" indent="0" algn="ctr">
+              <a:buNone/>
+              <a:defRPr sz="1600"/>
+            </a:lvl9pPr>
+          </a:lstStyle>
+          <a:p>
+            <a:pPr lvl="0"/>
+            <a:r>
+              <a:rPr kumimoji="1" lang="ja-JP" altLang="en-US"/>
+              <a:t>サブタイトル</a:t>
+            </a:r>
+            <a:r>
+              <a:rPr kumimoji="1" lang="en-US" altLang="ja-JP" dirty="0"/>
+              <a:t> </a:t>
+            </a:r>
+            <a:r>
+              <a:rPr kumimoji="1" lang="ja-JP" altLang="en-US"/>
+              <a:t>の書式設定</a:t>
+            </a:r>
+          </a:p>
+        </p:txBody>
+      </p:sp>
+      <p:sp>
+        <p:nvSpPr>
+          <p:cNvPr id="4" name="Logo">
+            <a:extLst>
+              <a:ext uri="{FF2B5EF4-FFF2-40B4-BE49-F238E27FC236}">
+                <a16:creationId xmlns:a16="http://schemas.microsoft.com/office/drawing/2014/main" id="{C8B9E751-8D56-C809-58EB-50C7E7A35524}"/>
+              </a:ext>
+            </a:extLst>
+          </p:cNvPr>
+          <p:cNvSpPr>
+            <a:spLocks noGrp="1"/>
+          </p:cNvSpPr>
+          <p:nvPr>
+            <p:ph sz="quarter" idx="14" hasCustomPrompt="1"/>
+          </p:nvPr>
+        </p:nvSpPr>
+        <p:spPr>
+          <a:xfrm>
+            <a:off x="10965176" y="5262563"/>
+            <a:ext cx="914400" cy="914400"/>
+          </a:xfrm>
+        </p:spPr>
+        <p:txBody>
+          <a:bodyPr/>
+          <a:lstStyle>
+            <a:lvl1pPr marL="0" indent="0">
+              <a:buNone/>
+              <a:defRPr/>
+            </a:lvl1pPr>
+          </a:lstStyle>
+          <a:p>
+            <a:pPr lvl="0"/>
+            <a:r>
+              <a:rPr kumimoji="1" lang="en-US" altLang="ja-JP" dirty="0"/>
+              <a:t>logo</a:t>
+            </a:r>
+            <a:endParaRPr kumimoji="1" lang="ja-JP" altLang="en-US"/>
+          </a:p>
+        </p:txBody>
+      </p:sp>
+    </p:spTree>
+    <p:extLst>
+      <p:ext uri="{BB962C8B-B14F-4D97-AF65-F5344CB8AC3E}">
+        <p14:creationId xmlns:p14="http://schemas.microsoft.com/office/powerpoint/2010/main" val="3983333325"/>
+      </p:ext>
+    </p:extLst>
+  </p:cSld>
+  <p:clrMapOvr>
+    <a:masterClrMapping/>
+  </p:clrMapOvr>
+</p:sldLayout>
+</file>
+
 <file path=ppt/slideMasters/slideMaster1.xml><?xml version="1.0" encoding="utf-8"?>
 <p:sldMaster xmlns:a="http://schemas.openxmlformats.org/drawingml/2006/main" xmlns:r="http://schemas.openxmlformats.org/officeDocument/2006/relationships" xmlns:p="http://schemas.openxmlformats.org/presentationml/2006/main" preserve="1">
   <p:cSld>
@@ -3248,6 +4559,9 @@
     <p:sldLayoutId id="2147483653" r:id="rId4"/>
     <p:sldLayoutId id="2147483655" r:id="rId5"/>
     <p:sldLayoutId id="2147483654" r:id="rId6"/>
+    <p:sldLayoutId id="2147483656" r:id="rId8"/>
+    <p:sldLayoutId id="2147483657" r:id="rId9"/>
+    <p:sldLayoutId id="2147483658" r:id="rId10"/>
   </p:sldLayoutIdLst>
   <p:hf sldNum="0" hdr="0" dt="0"/>
   <p:txStyles>

</xml_diff>

<commit_message>
feat(templates): expand rm043 sample coverage
</commit_message>
<xml_diff>
--- a/samples/templates/templates.pptx
+++ b/samples/templates/templates.pptx
@@ -197,7 +197,7 @@
           <a:p>
             <a:fld id="{D83749C5-FFD9-114C-B10A-D0464B391B79}" type="datetimeFigureOut">
               <a:rPr kumimoji="1" lang="ja-JP" altLang="en-US" smtClean="0"/>
-              <a:t>2025/10/30</a:t>
+              <a:t>2025/10/31</a:t>
             </a:fld>
             <a:endParaRPr kumimoji="1" lang="ja-JP" altLang="en-US"/>
           </a:p>
@@ -498,7 +498,7 @@
 
 <file path=ppt/slideLayouts/slideLayout1.xml><?xml version="1.0" encoding="utf-8"?>
 <p:sldLayout xmlns:a="http://schemas.openxmlformats.org/drawingml/2006/main" xmlns:r="http://schemas.openxmlformats.org/officeDocument/2006/relationships" xmlns:p="http://schemas.openxmlformats.org/presentationml/2006/main" preserve="1" userDrawn="1">
-  <p:cSld name="1_Title">
+  <p:cSld name="Title">
     <p:bg>
       <p:bgRef idx="1001">
         <a:schemeClr val="bg2"/>
@@ -8140,7 +8140,7 @@
       </p:sp>
       <p:sp>
         <p:nvSpPr>
-          <p:cNvPr id="2" name="Key 3">
+          <p:cNvPr id="2" name="Key 4">
             <a:extLst>
               <a:ext uri="{FF2B5EF4-FFF2-40B4-BE49-F238E27FC236}">
                 <a16:creationId xmlns:a16="http://schemas.microsoft.com/office/drawing/2014/main" id="{9099A763-EF8E-0DA1-0B96-6444779B20C3}"/>
@@ -8208,7 +8208,7 @@
       </p:sp>
       <p:sp>
         <p:nvSpPr>
-          <p:cNvPr id="6" name="Value 3">
+          <p:cNvPr id="6" name="Value 4">
             <a:extLst>
               <a:ext uri="{FF2B5EF4-FFF2-40B4-BE49-F238E27FC236}">
                 <a16:creationId xmlns:a16="http://schemas.microsoft.com/office/drawing/2014/main" id="{40709A5F-ABF9-3D53-5E50-17B06BD2EC84}"/>
@@ -8958,7 +8958,7 @@
       </p:sp>
       <p:sp>
         <p:nvSpPr>
-          <p:cNvPr id="2" name="右矢印 1">
+          <p:cNvPr id="2" name="Flow Image Arrow 1">
             <a:extLst>
               <a:ext uri="{FF2B5EF4-FFF2-40B4-BE49-F238E27FC236}">
                 <a16:creationId xmlns:a16="http://schemas.microsoft.com/office/drawing/2014/main" id="{75F21B69-4754-060E-E03A-D4FEF929AD3A}"/>
@@ -9594,7 +9594,7 @@
       </p:sp>
       <p:sp>
         <p:nvSpPr>
-          <p:cNvPr id="4" name="右矢印 3">
+          <p:cNvPr id="4" name="Flow Image Arrow 1">
             <a:extLst>
               <a:ext uri="{FF2B5EF4-FFF2-40B4-BE49-F238E27FC236}">
                 <a16:creationId xmlns:a16="http://schemas.microsoft.com/office/drawing/2014/main" id="{B6C99085-3D89-DED5-00A6-2719676E26FC}"/>
@@ -9652,7 +9652,7 @@
       </p:sp>
       <p:sp>
         <p:nvSpPr>
-          <p:cNvPr id="5" name="右矢印 4">
+          <p:cNvPr id="5" name="Flow Image Arrow 2">
             <a:extLst>
               <a:ext uri="{FF2B5EF4-FFF2-40B4-BE49-F238E27FC236}">
                 <a16:creationId xmlns:a16="http://schemas.microsoft.com/office/drawing/2014/main" id="{7A65E277-B479-3438-E69E-68A0A66DB0BF}"/>
@@ -10131,7 +10131,7 @@
       </p:sp>
       <p:sp>
         <p:nvSpPr>
-          <p:cNvPr id="2" name="右矢印 1">
+          <p:cNvPr id="2" name="Flow Image Arrow 2">
             <a:extLst>
               <a:ext uri="{FF2B5EF4-FFF2-40B4-BE49-F238E27FC236}">
                 <a16:creationId xmlns:a16="http://schemas.microsoft.com/office/drawing/2014/main" id="{75F21B69-4754-060E-E03A-D4FEF929AD3A}"/>
@@ -10413,7 +10413,7 @@
       </p:sp>
       <p:sp>
         <p:nvSpPr>
-          <p:cNvPr id="7" name="右矢印 6">
+          <p:cNvPr id="7" name="Flow Image Arrow 1">
             <a:extLst>
               <a:ext uri="{FF2B5EF4-FFF2-40B4-BE49-F238E27FC236}">
                 <a16:creationId xmlns:a16="http://schemas.microsoft.com/office/drawing/2014/main" id="{7AC79D2C-789E-8956-CCF0-FFAD2406A49F}"/>
@@ -10471,7 +10471,7 @@
       </p:sp>
       <p:sp>
         <p:nvSpPr>
-          <p:cNvPr id="11" name="右矢印 10">
+          <p:cNvPr id="11" name="Flow Image Arrow 3">
             <a:extLst>
               <a:ext uri="{FF2B5EF4-FFF2-40B4-BE49-F238E27FC236}">
                 <a16:creationId xmlns:a16="http://schemas.microsoft.com/office/drawing/2014/main" id="{5ED27B52-A2EC-ED8E-3B8B-4E67E15BA5DB}"/>
@@ -10925,504 +10925,6 @@
     <p:extLst>
       <p:ext uri="{BB962C8B-B14F-4D97-AF65-F5344CB8AC3E}">
         <p14:creationId xmlns:p14="http://schemas.microsoft.com/office/powerpoint/2010/main" val="2420755101"/>
-      </p:ext>
-    </p:extLst>
-  </p:cSld>
-  <p:clrMapOvr>
-    <a:masterClrMapping/>
-  </p:clrMapOvr>
-</p:sldLayout>
-</file>
-
-<file path=ppt/slideLayouts/slideLayout25.xml><?xml version="1.0" encoding="utf-8"?>
-<p:sldLayout xmlns:a="http://schemas.openxmlformats.org/drawingml/2006/main" xmlns:r="http://schemas.openxmlformats.org/officeDocument/2006/relationships" xmlns:p="http://schemas.openxmlformats.org/presentationml/2006/main" preserve="1" userDrawn="1">
-  <p:cSld name="_bk">
-    <p:spTree>
-      <p:nvGrpSpPr>
-        <p:cNvPr id="1" name=""/>
-        <p:cNvGrpSpPr/>
-        <p:nvPr/>
-      </p:nvGrpSpPr>
-      <p:grpSpPr>
-        <a:xfrm>
-          <a:off x="0" y="0"/>
-          <a:ext cx="0" cy="0"/>
-          <a:chOff x="0" y="0"/>
-          <a:chExt cx="0" cy="0"/>
-        </a:xfrm>
-      </p:grpSpPr>
-      <p:sp>
-        <p:nvSpPr>
-          <p:cNvPr id="3" name="コンテンツ プレースホルダー 2">
-            <a:extLst>
-              <a:ext uri="{FF2B5EF4-FFF2-40B4-BE49-F238E27FC236}">
-                <a16:creationId xmlns:a16="http://schemas.microsoft.com/office/drawing/2014/main" id="{CE3F0D44-172A-CF1D-E1C1-730B2FD3226F}"/>
-              </a:ext>
-            </a:extLst>
-          </p:cNvPr>
-          <p:cNvSpPr>
-            <a:spLocks noGrp="1"/>
-          </p:cNvSpPr>
-          <p:nvPr>
-            <p:ph idx="1" hasCustomPrompt="1"/>
-          </p:nvPr>
-        </p:nvSpPr>
-        <p:spPr>
-          <a:xfrm>
-            <a:off x="312420" y="1584729"/>
-            <a:ext cx="3472903" cy="4585669"/>
-          </a:xfrm>
-        </p:spPr>
-        <p:txBody>
-          <a:bodyPr>
-            <a:normAutofit/>
-          </a:bodyPr>
-          <a:lstStyle>
-            <a:lvl1pPr marL="0" indent="0">
-              <a:buNone/>
-              <a:defRPr sz="1800">
-                <a:solidFill>
-                  <a:schemeClr val="tx1"/>
-                </a:solidFill>
-              </a:defRPr>
-            </a:lvl1pPr>
-            <a:lvl2pPr>
-              <a:defRPr sz="1600"/>
-            </a:lvl2pPr>
-            <a:lvl3pPr>
-              <a:defRPr sz="1400"/>
-            </a:lvl3pPr>
-            <a:lvl4pPr>
-              <a:defRPr sz="1200"/>
-            </a:lvl4pPr>
-            <a:lvl5pPr>
-              <a:defRPr sz="1200"/>
-            </a:lvl5pPr>
-          </a:lstStyle>
-          <a:p>
-            <a:pPr lvl="0"/>
-            <a:r>
-              <a:rPr kumimoji="1" lang="en-US" altLang="ja-JP" dirty="0"/>
-              <a:t>Normal color</a:t>
-            </a:r>
-            <a:endParaRPr kumimoji="1" lang="ja-JP" altLang="en-US"/>
-          </a:p>
-        </p:txBody>
-      </p:sp>
-      <p:sp>
-        <p:nvSpPr>
-          <p:cNvPr id="4" name="コンテンツ プレースホルダー 2">
-            <a:extLst>
-              <a:ext uri="{FF2B5EF4-FFF2-40B4-BE49-F238E27FC236}">
-                <a16:creationId xmlns:a16="http://schemas.microsoft.com/office/drawing/2014/main" id="{5C084206-142F-4D8C-51CD-CF22B654AB36}"/>
-              </a:ext>
-            </a:extLst>
-          </p:cNvPr>
-          <p:cNvSpPr>
-            <a:spLocks noGrp="1"/>
-          </p:cNvSpPr>
-          <p:nvPr>
-            <p:ph idx="14" hasCustomPrompt="1"/>
-          </p:nvPr>
-        </p:nvSpPr>
-        <p:spPr>
-          <a:xfrm>
-            <a:off x="4359548" y="1584729"/>
-            <a:ext cx="3472903" cy="2121885"/>
-          </a:xfrm>
-        </p:spPr>
-        <p:txBody>
-          <a:bodyPr>
-            <a:normAutofit/>
-          </a:bodyPr>
-          <a:lstStyle>
-            <a:lvl1pPr marL="0" indent="0">
-              <a:buNone/>
-              <a:defRPr sz="1800" b="1">
-                <a:solidFill>
-                  <a:schemeClr val="tx2"/>
-                </a:solidFill>
-              </a:defRPr>
-            </a:lvl1pPr>
-            <a:lvl2pPr>
-              <a:defRPr sz="1600"/>
-            </a:lvl2pPr>
-            <a:lvl3pPr>
-              <a:defRPr sz="1400"/>
-            </a:lvl3pPr>
-            <a:lvl4pPr>
-              <a:defRPr sz="1200"/>
-            </a:lvl4pPr>
-            <a:lvl5pPr>
-              <a:defRPr sz="1200"/>
-            </a:lvl5pPr>
-          </a:lstStyle>
-          <a:p>
-            <a:pPr lvl="0"/>
-            <a:r>
-              <a:rPr kumimoji="1" lang="en-US" altLang="ja-JP" dirty="0"/>
-              <a:t>Key color</a:t>
-            </a:r>
-            <a:endParaRPr kumimoji="1" lang="ja-JP" altLang="en-US"/>
-          </a:p>
-        </p:txBody>
-      </p:sp>
-      <p:sp>
-        <p:nvSpPr>
-          <p:cNvPr id="8" name="コンテンツ プレースホルダー 2">
-            <a:extLst>
-              <a:ext uri="{FF2B5EF4-FFF2-40B4-BE49-F238E27FC236}">
-                <a16:creationId xmlns:a16="http://schemas.microsoft.com/office/drawing/2014/main" id="{E0CE3638-5069-A1E7-D768-8163A29072CF}"/>
-              </a:ext>
-            </a:extLst>
-          </p:cNvPr>
-          <p:cNvSpPr>
-            <a:spLocks noGrp="1"/>
-          </p:cNvSpPr>
-          <p:nvPr>
-            <p:ph idx="16" hasCustomPrompt="1"/>
-          </p:nvPr>
-        </p:nvSpPr>
-        <p:spPr>
-          <a:xfrm>
-            <a:off x="8406677" y="1584729"/>
-            <a:ext cx="3472903" cy="2121885"/>
-          </a:xfrm>
-          <a:solidFill>
-            <a:schemeClr val="bg1">
-              <a:lumMod val="95000"/>
-            </a:schemeClr>
-          </a:solidFill>
-        </p:spPr>
-        <p:txBody>
-          <a:bodyPr>
-            <a:normAutofit/>
-          </a:bodyPr>
-          <a:lstStyle>
-            <a:lvl1pPr marL="0" indent="0">
-              <a:buNone/>
-              <a:defRPr sz="1800">
-                <a:solidFill>
-                  <a:schemeClr val="tx1"/>
-                </a:solidFill>
-              </a:defRPr>
-            </a:lvl1pPr>
-            <a:lvl2pPr>
-              <a:defRPr sz="1600"/>
-            </a:lvl2pPr>
-            <a:lvl3pPr>
-              <a:defRPr sz="1400"/>
-            </a:lvl3pPr>
-            <a:lvl4pPr>
-              <a:defRPr sz="1200"/>
-            </a:lvl4pPr>
-            <a:lvl5pPr>
-              <a:defRPr sz="1200"/>
-            </a:lvl5pPr>
-          </a:lstStyle>
-          <a:p>
-            <a:pPr lvl="0"/>
-            <a:r>
-              <a:rPr kumimoji="1" lang="en-US" altLang="ja-JP" dirty="0"/>
-              <a:t>Normal back ground</a:t>
-            </a:r>
-            <a:endParaRPr kumimoji="1" lang="ja-JP" altLang="en-US"/>
-          </a:p>
-        </p:txBody>
-      </p:sp>
-      <p:sp>
-        <p:nvSpPr>
-          <p:cNvPr id="9" name="コンテンツ プレースホルダー 2">
-            <a:extLst>
-              <a:ext uri="{FF2B5EF4-FFF2-40B4-BE49-F238E27FC236}">
-                <a16:creationId xmlns:a16="http://schemas.microsoft.com/office/drawing/2014/main" id="{54368A49-F7DF-B4C8-FA3F-7DAE87948348}"/>
-              </a:ext>
-            </a:extLst>
-          </p:cNvPr>
-          <p:cNvSpPr>
-            <a:spLocks noGrp="1"/>
-          </p:cNvSpPr>
-          <p:nvPr>
-            <p:ph idx="17" hasCustomPrompt="1"/>
-          </p:nvPr>
-        </p:nvSpPr>
-        <p:spPr>
-          <a:xfrm>
-            <a:off x="8406676" y="4041948"/>
-            <a:ext cx="3472903" cy="2121885"/>
-          </a:xfrm>
-          <a:solidFill>
-            <a:schemeClr val="tx2">
-              <a:lumMod val="10000"/>
-              <a:lumOff val="90000"/>
-            </a:schemeClr>
-          </a:solidFill>
-        </p:spPr>
-        <p:txBody>
-          <a:bodyPr>
-            <a:normAutofit/>
-          </a:bodyPr>
-          <a:lstStyle>
-            <a:lvl1pPr marL="0" indent="0">
-              <a:buNone/>
-              <a:defRPr sz="1800" b="1">
-                <a:solidFill>
-                  <a:schemeClr val="tx2"/>
-                </a:solidFill>
-              </a:defRPr>
-            </a:lvl1pPr>
-            <a:lvl2pPr>
-              <a:defRPr sz="1600"/>
-            </a:lvl2pPr>
-            <a:lvl3pPr>
-              <a:defRPr sz="1400"/>
-            </a:lvl3pPr>
-            <a:lvl4pPr>
-              <a:defRPr sz="1200"/>
-            </a:lvl4pPr>
-            <a:lvl5pPr>
-              <a:defRPr sz="1200"/>
-            </a:lvl5pPr>
-          </a:lstStyle>
-          <a:p>
-            <a:pPr lvl="0"/>
-            <a:r>
-              <a:rPr kumimoji="1" lang="en-US" altLang="ja-JP" dirty="0"/>
-              <a:t>Key back ground</a:t>
-            </a:r>
-            <a:endParaRPr kumimoji="1" lang="ja-JP" altLang="en-US"/>
-          </a:p>
-        </p:txBody>
-      </p:sp>
-      <p:sp>
-        <p:nvSpPr>
-          <p:cNvPr id="5" name="コンテンツ プレースホルダー 2">
-            <a:extLst>
-              <a:ext uri="{FF2B5EF4-FFF2-40B4-BE49-F238E27FC236}">
-                <a16:creationId xmlns:a16="http://schemas.microsoft.com/office/drawing/2014/main" id="{5344D398-434A-990D-CE2C-2A671D1BFEDF}"/>
-              </a:ext>
-            </a:extLst>
-          </p:cNvPr>
-          <p:cNvSpPr>
-            <a:spLocks noGrp="1"/>
-          </p:cNvSpPr>
-          <p:nvPr>
-            <p:ph idx="18" hasCustomPrompt="1"/>
-          </p:nvPr>
-        </p:nvSpPr>
-        <p:spPr>
-          <a:xfrm>
-            <a:off x="4359547" y="4041947"/>
-            <a:ext cx="3472903" cy="2121885"/>
-          </a:xfrm>
-        </p:spPr>
-        <p:txBody>
-          <a:bodyPr>
-            <a:normAutofit/>
-          </a:bodyPr>
-          <a:lstStyle>
-            <a:lvl1pPr marL="0" indent="0">
-              <a:buNone/>
-              <a:defRPr sz="1800" b="1">
-                <a:solidFill>
-                  <a:srgbClr val="767676"/>
-                </a:solidFill>
-              </a:defRPr>
-            </a:lvl1pPr>
-            <a:lvl2pPr>
-              <a:defRPr sz="1600"/>
-            </a:lvl2pPr>
-            <a:lvl3pPr>
-              <a:defRPr sz="1400"/>
-            </a:lvl3pPr>
-            <a:lvl4pPr>
-              <a:defRPr sz="1200"/>
-            </a:lvl4pPr>
-            <a:lvl5pPr>
-              <a:defRPr sz="1200"/>
-            </a:lvl5pPr>
-          </a:lstStyle>
-          <a:p>
-            <a:pPr lvl="0"/>
-            <a:r>
-              <a:rPr kumimoji="1" lang="en-US" altLang="ja-JP" dirty="0"/>
-              <a:t>Backend color</a:t>
-            </a:r>
-            <a:endParaRPr kumimoji="1" lang="ja-JP" altLang="en-US"/>
-          </a:p>
-        </p:txBody>
-      </p:sp>
-      <p:sp>
-        <p:nvSpPr>
-          <p:cNvPr id="10" name="Num">
-            <a:extLst>
-              <a:ext uri="{FF2B5EF4-FFF2-40B4-BE49-F238E27FC236}">
-                <a16:creationId xmlns:a16="http://schemas.microsoft.com/office/drawing/2014/main" id="{4CF5A945-B1F5-B661-005B-14E20485E70A}"/>
-              </a:ext>
-            </a:extLst>
-          </p:cNvPr>
-          <p:cNvSpPr>
-            <a:spLocks noGrp="1"/>
-          </p:cNvSpPr>
-          <p:nvPr>
-            <p:ph type="sldNum" sz="quarter" idx="12"/>
-          </p:nvPr>
-        </p:nvSpPr>
-        <p:spPr>
-          <a:xfrm>
-            <a:off x="8610600" y="6356350"/>
-            <a:ext cx="3268980" cy="365125"/>
-          </a:xfrm>
-        </p:spPr>
-        <p:txBody>
-          <a:bodyPr/>
-          <a:lstStyle>
-            <a:lvl1pPr>
-              <a:defRPr>
-                <a:latin typeface="Meiryo UI" panose="020B0604030504040204" pitchFamily="34" charset="-128"/>
-                <a:ea typeface="Meiryo UI" panose="020B0604030504040204" pitchFamily="34" charset="-128"/>
-              </a:defRPr>
-            </a:lvl1pPr>
-          </a:lstStyle>
-          <a:p>
-            <a:fld id="{C9FB15DA-11C7-0141-B5F8-718388A4C1CD}" type="slidenum">
-              <a:rPr lang="ja-JP" altLang="en-US" smtClean="0"/>
-              <a:pPr/>
-              <a:t>‹#›</a:t>
-            </a:fld>
-            <a:endParaRPr lang="ja-JP" altLang="en-US"/>
-          </a:p>
-        </p:txBody>
-      </p:sp>
-      <p:sp>
-        <p:nvSpPr>
-          <p:cNvPr id="11" name="Sub Title">
-            <a:extLst>
-              <a:ext uri="{FF2B5EF4-FFF2-40B4-BE49-F238E27FC236}">
-                <a16:creationId xmlns:a16="http://schemas.microsoft.com/office/drawing/2014/main" id="{DC535037-88F4-A81C-18FE-57328C5849D1}"/>
-              </a:ext>
-            </a:extLst>
-          </p:cNvPr>
-          <p:cNvSpPr>
-            <a:spLocks noGrp="1"/>
-          </p:cNvSpPr>
-          <p:nvPr>
-            <p:ph type="subTitle" idx="15" hasCustomPrompt="1"/>
-          </p:nvPr>
-        </p:nvSpPr>
-        <p:spPr>
-          <a:xfrm>
-            <a:off x="312420" y="0"/>
-            <a:ext cx="4694586" cy="320634"/>
-          </a:xfrm>
-        </p:spPr>
-        <p:txBody>
-          <a:bodyPr anchor="b">
-            <a:normAutofit/>
-          </a:bodyPr>
-          <a:lstStyle>
-            <a:lvl1pPr marL="0" indent="0" algn="l">
-              <a:buNone/>
-              <a:defRPr sz="1800">
-                <a:solidFill>
-                  <a:srgbClr val="767676"/>
-                </a:solidFill>
-              </a:defRPr>
-            </a:lvl1pPr>
-            <a:lvl2pPr marL="457200" indent="0" algn="ctr">
-              <a:buNone/>
-              <a:defRPr sz="2000"/>
-            </a:lvl2pPr>
-            <a:lvl3pPr marL="914400" indent="0" algn="ctr">
-              <a:buNone/>
-              <a:defRPr sz="1800"/>
-            </a:lvl3pPr>
-            <a:lvl4pPr marL="1371600" indent="0" algn="ctr">
-              <a:buNone/>
-              <a:defRPr sz="1600"/>
-            </a:lvl4pPr>
-            <a:lvl5pPr marL="1828800" indent="0" algn="ctr">
-              <a:buNone/>
-              <a:defRPr sz="1600"/>
-            </a:lvl5pPr>
-            <a:lvl6pPr marL="2286000" indent="0" algn="ctr">
-              <a:buNone/>
-              <a:defRPr sz="1600"/>
-            </a:lvl6pPr>
-            <a:lvl7pPr marL="2743200" indent="0" algn="ctr">
-              <a:buNone/>
-              <a:defRPr sz="1600"/>
-            </a:lvl7pPr>
-            <a:lvl8pPr marL="3200400" indent="0" algn="ctr">
-              <a:buNone/>
-              <a:defRPr sz="1600"/>
-            </a:lvl8pPr>
-            <a:lvl9pPr marL="3657600" indent="0" algn="ctr">
-              <a:buNone/>
-              <a:defRPr sz="1600"/>
-            </a:lvl9pPr>
-          </a:lstStyle>
-          <a:p>
-            <a:pPr lvl="0"/>
-            <a:r>
-              <a:rPr kumimoji="1" lang="ja-JP" altLang="en-US"/>
-              <a:t>サブタイトル</a:t>
-            </a:r>
-            <a:r>
-              <a:rPr kumimoji="1" lang="en-US" altLang="ja-JP" dirty="0"/>
-              <a:t> </a:t>
-            </a:r>
-            <a:r>
-              <a:rPr kumimoji="1" lang="ja-JP" altLang="en-US"/>
-              <a:t>の書式設定</a:t>
-            </a:r>
-          </a:p>
-        </p:txBody>
-      </p:sp>
-      <p:sp>
-        <p:nvSpPr>
-          <p:cNvPr id="12" name="Main Message">
-            <a:extLst>
-              <a:ext uri="{FF2B5EF4-FFF2-40B4-BE49-F238E27FC236}">
-                <a16:creationId xmlns:a16="http://schemas.microsoft.com/office/drawing/2014/main" id="{C3E2B0DB-20BE-8434-2A15-7844DD73C6C7}"/>
-              </a:ext>
-            </a:extLst>
-          </p:cNvPr>
-          <p:cNvSpPr>
-            <a:spLocks noGrp="1"/>
-          </p:cNvSpPr>
-          <p:nvPr>
-            <p:ph type="title"/>
-          </p:nvPr>
-        </p:nvSpPr>
-        <p:spPr>
-          <a:xfrm>
-            <a:off x="312420" y="593765"/>
-            <a:ext cx="11567160" cy="831273"/>
-          </a:xfrm>
-        </p:spPr>
-        <p:txBody>
-          <a:bodyPr/>
-          <a:lstStyle>
-            <a:lvl1pPr>
-              <a:defRPr>
-                <a:latin typeface="Meiryo UI" panose="020B0604030504040204" pitchFamily="34" charset="-128"/>
-                <a:ea typeface="Meiryo UI" panose="020B0604030504040204" pitchFamily="34" charset="-128"/>
-              </a:defRPr>
-            </a:lvl1pPr>
-          </a:lstStyle>
-          <a:p>
-            <a:r>
-              <a:rPr kumimoji="1" lang="ja-JP" altLang="en-US"/>
-              <a:t>マスター タイトルの書式設定</a:t>
-            </a:r>
-          </a:p>
-        </p:txBody>
-      </p:sp>
-    </p:spTree>
-    <p:extLst>
-      <p:ext uri="{BB962C8B-B14F-4D97-AF65-F5344CB8AC3E}">
-        <p14:creationId xmlns:p14="http://schemas.microsoft.com/office/powerpoint/2010/main" val="2005540275"/>
       </p:ext>
     </p:extLst>
   </p:cSld>
@@ -14648,7 +14150,6 @@
     <p:sldLayoutId id="2147483670" r:id="rId22"/>
     <p:sldLayoutId id="2147483655" r:id="rId23"/>
     <p:sldLayoutId id="2147483675" r:id="rId24"/>
-    <p:sldLayoutId id="2147483654" r:id="rId25"/>
   </p:sldLayoutIdLst>
   <p:hf sldNum="0" hdr="0" dt="0"/>
   <p:txStyles>

</xml_diff>

<commit_message>
fix template page name
</commit_message>
<xml_diff>
--- a/samples/templates/templates.pptx
+++ b/samples/templates/templates.pptx
@@ -197,7 +197,7 @@
           <a:p>
             <a:fld id="{D83749C5-FFD9-114C-B10A-D0464B391B79}" type="datetimeFigureOut">
               <a:rPr kumimoji="1" lang="ja-JP" altLang="en-US" smtClean="0"/>
-              <a:t>2025/10/31</a:t>
+              <a:t>2025/11/10</a:t>
             </a:fld>
             <a:endParaRPr kumimoji="1" lang="ja-JP" altLang="en-US"/>
           </a:p>
@@ -8289,7 +8289,7 @@
 
 <file path=ppt/slideLayouts/slideLayout2.xml><?xml version="1.0" encoding="utf-8"?>
 <p:sldLayout xmlns:a="http://schemas.openxmlformats.org/drawingml/2006/main" xmlns:r="http://schemas.openxmlformats.org/officeDocument/2006/relationships" xmlns:p="http://schemas.openxmlformats.org/presentationml/2006/main" preserve="1" userDrawn="1">
-  <p:cSld name="Section Covor Left">
+  <p:cSld name="Section Cover Left">
     <p:spTree>
       <p:nvGrpSpPr>
         <p:cNvPr id="1" name=""/>
@@ -9723,7 +9723,7 @@
 
 <file path=ppt/slideLayouts/slideLayout22.xml><?xml version="1.0" encoding="utf-8"?>
 <p:sldLayout xmlns:a="http://schemas.openxmlformats.org/drawingml/2006/main" xmlns:r="http://schemas.openxmlformats.org/officeDocument/2006/relationships" xmlns:p="http://schemas.openxmlformats.org/presentationml/2006/main" preserve="1" userDrawn="1">
-  <p:cSld name="1_Two Flow">
+  <p:cSld name="Four Flow">
     <p:spTree>
       <p:nvGrpSpPr>
         <p:cNvPr id="1" name=""/>
@@ -10866,7 +10866,7 @@
 
 <file path=ppt/slideLayouts/slideLayout24.xml><?xml version="1.0" encoding="utf-8"?>
 <p:sldLayout xmlns:a="http://schemas.openxmlformats.org/drawingml/2006/main" xmlns:r="http://schemas.openxmlformats.org/officeDocument/2006/relationships" xmlns:p="http://schemas.openxmlformats.org/presentationml/2006/main" preserve="1" userDrawn="1">
-  <p:cSld name="Closin Covor">
+  <p:cSld name="Closing Cover">
     <p:spTree>
       <p:nvGrpSpPr>
         <p:cNvPr id="1" name=""/>
@@ -10936,7 +10936,7 @@
 
 <file path=ppt/slideLayouts/slideLayout3.xml><?xml version="1.0" encoding="utf-8"?>
 <p:sldLayout xmlns:a="http://schemas.openxmlformats.org/drawingml/2006/main" xmlns:r="http://schemas.openxmlformats.org/officeDocument/2006/relationships" xmlns:p="http://schemas.openxmlformats.org/presentationml/2006/main" preserve="1" userDrawn="1">
-  <p:cSld name="Section Covor Center">
+  <p:cSld name="Section Cover Center">
     <p:spTree>
       <p:nvGrpSpPr>
         <p:cNvPr id="1" name=""/>

</xml_diff>